<commit_message>
Added Presentation for Sprint 4 (Alpha)
</commit_message>
<xml_diff>
--- a/orga/Sprint_4_Presentation(Alpha).pptx
+++ b/orga/Sprint_4_Presentation(Alpha).pptx
@@ -5,10 +5,10 @@
     <p:sldMasterId id="2147483738" r:id="rId1"/>
   </p:sldMasterIdLst>
   <p:notesMasterIdLst>
-    <p:notesMasterId r:id="rId12"/>
+    <p:notesMasterId r:id="rId14"/>
   </p:notesMasterIdLst>
   <p:handoutMasterIdLst>
-    <p:handoutMasterId r:id="rId13"/>
+    <p:handoutMasterId r:id="rId15"/>
   </p:handoutMasterIdLst>
   <p:sldIdLst>
     <p:sldId id="256" r:id="rId2"/>
@@ -20,7 +20,9 @@
     <p:sldId id="267" r:id="rId8"/>
     <p:sldId id="264" r:id="rId9"/>
     <p:sldId id="278" r:id="rId10"/>
-    <p:sldId id="269" r:id="rId11"/>
+    <p:sldId id="279" r:id="rId11"/>
+    <p:sldId id="280" r:id="rId12"/>
+    <p:sldId id="269" r:id="rId13"/>
   </p:sldIdLst>
   <p:sldSz cx="12192000" cy="6858000"/>
   <p:notesSz cx="7099300" cy="10234613"/>
@@ -1425,6 +1427,120 @@
 </file>
 
 <file path=ppt/notesSlides/notesSlide6.xml><?xml version="1.0" encoding="utf-8"?>
+<p:notes xmlns:a="http://schemas.openxmlformats.org/drawingml/2006/main" xmlns:r="http://schemas.openxmlformats.org/officeDocument/2006/relationships" xmlns:p="http://schemas.openxmlformats.org/presentationml/2006/main">
+  <p:cSld>
+    <p:spTree>
+      <p:nvGrpSpPr>
+        <p:cNvPr id="1" name=""/>
+        <p:cNvGrpSpPr/>
+        <p:nvPr/>
+      </p:nvGrpSpPr>
+      <p:grpSpPr>
+        <a:xfrm>
+          <a:off x="0" y="0"/>
+          <a:ext cx="0" cy="0"/>
+          <a:chOff x="0" y="0"/>
+          <a:chExt cx="0" cy="0"/>
+        </a:xfrm>
+      </p:grpSpPr>
+      <p:sp>
+        <p:nvSpPr>
+          <p:cNvPr id="18434" name="Folienbildplatzhalter 1"/>
+          <p:cNvSpPr>
+            <a:spLocks noGrp="1" noRot="1" noChangeAspect="1" noTextEdit="1"/>
+          </p:cNvSpPr>
+          <p:nvPr>
+            <p:ph type="sldImg"/>
+          </p:nvPr>
+        </p:nvSpPr>
+        <p:spPr bwMode="auto">
+          <a:xfrm>
+            <a:off x="479425" y="1279525"/>
+            <a:ext cx="6140450" cy="3454400"/>
+          </a:xfrm>
+          <a:noFill/>
+          <a:ln>
+            <a:solidFill>
+              <a:srgbClr val="000000"/>
+            </a:solidFill>
+            <a:miter lim="800000"/>
+            <a:headEnd/>
+            <a:tailEnd/>
+          </a:ln>
+          <a:extLst>
+            <a:ext uri="{909E8E84-426E-40DD-AFC4-6F175D3DCCD1}">
+              <a14:hiddenFill xmlns:a14="http://schemas.microsoft.com/office/drawing/2010/main">
+                <a:solidFill>
+                  <a:srgbClr val="FFFFFF"/>
+                </a:solidFill>
+              </a14:hiddenFill>
+            </a:ext>
+          </a:extLst>
+        </p:spPr>
+      </p:sp>
+      <p:sp>
+        <p:nvSpPr>
+          <p:cNvPr id="18435" name="Notizenplatzhalter 2"/>
+          <p:cNvSpPr>
+            <a:spLocks noGrp="1"/>
+          </p:cNvSpPr>
+          <p:nvPr>
+            <p:ph type="body" idx="1"/>
+          </p:nvPr>
+        </p:nvSpPr>
+        <p:spPr bwMode="auto">
+          <a:noFill/>
+          <a:extLst>
+            <a:ext uri="{909E8E84-426E-40DD-AFC4-6F175D3DCCD1}">
+              <a14:hiddenFill xmlns:a14="http://schemas.microsoft.com/office/drawing/2010/main">
+                <a:solidFill>
+                  <a:srgbClr val="FFFFFF"/>
+                </a:solidFill>
+              </a14:hiddenFill>
+            </a:ext>
+            <a:ext uri="{91240B29-F687-4F45-9708-019B960494DF}">
+              <a14:hiddenLine xmlns:a14="http://schemas.microsoft.com/office/drawing/2010/main" w="9525">
+                <a:solidFill>
+                  <a:srgbClr val="000000"/>
+                </a:solidFill>
+                <a:miter lim="800000"/>
+                <a:headEnd/>
+                <a:tailEnd/>
+              </a14:hiddenLine>
+            </a:ext>
+          </a:extLst>
+        </p:spPr>
+        <p:txBody>
+          <a:bodyPr wrap="square" numCol="1" anchor="t" anchorCtr="0" compatLnSpc="1">
+            <a:prstTxWarp prst="textNoShape">
+              <a:avLst/>
+            </a:prstTxWarp>
+          </a:bodyPr>
+          <a:lstStyle/>
+          <a:p>
+            <a:pPr>
+              <a:spcBef>
+                <a:spcPct val="0"/>
+              </a:spcBef>
+            </a:pPr>
+            <a:endParaRPr lang="de-DE" altLang="de-DE"/>
+          </a:p>
+        </p:txBody>
+      </p:sp>
+    </p:spTree>
+    <p:extLst>
+      <p:ext uri="{BB962C8B-B14F-4D97-AF65-F5344CB8AC3E}">
+        <p14:creationId xmlns:p14="http://schemas.microsoft.com/office/powerpoint/2010/main" val="1773382381"/>
+      </p:ext>
+    </p:extLst>
+  </p:cSld>
+  <p:clrMapOvr>
+    <a:masterClrMapping/>
+  </p:clrMapOvr>
+</p:notes>
+</file>
+
+<file path=ppt/notesSlides/notesSlide7.xml><?xml version="1.0" encoding="utf-8"?>
 <p:notes xmlns:a="http://schemas.openxmlformats.org/drawingml/2006/main" xmlns:r="http://schemas.openxmlformats.org/officeDocument/2006/relationships" xmlns:p="http://schemas.openxmlformats.org/presentationml/2006/main">
   <p:cSld>
     <p:spTree>
@@ -4048,6 +4164,278 @@
 </file>
 
 <file path=ppt/slides/slide10.xml><?xml version="1.0" encoding="utf-8"?>
+<p:sld xmlns:a="http://schemas.openxmlformats.org/drawingml/2006/main" xmlns:r="http://schemas.openxmlformats.org/officeDocument/2006/relationships" xmlns:p="http://schemas.openxmlformats.org/presentationml/2006/main">
+  <p:cSld>
+    <p:spTree>
+      <p:nvGrpSpPr>
+        <p:cNvPr id="1" name=""/>
+        <p:cNvGrpSpPr/>
+        <p:nvPr/>
+      </p:nvGrpSpPr>
+      <p:grpSpPr>
+        <a:xfrm>
+          <a:off x="0" y="0"/>
+          <a:ext cx="0" cy="0"/>
+          <a:chOff x="0" y="0"/>
+          <a:chExt cx="0" cy="0"/>
+        </a:xfrm>
+      </p:grpSpPr>
+      <p:sp>
+        <p:nvSpPr>
+          <p:cNvPr id="2" name="Titel 1"/>
+          <p:cNvSpPr>
+            <a:spLocks noGrp="1"/>
+          </p:cNvSpPr>
+          <p:nvPr>
+            <p:ph type="ctrTitle"/>
+          </p:nvPr>
+        </p:nvSpPr>
+        <p:spPr>
+          <a:xfrm>
+            <a:off x="384000" y="2487600"/>
+            <a:ext cx="11424000" cy="443198"/>
+          </a:xfrm>
+        </p:spPr>
+        <p:txBody>
+          <a:bodyPr/>
+          <a:lstStyle/>
+          <a:p>
+            <a:r>
+              <a:rPr lang="en-US" dirty="0"/>
+              <a:t>Features </a:t>
+            </a:r>
+            <a:r>
+              <a:rPr lang="en-US" dirty="0" err="1"/>
+              <a:t>für</a:t>
+            </a:r>
+            <a:r>
+              <a:rPr lang="en-US" dirty="0"/>
+              <a:t> Beta Version</a:t>
+            </a:r>
+          </a:p>
+        </p:txBody>
+      </p:sp>
+    </p:spTree>
+    <p:extLst>
+      <p:ext uri="{BB962C8B-B14F-4D97-AF65-F5344CB8AC3E}">
+        <p14:creationId xmlns:p14="http://schemas.microsoft.com/office/powerpoint/2010/main" val="4250935669"/>
+      </p:ext>
+    </p:extLst>
+  </p:cSld>
+  <p:clrMapOvr>
+    <a:masterClrMapping/>
+  </p:clrMapOvr>
+</p:sld>
+</file>
+
+<file path=ppt/slides/slide11.xml><?xml version="1.0" encoding="utf-8"?>
+<p:sld xmlns:a="http://schemas.openxmlformats.org/drawingml/2006/main" xmlns:r="http://schemas.openxmlformats.org/officeDocument/2006/relationships" xmlns:p="http://schemas.openxmlformats.org/presentationml/2006/main">
+  <p:cSld>
+    <p:spTree>
+      <p:nvGrpSpPr>
+        <p:cNvPr id="1" name=""/>
+        <p:cNvGrpSpPr/>
+        <p:nvPr/>
+      </p:nvGrpSpPr>
+      <p:grpSpPr>
+        <a:xfrm>
+          <a:off x="0" y="0"/>
+          <a:ext cx="0" cy="0"/>
+          <a:chOff x="0" y="0"/>
+          <a:chExt cx="0" cy="0"/>
+        </a:xfrm>
+      </p:grpSpPr>
+      <p:sp>
+        <p:nvSpPr>
+          <p:cNvPr id="5" name="Title 4"/>
+          <p:cNvSpPr>
+            <a:spLocks noGrp="1"/>
+          </p:cNvSpPr>
+          <p:nvPr>
+            <p:ph type="title"/>
+          </p:nvPr>
+        </p:nvSpPr>
+        <p:spPr/>
+        <p:txBody>
+          <a:bodyPr/>
+          <a:lstStyle/>
+          <a:p>
+            <a:r>
+              <a:rPr lang="en-US" dirty="0" err="1"/>
+              <a:t>Plänne</a:t>
+            </a:r>
+            <a:r>
+              <a:rPr lang="en-US" dirty="0"/>
+              <a:t> </a:t>
+            </a:r>
+            <a:r>
+              <a:rPr lang="en-US" dirty="0" err="1"/>
+              <a:t>für</a:t>
+            </a:r>
+            <a:r>
+              <a:rPr lang="en-US" dirty="0"/>
+              <a:t> Beta Version</a:t>
+            </a:r>
+          </a:p>
+        </p:txBody>
+      </p:sp>
+      <p:sp>
+        <p:nvSpPr>
+          <p:cNvPr id="6" name="Content Placeholder 5"/>
+          <p:cNvSpPr>
+            <a:spLocks noGrp="1"/>
+          </p:cNvSpPr>
+          <p:nvPr>
+            <p:ph sz="quarter" idx="12"/>
+          </p:nvPr>
+        </p:nvSpPr>
+        <p:spPr/>
+        <p:txBody>
+          <a:bodyPr/>
+          <a:lstStyle/>
+          <a:p>
+            <a:pPr lvl="1"/>
+            <a:r>
+              <a:rPr lang="en-US" b="1" dirty="0"/>
+              <a:t>Jenkins Integration</a:t>
+            </a:r>
+            <a:endParaRPr lang="en-US" dirty="0"/>
+          </a:p>
+          <a:p>
+            <a:pPr lvl="1"/>
+            <a:r>
+              <a:rPr lang="en-US" b="1" dirty="0" err="1"/>
+              <a:t>Sicherheit</a:t>
+            </a:r>
+            <a:r>
+              <a:rPr lang="en-US" b="1" dirty="0"/>
+              <a:t>: </a:t>
+            </a:r>
+            <a:r>
+              <a:rPr lang="en-US" dirty="0"/>
+              <a:t>Authentication, Session Management, Token Generation, etc. </a:t>
+            </a:r>
+          </a:p>
+          <a:p>
+            <a:pPr lvl="1"/>
+            <a:r>
+              <a:rPr lang="en-US" b="1" dirty="0"/>
+              <a:t>Import von CSV </a:t>
+            </a:r>
+            <a:r>
+              <a:rPr lang="en-US" b="1" dirty="0" err="1"/>
+              <a:t>Datei</a:t>
+            </a:r>
+            <a:r>
+              <a:rPr lang="en-US" b="1" dirty="0"/>
+              <a:t> von Links (</a:t>
+            </a:r>
+            <a:r>
+              <a:rPr lang="en-US" b="1" dirty="0" err="1"/>
+              <a:t>z.B</a:t>
+            </a:r>
+            <a:r>
+              <a:rPr lang="en-US" b="1" dirty="0"/>
+              <a:t>. </a:t>
+            </a:r>
+            <a:r>
+              <a:rPr lang="en-US" b="1" dirty="0" err="1"/>
+              <a:t>Git</a:t>
+            </a:r>
+            <a:r>
+              <a:rPr lang="en-US" b="1" dirty="0"/>
+              <a:t>) </a:t>
+            </a:r>
+          </a:p>
+          <a:p>
+            <a:pPr lvl="1"/>
+            <a:r>
+              <a:rPr lang="en-US" b="1" dirty="0"/>
+              <a:t>Export von </a:t>
+            </a:r>
+            <a:r>
+              <a:rPr lang="en-US" b="1" dirty="0" err="1"/>
+              <a:t>Testdaten</a:t>
+            </a:r>
+            <a:r>
+              <a:rPr lang="en-US" b="1" dirty="0"/>
+              <a:t> in CSV </a:t>
+            </a:r>
+            <a:r>
+              <a:rPr lang="en-US" b="1" dirty="0" err="1"/>
+              <a:t>Dateien</a:t>
+            </a:r>
+            <a:r>
+              <a:rPr lang="en-US" b="1" dirty="0"/>
+              <a:t> </a:t>
+            </a:r>
+          </a:p>
+          <a:p>
+            <a:pPr lvl="1"/>
+            <a:r>
+              <a:rPr lang="en-US" b="1" dirty="0"/>
+              <a:t>Data Consistency und Concurrency </a:t>
+            </a:r>
+          </a:p>
+        </p:txBody>
+      </p:sp>
+      <p:sp>
+        <p:nvSpPr>
+          <p:cNvPr id="3" name="Footer Placeholder 2"/>
+          <p:cNvSpPr>
+            <a:spLocks noGrp="1"/>
+          </p:cNvSpPr>
+          <p:nvPr>
+            <p:ph type="ftr" sz="quarter" idx="13"/>
+          </p:nvPr>
+        </p:nvSpPr>
+        <p:spPr/>
+        <p:txBody>
+          <a:bodyPr/>
+          <a:lstStyle/>
+          <a:p>
+            <a:endParaRPr lang="de-DE" dirty="0"/>
+          </a:p>
+        </p:txBody>
+      </p:sp>
+      <p:sp>
+        <p:nvSpPr>
+          <p:cNvPr id="4" name="Slide Number Placeholder 3"/>
+          <p:cNvSpPr>
+            <a:spLocks noGrp="1"/>
+          </p:cNvSpPr>
+          <p:nvPr>
+            <p:ph type="sldNum" sz="quarter" idx="14"/>
+          </p:nvPr>
+        </p:nvSpPr>
+        <p:spPr/>
+        <p:txBody>
+          <a:bodyPr/>
+          <a:lstStyle/>
+          <a:p>
+            <a:fld id="{4506F84E-75D2-4715-B6C6-C971E49CE21A}" type="slidenum">
+              <a:rPr lang="de-DE" smtClean="0"/>
+              <a:pPr/>
+              <a:t>11</a:t>
+            </a:fld>
+            <a:endParaRPr lang="de-DE" dirty="0"/>
+          </a:p>
+        </p:txBody>
+      </p:sp>
+    </p:spTree>
+    <p:extLst>
+      <p:ext uri="{BB962C8B-B14F-4D97-AF65-F5344CB8AC3E}">
+        <p14:creationId xmlns:p14="http://schemas.microsoft.com/office/powerpoint/2010/main" val="1912622530"/>
+      </p:ext>
+    </p:extLst>
+  </p:cSld>
+  <p:clrMapOvr>
+    <a:masterClrMapping/>
+  </p:clrMapOvr>
+</p:sld>
+</file>
+
+<file path=ppt/slides/slide12.xml><?xml version="1.0" encoding="utf-8"?>
 <p:sld xmlns:a="http://schemas.openxmlformats.org/drawingml/2006/main" xmlns:r="http://schemas.openxmlformats.org/officeDocument/2006/relationships" xmlns:p="http://schemas.openxmlformats.org/presentationml/2006/main">
   <p:cSld>
     <p:spTree>

</xml_diff>

<commit_message>
Updated Presentation for Sprint 4
</commit_message>
<xml_diff>
--- a/orga/Sprint_4_Presentation(Alpha).pptx
+++ b/orga/Sprint_4_Presentation(Alpha).pptx
@@ -5,10 +5,10 @@
     <p:sldMasterId id="2147483738" r:id="rId1"/>
   </p:sldMasterIdLst>
   <p:notesMasterIdLst>
-    <p:notesMasterId r:id="rId14"/>
+    <p:notesMasterId r:id="rId16"/>
   </p:notesMasterIdLst>
   <p:handoutMasterIdLst>
-    <p:handoutMasterId r:id="rId15"/>
+    <p:handoutMasterId r:id="rId17"/>
   </p:handoutMasterIdLst>
   <p:sldIdLst>
     <p:sldId id="256" r:id="rId2"/>
@@ -17,12 +17,14 @@
     <p:sldId id="272" r:id="rId5"/>
     <p:sldId id="262" r:id="rId6"/>
     <p:sldId id="276" r:id="rId7"/>
-    <p:sldId id="267" r:id="rId8"/>
-    <p:sldId id="264" r:id="rId9"/>
-    <p:sldId id="278" r:id="rId10"/>
-    <p:sldId id="279" r:id="rId11"/>
-    <p:sldId id="280" r:id="rId12"/>
-    <p:sldId id="269" r:id="rId13"/>
+    <p:sldId id="281" r:id="rId8"/>
+    <p:sldId id="282" r:id="rId9"/>
+    <p:sldId id="267" r:id="rId10"/>
+    <p:sldId id="264" r:id="rId11"/>
+    <p:sldId id="278" r:id="rId12"/>
+    <p:sldId id="279" r:id="rId13"/>
+    <p:sldId id="280" r:id="rId14"/>
+    <p:sldId id="269" r:id="rId15"/>
   </p:sldIdLst>
   <p:sldSz cx="12192000" cy="6858000"/>
   <p:notesSz cx="7099300" cy="10234613"/>
@@ -4045,7 +4047,7 @@
           <a:p>
             <a:r>
               <a:rPr lang="en-US" dirty="0"/>
-              <a:t>Sprint 3</a:t>
+              <a:t>Sprint 4 (Alpha)</a:t>
             </a:r>
           </a:p>
         </p:txBody>
@@ -4087,7 +4089,12 @@
             <p:ph type="body" sz="quarter" idx="10"/>
           </p:nvPr>
         </p:nvSpPr>
-        <p:spPr/>
+        <p:spPr>
+          <a:xfrm>
+            <a:off x="7728301" y="859508"/>
+            <a:ext cx="4079699" cy="951220"/>
+          </a:xfrm>
+        </p:spPr>
         <p:txBody>
           <a:bodyPr>
             <a:noAutofit/>
@@ -4107,25 +4114,6 @@
             <a:r>
               <a:rPr lang="en-US" sz="1800" dirty="0" err="1"/>
               <a:t>Vladimirova</a:t>
-            </a:r>
-            <a:endParaRPr lang="en-US" sz="1800" dirty="0"/>
-          </a:p>
-          <a:p>
-            <a:r>
-              <a:rPr lang="en-US" sz="1800" dirty="0"/>
-              <a:t>Mohamed </a:t>
-            </a:r>
-            <a:r>
-              <a:rPr lang="en-US" sz="1800" dirty="0" err="1"/>
-              <a:t>Achref</a:t>
-            </a:r>
-            <a:r>
-              <a:rPr lang="en-US" sz="1800" dirty="0"/>
-              <a:t> </a:t>
-            </a:r>
-            <a:r>
-              <a:rPr lang="en-US" sz="1800" dirty="0" err="1"/>
-              <a:t>Chiha</a:t>
             </a:r>
             <a:endParaRPr lang="en-US" sz="1800" dirty="0"/>
           </a:p>
@@ -4182,27 +4170,60 @@
       </p:grpSpPr>
       <p:sp>
         <p:nvSpPr>
-          <p:cNvPr id="2" name="Titel 1"/>
+          <p:cNvPr id="5" name="Title 4"/>
           <p:cNvSpPr>
             <a:spLocks noGrp="1"/>
           </p:cNvSpPr>
           <p:nvPr>
-            <p:ph type="ctrTitle"/>
-          </p:nvPr>
-        </p:nvSpPr>
-        <p:spPr>
-          <a:xfrm>
-            <a:off x="384000" y="2487600"/>
-            <a:ext cx="11424000" cy="443198"/>
-          </a:xfrm>
-        </p:spPr>
+            <p:ph type="title"/>
+          </p:nvPr>
+        </p:nvSpPr>
+        <p:spPr/>
         <p:txBody>
           <a:bodyPr/>
           <a:lstStyle/>
           <a:p>
             <a:r>
               <a:rPr lang="en-US" dirty="0"/>
-              <a:t>Features </a:t>
+              <a:t>Backend Microservices </a:t>
+            </a:r>
+          </a:p>
+        </p:txBody>
+      </p:sp>
+      <p:sp>
+        <p:nvSpPr>
+          <p:cNvPr id="6" name="Content Placeholder 5"/>
+          <p:cNvSpPr>
+            <a:spLocks noGrp="1"/>
+          </p:cNvSpPr>
+          <p:nvPr>
+            <p:ph sz="quarter" idx="12"/>
+          </p:nvPr>
+        </p:nvSpPr>
+        <p:spPr/>
+        <p:txBody>
+          <a:bodyPr/>
+          <a:lstStyle/>
+          <a:p>
+            <a:pPr lvl="1"/>
+            <a:r>
+              <a:rPr lang="en-US" b="1" dirty="0"/>
+              <a:t>Importer:</a:t>
+            </a:r>
+          </a:p>
+          <a:p>
+            <a:pPr lvl="2"/>
+            <a:r>
+              <a:rPr lang="en-US" dirty="0"/>
+              <a:t>RESTful </a:t>
+            </a:r>
+            <a:r>
+              <a:rPr lang="en-US" dirty="0" err="1"/>
+              <a:t>Schnittstellen</a:t>
+            </a:r>
+            <a:r>
+              <a:rPr lang="en-US" dirty="0"/>
+              <a:t> </a:t>
             </a:r>
             <a:r>
               <a:rPr lang="en-US" dirty="0" err="1"/>
@@ -4210,15 +4231,155 @@
             </a:r>
             <a:r>
               <a:rPr lang="en-US" dirty="0"/>
-              <a:t> Beta Version</a:t>
-            </a:r>
+              <a:t> Import, Update, Delete von Tests</a:t>
+            </a:r>
+          </a:p>
+          <a:p>
+            <a:pPr lvl="2"/>
+            <a:endParaRPr lang="en-US" dirty="0"/>
+          </a:p>
+          <a:p>
+            <a:pPr lvl="1"/>
+            <a:r>
+              <a:rPr lang="en-US" b="1" dirty="0"/>
+              <a:t>Exporter:</a:t>
+            </a:r>
+          </a:p>
+          <a:p>
+            <a:pPr lvl="2"/>
+            <a:r>
+              <a:rPr lang="en-US" dirty="0"/>
+              <a:t>RESTful </a:t>
+            </a:r>
+            <a:r>
+              <a:rPr lang="en-US" dirty="0" err="1"/>
+              <a:t>Schnistellen</a:t>
+            </a:r>
+            <a:r>
+              <a:rPr lang="en-US" dirty="0"/>
+              <a:t> Export von Tests</a:t>
+            </a:r>
+          </a:p>
+          <a:p>
+            <a:pPr lvl="1"/>
+            <a:endParaRPr lang="en-US" dirty="0"/>
+          </a:p>
+          <a:p>
+            <a:pPr lvl="1"/>
+            <a:r>
+              <a:rPr lang="en-US" b="1" dirty="0"/>
+              <a:t>Database API: </a:t>
+            </a:r>
+          </a:p>
+          <a:p>
+            <a:pPr lvl="2"/>
+            <a:r>
+              <a:rPr lang="en-US" dirty="0"/>
+              <a:t>RESTful </a:t>
+            </a:r>
+            <a:r>
+              <a:rPr lang="en-US" dirty="0" err="1"/>
+              <a:t>Schnittstellen</a:t>
+            </a:r>
+            <a:r>
+              <a:rPr lang="en-US" dirty="0"/>
+              <a:t> </a:t>
+            </a:r>
+            <a:r>
+              <a:rPr lang="en-US" dirty="0" err="1"/>
+              <a:t>für</a:t>
+            </a:r>
+            <a:r>
+              <a:rPr lang="en-US" dirty="0"/>
+              <a:t> </a:t>
+            </a:r>
+            <a:r>
+              <a:rPr lang="en-US" dirty="0" err="1"/>
+              <a:t>Speichern</a:t>
+            </a:r>
+            <a:r>
+              <a:rPr lang="en-US" dirty="0"/>
+              <a:t> und </a:t>
+            </a:r>
+            <a:r>
+              <a:rPr lang="en-US" dirty="0" err="1"/>
+              <a:t>Lesen</a:t>
+            </a:r>
+            <a:r>
+              <a:rPr lang="en-US" dirty="0"/>
+              <a:t> von Tests in MySQL </a:t>
+            </a:r>
+            <a:r>
+              <a:rPr lang="en-US" dirty="0" err="1"/>
+              <a:t>Datenbank</a:t>
+            </a:r>
+            <a:endParaRPr lang="en-US" dirty="0"/>
+          </a:p>
+          <a:p>
+            <a:pPr lvl="2"/>
+            <a:endParaRPr lang="en-US" dirty="0"/>
+          </a:p>
+          <a:p>
+            <a:pPr lvl="1"/>
+            <a:r>
+              <a:rPr lang="en-US" b="1" dirty="0"/>
+              <a:t>Swagger </a:t>
+            </a:r>
+            <a:r>
+              <a:rPr lang="en-US" b="1" dirty="0" err="1"/>
+              <a:t>Dokumentation</a:t>
+            </a:r>
+            <a:endParaRPr lang="en-US" b="1" dirty="0"/>
+          </a:p>
+        </p:txBody>
+      </p:sp>
+      <p:sp>
+        <p:nvSpPr>
+          <p:cNvPr id="3" name="Footer Placeholder 2"/>
+          <p:cNvSpPr>
+            <a:spLocks noGrp="1"/>
+          </p:cNvSpPr>
+          <p:nvPr>
+            <p:ph type="ftr" sz="quarter" idx="13"/>
+          </p:nvPr>
+        </p:nvSpPr>
+        <p:spPr/>
+        <p:txBody>
+          <a:bodyPr/>
+          <a:lstStyle/>
+          <a:p>
+            <a:endParaRPr lang="de-DE" dirty="0"/>
+          </a:p>
+        </p:txBody>
+      </p:sp>
+      <p:sp>
+        <p:nvSpPr>
+          <p:cNvPr id="4" name="Slide Number Placeholder 3"/>
+          <p:cNvSpPr>
+            <a:spLocks noGrp="1"/>
+          </p:cNvSpPr>
+          <p:nvPr>
+            <p:ph type="sldNum" sz="quarter" idx="14"/>
+          </p:nvPr>
+        </p:nvSpPr>
+        <p:spPr/>
+        <p:txBody>
+          <a:bodyPr/>
+          <a:lstStyle/>
+          <a:p>
+            <a:fld id="{4506F84E-75D2-4715-B6C6-C971E49CE21A}" type="slidenum">
+              <a:rPr lang="de-DE" smtClean="0"/>
+              <a:pPr/>
+              <a:t>10</a:t>
+            </a:fld>
+            <a:endParaRPr lang="de-DE" dirty="0"/>
           </a:p>
         </p:txBody>
       </p:sp>
     </p:spTree>
     <p:extLst>
       <p:ext uri="{BB962C8B-B14F-4D97-AF65-F5344CB8AC3E}">
-        <p14:creationId xmlns:p14="http://schemas.microsoft.com/office/powerpoint/2010/main" val="4250935669"/>
+        <p14:creationId xmlns:p14="http://schemas.microsoft.com/office/powerpoint/2010/main" val="361520676"/>
       </p:ext>
     </p:extLst>
   </p:cSld>
@@ -4247,7 +4408,7 @@
       </p:grpSpPr>
       <p:sp>
         <p:nvSpPr>
-          <p:cNvPr id="5" name="Title 4"/>
+          <p:cNvPr id="2" name="Title 1"/>
           <p:cNvSpPr>
             <a:spLocks noGrp="1"/>
           </p:cNvSpPr>
@@ -4262,31 +4423,24 @@
           <a:p>
             <a:r>
               <a:rPr lang="en-US" dirty="0" err="1"/>
-              <a:t>Plänne</a:t>
+              <a:t>Datenmodell</a:t>
             </a:r>
             <a:r>
               <a:rPr lang="en-US" dirty="0"/>
               <a:t> </a:t>
             </a:r>
-            <a:r>
-              <a:rPr lang="en-US" dirty="0" err="1"/>
-              <a:t>für</a:t>
-            </a:r>
-            <a:r>
-              <a:rPr lang="en-US" dirty="0"/>
-              <a:t> Beta Version</a:t>
-            </a:r>
-          </a:p>
-        </p:txBody>
-      </p:sp>
-      <p:sp>
-        <p:nvSpPr>
-          <p:cNvPr id="6" name="Content Placeholder 5"/>
+            <a:endParaRPr lang="bg-BG" dirty="0"/>
+          </a:p>
+        </p:txBody>
+      </p:sp>
+      <p:sp>
+        <p:nvSpPr>
+          <p:cNvPr id="4" name="Footer Placeholder 3"/>
           <p:cNvSpPr>
             <a:spLocks noGrp="1"/>
           </p:cNvSpPr>
           <p:nvPr>
-            <p:ph sz="quarter" idx="12"/>
+            <p:ph type="ftr" sz="quarter" idx="13"/>
           </p:nvPr>
         </p:nvSpPr>
         <p:spPr/>
@@ -4294,121 +4448,14 @@
           <a:bodyPr/>
           <a:lstStyle/>
           <a:p>
-            <a:pPr lvl="1"/>
-            <a:r>
-              <a:rPr lang="en-US" b="1" dirty="0"/>
-              <a:t>Jenkins Integration</a:t>
-            </a:r>
-            <a:endParaRPr lang="en-US" dirty="0"/>
-          </a:p>
-          <a:p>
-            <a:pPr lvl="1"/>
-            <a:r>
-              <a:rPr lang="en-US" b="1" dirty="0" err="1"/>
-              <a:t>Sicherheit</a:t>
-            </a:r>
-            <a:r>
-              <a:rPr lang="en-US" b="1" dirty="0"/>
-              <a:t>: </a:t>
-            </a:r>
-            <a:r>
-              <a:rPr lang="en-US" dirty="0"/>
-              <a:t>Authentication, Session Management, Token Generation, etc. </a:t>
-            </a:r>
-          </a:p>
-          <a:p>
-            <a:pPr lvl="1"/>
-            <a:r>
-              <a:rPr lang="en-US" b="1" dirty="0"/>
-              <a:t>Import von CSV </a:t>
-            </a:r>
-            <a:r>
-              <a:rPr lang="en-US" b="1" dirty="0" err="1"/>
-              <a:t>Datei</a:t>
-            </a:r>
-            <a:r>
-              <a:rPr lang="en-US" b="1" dirty="0"/>
-              <a:t> von Links (</a:t>
-            </a:r>
-            <a:r>
-              <a:rPr lang="en-US" b="1" dirty="0" err="1"/>
-              <a:t>z.B</a:t>
-            </a:r>
-            <a:r>
-              <a:rPr lang="en-US" b="1" dirty="0"/>
-              <a:t>. </a:t>
-            </a:r>
-            <a:r>
-              <a:rPr lang="en-US" b="1" dirty="0" err="1"/>
-              <a:t>Git</a:t>
-            </a:r>
-            <a:r>
-              <a:rPr lang="en-US" b="1" dirty="0"/>
-              <a:t>) </a:t>
-            </a:r>
-          </a:p>
-          <a:p>
-            <a:pPr lvl="1"/>
-            <a:r>
-              <a:rPr lang="en-US" b="1" dirty="0"/>
-              <a:t>Export von </a:t>
-            </a:r>
-            <a:r>
-              <a:rPr lang="en-US" b="1" dirty="0" err="1"/>
-              <a:t>Testdaten</a:t>
-            </a:r>
-            <a:r>
-              <a:rPr lang="en-US" b="1" dirty="0"/>
-              <a:t> in CSV </a:t>
-            </a:r>
-            <a:r>
-              <a:rPr lang="en-US" b="1" dirty="0" err="1"/>
-              <a:t>Dateien</a:t>
-            </a:r>
-            <a:r>
-              <a:rPr lang="en-US" b="1" dirty="0"/>
-              <a:t> </a:t>
-            </a:r>
-          </a:p>
-          <a:p>
-            <a:pPr lvl="1"/>
-            <a:r>
-              <a:rPr lang="en-US" b="1" dirty="0"/>
-              <a:t>Data Consistency und Concurrency </a:t>
-            </a:r>
-          </a:p>
-          <a:p>
-            <a:pPr lvl="1"/>
-            <a:r>
-              <a:rPr lang="en-US" b="1" dirty="0" err="1"/>
-              <a:t>Elasticsearch</a:t>
-            </a:r>
-            <a:endParaRPr lang="en-US" b="1" dirty="0"/>
-          </a:p>
-        </p:txBody>
-      </p:sp>
-      <p:sp>
-        <p:nvSpPr>
-          <p:cNvPr id="3" name="Footer Placeholder 2"/>
-          <p:cNvSpPr>
-            <a:spLocks noGrp="1"/>
-          </p:cNvSpPr>
-          <p:nvPr>
-            <p:ph type="ftr" sz="quarter" idx="13"/>
-          </p:nvPr>
-        </p:nvSpPr>
-        <p:spPr/>
-        <p:txBody>
-          <a:bodyPr/>
-          <a:lstStyle/>
-          <a:p>
+            <a:pPr algn="l"/>
             <a:endParaRPr lang="de-DE" dirty="0"/>
           </a:p>
         </p:txBody>
       </p:sp>
       <p:sp>
         <p:nvSpPr>
-          <p:cNvPr id="4" name="Slide Number Placeholder 3"/>
+          <p:cNvPr id="5" name="Slide Number Placeholder 4"/>
           <p:cNvSpPr>
             <a:spLocks noGrp="1"/>
           </p:cNvSpPr>
@@ -4425,1975 +4472,6 @@
               <a:rPr lang="de-DE" smtClean="0"/>
               <a:pPr/>
               <a:t>11</a:t>
-            </a:fld>
-            <a:endParaRPr lang="de-DE" dirty="0"/>
-          </a:p>
-        </p:txBody>
-      </p:sp>
-    </p:spTree>
-    <p:extLst>
-      <p:ext uri="{BB962C8B-B14F-4D97-AF65-F5344CB8AC3E}">
-        <p14:creationId xmlns:p14="http://schemas.microsoft.com/office/powerpoint/2010/main" val="1912622530"/>
-      </p:ext>
-    </p:extLst>
-  </p:cSld>
-  <p:clrMapOvr>
-    <a:masterClrMapping/>
-  </p:clrMapOvr>
-</p:sld>
-</file>
-
-<file path=ppt/slides/slide12.xml><?xml version="1.0" encoding="utf-8"?>
-<p:sld xmlns:a="http://schemas.openxmlformats.org/drawingml/2006/main" xmlns:r="http://schemas.openxmlformats.org/officeDocument/2006/relationships" xmlns:p="http://schemas.openxmlformats.org/presentationml/2006/main">
-  <p:cSld>
-    <p:spTree>
-      <p:nvGrpSpPr>
-        <p:cNvPr id="1" name=""/>
-        <p:cNvGrpSpPr/>
-        <p:nvPr/>
-      </p:nvGrpSpPr>
-      <p:grpSpPr>
-        <a:xfrm>
-          <a:off x="0" y="0"/>
-          <a:ext cx="0" cy="0"/>
-          <a:chOff x="0" y="0"/>
-          <a:chExt cx="0" cy="0"/>
-        </a:xfrm>
-      </p:grpSpPr>
-      <p:sp>
-        <p:nvSpPr>
-          <p:cNvPr id="2" name="Titel 1"/>
-          <p:cNvSpPr>
-            <a:spLocks noGrp="1"/>
-          </p:cNvSpPr>
-          <p:nvPr>
-            <p:ph type="ctrTitle"/>
-          </p:nvPr>
-        </p:nvSpPr>
-        <p:spPr>
-          <a:xfrm>
-            <a:off x="384000" y="2487600"/>
-            <a:ext cx="11424000" cy="443198"/>
-          </a:xfrm>
-        </p:spPr>
-        <p:txBody>
-          <a:bodyPr/>
-          <a:lstStyle/>
-          <a:p>
-            <a:r>
-              <a:rPr lang="en-US" dirty="0" err="1"/>
-              <a:t>Danke</a:t>
-            </a:r>
-            <a:r>
-              <a:rPr lang="en-US" dirty="0"/>
-              <a:t> </a:t>
-            </a:r>
-            <a:r>
-              <a:rPr lang="en-US" dirty="0" err="1"/>
-              <a:t>für</a:t>
-            </a:r>
-            <a:r>
-              <a:rPr lang="en-US" dirty="0"/>
-              <a:t> die </a:t>
-            </a:r>
-            <a:r>
-              <a:rPr lang="en-US" dirty="0" err="1"/>
-              <a:t>Aufmerksamkeit</a:t>
-            </a:r>
-            <a:r>
-              <a:rPr lang="en-US"/>
-              <a:t>!</a:t>
-            </a:r>
-            <a:endParaRPr lang="en-US" dirty="0"/>
-          </a:p>
-        </p:txBody>
-      </p:sp>
-    </p:spTree>
-    <p:extLst>
-      <p:ext uri="{BB962C8B-B14F-4D97-AF65-F5344CB8AC3E}">
-        <p14:creationId xmlns:p14="http://schemas.microsoft.com/office/powerpoint/2010/main" val="3713188748"/>
-      </p:ext>
-    </p:extLst>
-  </p:cSld>
-  <p:clrMapOvr>
-    <a:masterClrMapping/>
-  </p:clrMapOvr>
-</p:sld>
-</file>
-
-<file path=ppt/slides/slide2.xml><?xml version="1.0" encoding="utf-8"?>
-<p:sld xmlns:a="http://schemas.openxmlformats.org/drawingml/2006/main" xmlns:r="http://schemas.openxmlformats.org/officeDocument/2006/relationships" xmlns:p="http://schemas.openxmlformats.org/presentationml/2006/main">
-  <p:cSld>
-    <p:spTree>
-      <p:nvGrpSpPr>
-        <p:cNvPr id="1" name=""/>
-        <p:cNvGrpSpPr/>
-        <p:nvPr/>
-      </p:nvGrpSpPr>
-      <p:grpSpPr>
-        <a:xfrm>
-          <a:off x="0" y="0"/>
-          <a:ext cx="0" cy="0"/>
-          <a:chOff x="0" y="0"/>
-          <a:chExt cx="0" cy="0"/>
-        </a:xfrm>
-      </p:grpSpPr>
-      <p:sp>
-        <p:nvSpPr>
-          <p:cNvPr id="2" name="Titel 1"/>
-          <p:cNvSpPr>
-            <a:spLocks noGrp="1"/>
-          </p:cNvSpPr>
-          <p:nvPr>
-            <p:ph type="ctrTitle"/>
-          </p:nvPr>
-        </p:nvSpPr>
-        <p:spPr>
-          <a:xfrm>
-            <a:off x="384000" y="2487600"/>
-            <a:ext cx="11424000" cy="443198"/>
-          </a:xfrm>
-        </p:spPr>
-        <p:txBody>
-          <a:bodyPr/>
-          <a:lstStyle/>
-          <a:p>
-            <a:r>
-              <a:rPr lang="en-US" dirty="0" err="1"/>
-              <a:t>Architektur</a:t>
-            </a:r>
-            <a:r>
-              <a:rPr lang="en-US" dirty="0"/>
-              <a:t> + </a:t>
-            </a:r>
-            <a:r>
-              <a:rPr lang="en-US" dirty="0" err="1"/>
-              <a:t>Technologien</a:t>
-            </a:r>
-            <a:endParaRPr lang="en-US" dirty="0"/>
-          </a:p>
-        </p:txBody>
-      </p:sp>
-    </p:spTree>
-    <p:extLst>
-      <p:ext uri="{BB962C8B-B14F-4D97-AF65-F5344CB8AC3E}">
-        <p14:creationId xmlns:p14="http://schemas.microsoft.com/office/powerpoint/2010/main" val="4293155205"/>
-      </p:ext>
-    </p:extLst>
-  </p:cSld>
-  <p:clrMapOvr>
-    <a:masterClrMapping/>
-  </p:clrMapOvr>
-</p:sld>
-</file>
-
-<file path=ppt/slides/slide3.xml><?xml version="1.0" encoding="utf-8"?>
-<p:sld xmlns:a="http://schemas.openxmlformats.org/drawingml/2006/main" xmlns:r="http://schemas.openxmlformats.org/officeDocument/2006/relationships" xmlns:p="http://schemas.openxmlformats.org/presentationml/2006/main">
-  <p:cSld>
-    <p:spTree>
-      <p:nvGrpSpPr>
-        <p:cNvPr id="1" name=""/>
-        <p:cNvGrpSpPr/>
-        <p:nvPr/>
-      </p:nvGrpSpPr>
-      <p:grpSpPr>
-        <a:xfrm>
-          <a:off x="0" y="0"/>
-          <a:ext cx="0" cy="0"/>
-          <a:chOff x="0" y="0"/>
-          <a:chExt cx="0" cy="0"/>
-        </a:xfrm>
-      </p:grpSpPr>
-      <p:sp>
-        <p:nvSpPr>
-          <p:cNvPr id="2" name="Title 1"/>
-          <p:cNvSpPr>
-            <a:spLocks noGrp="1"/>
-          </p:cNvSpPr>
-          <p:nvPr>
-            <p:ph type="title"/>
-          </p:nvPr>
-        </p:nvSpPr>
-        <p:spPr/>
-        <p:txBody>
-          <a:bodyPr/>
-          <a:lstStyle/>
-          <a:p>
-            <a:r>
-              <a:rPr lang="en-US" dirty="0" err="1"/>
-              <a:t>Technologien</a:t>
-            </a:r>
-            <a:endParaRPr lang="bg-BG" dirty="0"/>
-          </a:p>
-        </p:txBody>
-      </p:sp>
-      <p:sp>
-        <p:nvSpPr>
-          <p:cNvPr id="4" name="Footer Placeholder 3"/>
-          <p:cNvSpPr>
-            <a:spLocks noGrp="1"/>
-          </p:cNvSpPr>
-          <p:nvPr>
-            <p:ph type="ftr" sz="quarter" idx="13"/>
-          </p:nvPr>
-        </p:nvSpPr>
-        <p:spPr/>
-        <p:txBody>
-          <a:bodyPr/>
-          <a:lstStyle/>
-          <a:p>
-            <a:pPr algn="l"/>
-            <a:endParaRPr lang="de-DE" dirty="0"/>
-          </a:p>
-        </p:txBody>
-      </p:sp>
-      <p:sp>
-        <p:nvSpPr>
-          <p:cNvPr id="5" name="Slide Number Placeholder 4"/>
-          <p:cNvSpPr>
-            <a:spLocks noGrp="1"/>
-          </p:cNvSpPr>
-          <p:nvPr>
-            <p:ph type="sldNum" sz="quarter" idx="14"/>
-          </p:nvPr>
-        </p:nvSpPr>
-        <p:spPr/>
-        <p:txBody>
-          <a:bodyPr/>
-          <a:lstStyle/>
-          <a:p>
-            <a:fld id="{4506F84E-75D2-4715-B6C6-C971E49CE21A}" type="slidenum">
-              <a:rPr lang="de-DE" smtClean="0"/>
-              <a:pPr/>
-              <a:t>3</a:t>
-            </a:fld>
-            <a:endParaRPr lang="de-DE" dirty="0"/>
-          </a:p>
-        </p:txBody>
-      </p:sp>
-      <p:sp>
-        <p:nvSpPr>
-          <p:cNvPr id="6" name="Content Placeholder 5"/>
-          <p:cNvSpPr>
-            <a:spLocks noGrp="1"/>
-          </p:cNvSpPr>
-          <p:nvPr>
-            <p:ph sz="quarter" idx="12"/>
-          </p:nvPr>
-        </p:nvSpPr>
-        <p:spPr>
-          <a:xfrm>
-            <a:off x="383117" y="883577"/>
-            <a:ext cx="11425764" cy="5082249"/>
-          </a:xfrm>
-        </p:spPr>
-        <p:txBody>
-          <a:bodyPr/>
-          <a:lstStyle/>
-          <a:p>
-            <a:pPr lvl="1"/>
-            <a:r>
-              <a:rPr lang="en-US" b="1" dirty="0"/>
-              <a:t>Front-End:</a:t>
-            </a:r>
-          </a:p>
-          <a:p>
-            <a:pPr lvl="2"/>
-            <a:r>
-              <a:rPr lang="en-US" dirty="0"/>
-              <a:t>Angular.js und Node.js App</a:t>
-            </a:r>
-          </a:p>
-          <a:p>
-            <a:pPr lvl="2"/>
-            <a:r>
-              <a:rPr lang="en-US" dirty="0"/>
-              <a:t>Bootstrap</a:t>
-            </a:r>
-          </a:p>
-          <a:p>
-            <a:pPr lvl="1"/>
-            <a:r>
-              <a:rPr lang="en-US" b="1" dirty="0"/>
-              <a:t>API:</a:t>
-            </a:r>
-          </a:p>
-          <a:p>
-            <a:pPr lvl="2"/>
-            <a:r>
-              <a:rPr lang="en-US" dirty="0"/>
-              <a:t>Python(Flask)</a:t>
-            </a:r>
-          </a:p>
-          <a:p>
-            <a:pPr lvl="1"/>
-            <a:r>
-              <a:rPr lang="en-US" b="1" dirty="0"/>
-              <a:t>Backend: </a:t>
-            </a:r>
-          </a:p>
-          <a:p>
-            <a:pPr lvl="2"/>
-            <a:r>
-              <a:rPr lang="en-US" dirty="0"/>
-              <a:t>RESTful Spring Boot Microservices (Importer, Exporter, Database API)</a:t>
-            </a:r>
-          </a:p>
-          <a:p>
-            <a:pPr lvl="2"/>
-            <a:r>
-              <a:rPr lang="en-US" dirty="0"/>
-              <a:t>MySQL, Jackson, Hibernate, JDBC</a:t>
-            </a:r>
-          </a:p>
-          <a:p>
-            <a:pPr lvl="1"/>
-            <a:r>
-              <a:rPr lang="en-US" b="1" dirty="0"/>
-              <a:t> Communication: </a:t>
-            </a:r>
-            <a:r>
-              <a:rPr lang="en-US" dirty="0"/>
-              <a:t>JSON/REST</a:t>
-            </a:r>
-          </a:p>
-          <a:p>
-            <a:pPr lvl="1"/>
-            <a:r>
-              <a:rPr lang="en-US" b="1" dirty="0"/>
-              <a:t>Deployment: </a:t>
-            </a:r>
-            <a:r>
-              <a:rPr lang="en-US" dirty="0"/>
-              <a:t>Docker</a:t>
-            </a:r>
-            <a:endParaRPr lang="en-US" b="1" dirty="0"/>
-          </a:p>
-        </p:txBody>
-      </p:sp>
-    </p:spTree>
-    <p:extLst>
-      <p:ext uri="{BB962C8B-B14F-4D97-AF65-F5344CB8AC3E}">
-        <p14:creationId xmlns:p14="http://schemas.microsoft.com/office/powerpoint/2010/main" val="1232417916"/>
-      </p:ext>
-    </p:extLst>
-  </p:cSld>
-  <p:clrMapOvr>
-    <a:masterClrMapping/>
-  </p:clrMapOvr>
-</p:sld>
-</file>
-
-<file path=ppt/slides/slide4.xml><?xml version="1.0" encoding="utf-8"?>
-<p:sld xmlns:a="http://schemas.openxmlformats.org/drawingml/2006/main" xmlns:r="http://schemas.openxmlformats.org/officeDocument/2006/relationships" xmlns:p="http://schemas.openxmlformats.org/presentationml/2006/main">
-  <p:cSld>
-    <p:spTree>
-      <p:nvGrpSpPr>
-        <p:cNvPr id="1" name=""/>
-        <p:cNvGrpSpPr/>
-        <p:nvPr/>
-      </p:nvGrpSpPr>
-      <p:grpSpPr>
-        <a:xfrm>
-          <a:off x="0" y="0"/>
-          <a:ext cx="0" cy="0"/>
-          <a:chOff x="0" y="0"/>
-          <a:chExt cx="0" cy="0"/>
-        </a:xfrm>
-      </p:grpSpPr>
-      <p:sp>
-        <p:nvSpPr>
-          <p:cNvPr id="2" name="Правоъгълник 1"/>
-          <p:cNvSpPr/>
-          <p:nvPr/>
-        </p:nvSpPr>
-        <p:spPr bwMode="auto">
-          <a:xfrm>
-            <a:off x="5033402" y="95057"/>
-            <a:ext cx="2027582" cy="589564"/>
-          </a:xfrm>
-          <a:prstGeom prst="rect">
-            <a:avLst/>
-          </a:prstGeom>
-          <a:ln>
-            <a:headEnd/>
-            <a:tailEnd/>
-          </a:ln>
-        </p:spPr>
-        <p:style>
-          <a:lnRef idx="1">
-            <a:schemeClr val="accent6"/>
-          </a:lnRef>
-          <a:fillRef idx="2">
-            <a:schemeClr val="accent6"/>
-          </a:fillRef>
-          <a:effectRef idx="1">
-            <a:schemeClr val="accent6"/>
-          </a:effectRef>
-          <a:fontRef idx="minor">
-            <a:schemeClr val="dk1"/>
-          </a:fontRef>
-        </p:style>
-        <p:txBody>
-          <a:bodyPr rot="0" spcFirstLastPara="0" vertOverflow="overflow" horzOverflow="overflow" vert="horz" wrap="square" lIns="91440" tIns="45720" rIns="91440" bIns="45720" numCol="1" spcCol="0" rtlCol="0" fromWordArt="0" anchor="ctr" anchorCtr="0" forceAA="0" compatLnSpc="1">
-            <a:prstTxWarp prst="textNoShape">
-              <a:avLst/>
-            </a:prstTxWarp>
-            <a:noAutofit/>
-          </a:bodyPr>
-          <a:lstStyle/>
-          <a:p>
-            <a:pPr algn="ctr"/>
-            <a:r>
-              <a:rPr lang="en-US" sz="1600" dirty="0">
-                <a:solidFill>
-                  <a:schemeClr val="tx1"/>
-                </a:solidFill>
-                <a:latin typeface="Calibri Light" panose="020F0302020204030204" pitchFamily="34" charset="0"/>
-                <a:cs typeface="Arial" panose="020B0604020202020204" pitchFamily="34" charset="0"/>
-              </a:rPr>
-              <a:t>Front-End</a:t>
-            </a:r>
-          </a:p>
-          <a:p>
-            <a:pPr algn="ctr"/>
-            <a:r>
-              <a:rPr lang="en-US" sz="1600" dirty="0">
-                <a:solidFill>
-                  <a:schemeClr val="tx1"/>
-                </a:solidFill>
-                <a:latin typeface="Calibri Light" panose="020F0302020204030204" pitchFamily="34" charset="0"/>
-                <a:cs typeface="Arial" panose="020B0604020202020204" pitchFamily="34" charset="0"/>
-              </a:rPr>
-              <a:t>Angular </a:t>
-            </a:r>
-            <a:r>
-              <a:rPr lang="en-US" sz="1600" dirty="0" err="1">
-                <a:solidFill>
-                  <a:schemeClr val="tx1"/>
-                </a:solidFill>
-                <a:latin typeface="Calibri Light" panose="020F0302020204030204" pitchFamily="34" charset="0"/>
-                <a:cs typeface="Arial" panose="020B0604020202020204" pitchFamily="34" charset="0"/>
-              </a:rPr>
-              <a:t>Js</a:t>
-            </a:r>
-            <a:r>
-              <a:rPr lang="en-US" sz="1600" dirty="0">
-                <a:solidFill>
-                  <a:schemeClr val="tx1"/>
-                </a:solidFill>
-                <a:latin typeface="Calibri Light" panose="020F0302020204030204" pitchFamily="34" charset="0"/>
-                <a:cs typeface="Arial" panose="020B0604020202020204" pitchFamily="34" charset="0"/>
-              </a:rPr>
-              <a:t> 4.0</a:t>
-            </a:r>
-          </a:p>
-        </p:txBody>
-      </p:sp>
-      <p:sp>
-        <p:nvSpPr>
-          <p:cNvPr id="3" name="Правоъгълник 2"/>
-          <p:cNvSpPr/>
-          <p:nvPr/>
-        </p:nvSpPr>
-        <p:spPr bwMode="auto">
-          <a:xfrm>
-            <a:off x="5033402" y="1494897"/>
-            <a:ext cx="2027582" cy="589564"/>
-          </a:xfrm>
-          <a:prstGeom prst="rect">
-            <a:avLst/>
-          </a:prstGeom>
-          <a:ln>
-            <a:headEnd/>
-            <a:tailEnd/>
-          </a:ln>
-        </p:spPr>
-        <p:style>
-          <a:lnRef idx="1">
-            <a:schemeClr val="accent3"/>
-          </a:lnRef>
-          <a:fillRef idx="2">
-            <a:schemeClr val="accent3"/>
-          </a:fillRef>
-          <a:effectRef idx="1">
-            <a:schemeClr val="accent3"/>
-          </a:effectRef>
-          <a:fontRef idx="minor">
-            <a:schemeClr val="dk1"/>
-          </a:fontRef>
-        </p:style>
-        <p:txBody>
-          <a:bodyPr rot="0" spcFirstLastPara="0" vertOverflow="overflow" horzOverflow="overflow" vert="horz" wrap="square" lIns="91440" tIns="45720" rIns="91440" bIns="45720" numCol="1" spcCol="0" rtlCol="0" fromWordArt="0" anchor="ctr" anchorCtr="0" forceAA="0" compatLnSpc="1">
-            <a:prstTxWarp prst="textNoShape">
-              <a:avLst/>
-            </a:prstTxWarp>
-            <a:noAutofit/>
-          </a:bodyPr>
-          <a:lstStyle/>
-          <a:p>
-            <a:pPr algn="ctr"/>
-            <a:r>
-              <a:rPr lang="en-US" sz="1600" dirty="0">
-                <a:solidFill>
-                  <a:schemeClr val="tx1"/>
-                </a:solidFill>
-                <a:latin typeface="Calibri Light" panose="020F0302020204030204" pitchFamily="34" charset="0"/>
-                <a:cs typeface="Arial" panose="020B0604020202020204" pitchFamily="34" charset="0"/>
-              </a:rPr>
-              <a:t>API</a:t>
-            </a:r>
-          </a:p>
-          <a:p>
-            <a:pPr algn="ctr"/>
-            <a:r>
-              <a:rPr lang="en-US" sz="1600" dirty="0">
-                <a:solidFill>
-                  <a:schemeClr val="tx1"/>
-                </a:solidFill>
-                <a:latin typeface="Calibri Light" panose="020F0302020204030204" pitchFamily="34" charset="0"/>
-                <a:cs typeface="Arial" panose="020B0604020202020204" pitchFamily="34" charset="0"/>
-              </a:rPr>
-              <a:t>Python (Flask)</a:t>
-            </a:r>
-          </a:p>
-        </p:txBody>
-      </p:sp>
-      <p:sp>
-        <p:nvSpPr>
-          <p:cNvPr id="4" name="Правоъгълник 3"/>
-          <p:cNvSpPr/>
-          <p:nvPr/>
-        </p:nvSpPr>
-        <p:spPr bwMode="auto">
-          <a:xfrm>
-            <a:off x="525364" y="2858205"/>
-            <a:ext cx="2027582" cy="735649"/>
-          </a:xfrm>
-          <a:prstGeom prst="rect">
-            <a:avLst/>
-          </a:prstGeom>
-          <a:ln>
-            <a:headEnd/>
-            <a:tailEnd/>
-          </a:ln>
-        </p:spPr>
-        <p:style>
-          <a:lnRef idx="1">
-            <a:schemeClr val="accent4"/>
-          </a:lnRef>
-          <a:fillRef idx="2">
-            <a:schemeClr val="accent4"/>
-          </a:fillRef>
-          <a:effectRef idx="1">
-            <a:schemeClr val="accent4"/>
-          </a:effectRef>
-          <a:fontRef idx="minor">
-            <a:schemeClr val="dk1"/>
-          </a:fontRef>
-        </p:style>
-        <p:txBody>
-          <a:bodyPr rot="0" spcFirstLastPara="0" vertOverflow="overflow" horzOverflow="overflow" vert="horz" wrap="square" lIns="91440" tIns="45720" rIns="91440" bIns="45720" numCol="1" spcCol="0" rtlCol="0" fromWordArt="0" anchor="ctr" anchorCtr="0" forceAA="0" compatLnSpc="1">
-            <a:prstTxWarp prst="textNoShape">
-              <a:avLst/>
-            </a:prstTxWarp>
-            <a:noAutofit/>
-          </a:bodyPr>
-          <a:lstStyle/>
-          <a:p>
-            <a:pPr algn="ctr"/>
-            <a:r>
-              <a:rPr lang="en-US" sz="1600" dirty="0">
-                <a:solidFill>
-                  <a:schemeClr val="tx1"/>
-                </a:solidFill>
-                <a:latin typeface="Calibri Light" panose="020F0302020204030204" pitchFamily="34" charset="0"/>
-                <a:cs typeface="Arial" panose="020B0604020202020204" pitchFamily="34" charset="0"/>
-              </a:rPr>
-              <a:t>Exporter</a:t>
-            </a:r>
-          </a:p>
-          <a:p>
-            <a:pPr algn="ctr"/>
-            <a:r>
-              <a:rPr lang="en-US" sz="1600" dirty="0">
-                <a:solidFill>
-                  <a:schemeClr val="tx1"/>
-                </a:solidFill>
-                <a:latin typeface="Calibri Light" panose="020F0302020204030204" pitchFamily="34" charset="0"/>
-                <a:cs typeface="Arial" panose="020B0604020202020204" pitchFamily="34" charset="0"/>
-              </a:rPr>
-              <a:t>Spring Boot</a:t>
-            </a:r>
-          </a:p>
-          <a:p>
-            <a:pPr algn="ctr"/>
-            <a:r>
-              <a:rPr lang="en-US" sz="1600" dirty="0">
-                <a:solidFill>
-                  <a:schemeClr val="tx1"/>
-                </a:solidFill>
-                <a:latin typeface="Calibri Light" panose="020F0302020204030204" pitchFamily="34" charset="0"/>
-                <a:cs typeface="Arial" panose="020B0604020202020204" pitchFamily="34" charset="0"/>
-              </a:rPr>
-              <a:t>&lt;&lt;Micro-Service&gt;&gt;</a:t>
-            </a:r>
-          </a:p>
-        </p:txBody>
-      </p:sp>
-      <p:sp>
-        <p:nvSpPr>
-          <p:cNvPr id="5" name="Правоъгълник 4"/>
-          <p:cNvSpPr/>
-          <p:nvPr/>
-        </p:nvSpPr>
-        <p:spPr bwMode="auto">
-          <a:xfrm>
-            <a:off x="5035699" y="4478756"/>
-            <a:ext cx="2027582" cy="735649"/>
-          </a:xfrm>
-          <a:prstGeom prst="rect">
-            <a:avLst/>
-          </a:prstGeom>
-          <a:ln>
-            <a:headEnd/>
-            <a:tailEnd/>
-          </a:ln>
-        </p:spPr>
-        <p:style>
-          <a:lnRef idx="1">
-            <a:schemeClr val="accent4"/>
-          </a:lnRef>
-          <a:fillRef idx="2">
-            <a:schemeClr val="accent4"/>
-          </a:fillRef>
-          <a:effectRef idx="1">
-            <a:schemeClr val="accent4"/>
-          </a:effectRef>
-          <a:fontRef idx="minor">
-            <a:schemeClr val="dk1"/>
-          </a:fontRef>
-        </p:style>
-        <p:txBody>
-          <a:bodyPr rot="0" spcFirstLastPara="0" vertOverflow="overflow" horzOverflow="overflow" vert="horz" wrap="square" lIns="91440" tIns="45720" rIns="91440" bIns="45720" numCol="1" spcCol="0" rtlCol="0" fromWordArt="0" anchor="ctr" anchorCtr="0" forceAA="0" compatLnSpc="1">
-            <a:prstTxWarp prst="textNoShape">
-              <a:avLst/>
-            </a:prstTxWarp>
-            <a:noAutofit/>
-          </a:bodyPr>
-          <a:lstStyle/>
-          <a:p>
-            <a:pPr algn="ctr"/>
-            <a:r>
-              <a:rPr lang="en-US" sz="1600" dirty="0">
-                <a:solidFill>
-                  <a:schemeClr val="tx1"/>
-                </a:solidFill>
-                <a:latin typeface="Calibri Light" panose="020F0302020204030204" pitchFamily="34" charset="0"/>
-                <a:cs typeface="Arial" panose="020B0604020202020204" pitchFamily="34" charset="0"/>
-              </a:rPr>
-              <a:t>DB Interface</a:t>
-            </a:r>
-          </a:p>
-          <a:p>
-            <a:pPr algn="ctr"/>
-            <a:r>
-              <a:rPr lang="en-US" sz="1600" dirty="0">
-                <a:solidFill>
-                  <a:schemeClr val="tx1"/>
-                </a:solidFill>
-                <a:latin typeface="Calibri Light" panose="020F0302020204030204" pitchFamily="34" charset="0"/>
-                <a:cs typeface="Arial" panose="020B0604020202020204" pitchFamily="34" charset="0"/>
-              </a:rPr>
-              <a:t>Spring Boot</a:t>
-            </a:r>
-          </a:p>
-          <a:p>
-            <a:pPr algn="ctr"/>
-            <a:r>
-              <a:rPr lang="en-US" sz="1600" dirty="0">
-                <a:solidFill>
-                  <a:schemeClr val="tx1"/>
-                </a:solidFill>
-                <a:latin typeface="Calibri Light" panose="020F0302020204030204" pitchFamily="34" charset="0"/>
-                <a:cs typeface="Arial" panose="020B0604020202020204" pitchFamily="34" charset="0"/>
-              </a:rPr>
-              <a:t>&lt;&lt;Micro-Service&gt;&gt;</a:t>
-            </a:r>
-          </a:p>
-        </p:txBody>
-      </p:sp>
-      <p:sp>
-        <p:nvSpPr>
-          <p:cNvPr id="6" name="Правоъгълник 5"/>
-          <p:cNvSpPr/>
-          <p:nvPr/>
-        </p:nvSpPr>
-        <p:spPr bwMode="auto">
-          <a:xfrm>
-            <a:off x="9541440" y="2858204"/>
-            <a:ext cx="2027582" cy="735649"/>
-          </a:xfrm>
-          <a:prstGeom prst="rect">
-            <a:avLst/>
-          </a:prstGeom>
-          <a:ln>
-            <a:headEnd type="none" w="med" len="med"/>
-            <a:tailEnd type="none" w="med" len="med"/>
-          </a:ln>
-        </p:spPr>
-        <p:style>
-          <a:lnRef idx="1">
-            <a:schemeClr val="accent4"/>
-          </a:lnRef>
-          <a:fillRef idx="2">
-            <a:schemeClr val="accent4"/>
-          </a:fillRef>
-          <a:effectRef idx="1">
-            <a:schemeClr val="accent4"/>
-          </a:effectRef>
-          <a:fontRef idx="minor">
-            <a:schemeClr val="dk1"/>
-          </a:fontRef>
-        </p:style>
-        <p:txBody>
-          <a:bodyPr rot="0" spcFirstLastPara="0" vertOverflow="overflow" horzOverflow="overflow" vert="horz" wrap="square" lIns="91440" tIns="45720" rIns="91440" bIns="45720" numCol="1" spcCol="0" rtlCol="0" fromWordArt="0" anchor="ctr" anchorCtr="0" forceAA="0" compatLnSpc="1">
-            <a:prstTxWarp prst="textNoShape">
-              <a:avLst/>
-            </a:prstTxWarp>
-            <a:noAutofit/>
-          </a:bodyPr>
-          <a:lstStyle/>
-          <a:p>
-            <a:pPr algn="ctr"/>
-            <a:r>
-              <a:rPr lang="en-US" sz="1600" dirty="0">
-                <a:solidFill>
-                  <a:schemeClr val="tx1"/>
-                </a:solidFill>
-                <a:latin typeface="Calibri Light" panose="020F0302020204030204" pitchFamily="34" charset="0"/>
-                <a:cs typeface="Arial" panose="020B0604020202020204" pitchFamily="34" charset="0"/>
-              </a:rPr>
-              <a:t>…</a:t>
-            </a:r>
-          </a:p>
-          <a:p>
-            <a:pPr algn="ctr"/>
-            <a:r>
-              <a:rPr lang="en-US" sz="1600" dirty="0">
-                <a:solidFill>
-                  <a:schemeClr val="tx1"/>
-                </a:solidFill>
-                <a:latin typeface="Calibri Light" panose="020F0302020204030204" pitchFamily="34" charset="0"/>
-                <a:cs typeface="Arial" panose="020B0604020202020204" pitchFamily="34" charset="0"/>
-              </a:rPr>
-              <a:t>Spring Boot</a:t>
-            </a:r>
-          </a:p>
-          <a:p>
-            <a:pPr algn="ctr"/>
-            <a:r>
-              <a:rPr lang="en-US" sz="1600" dirty="0">
-                <a:solidFill>
-                  <a:schemeClr val="tx1"/>
-                </a:solidFill>
-                <a:latin typeface="Calibri Light" panose="020F0302020204030204" pitchFamily="34" charset="0"/>
-                <a:cs typeface="Arial" panose="020B0604020202020204" pitchFamily="34" charset="0"/>
-              </a:rPr>
-              <a:t>&lt;&lt;Micro-Service&gt;&gt;</a:t>
-            </a:r>
-          </a:p>
-        </p:txBody>
-      </p:sp>
-      <p:sp>
-        <p:nvSpPr>
-          <p:cNvPr id="7" name="Овал 6"/>
-          <p:cNvSpPr/>
-          <p:nvPr/>
-        </p:nvSpPr>
-        <p:spPr bwMode="auto">
-          <a:xfrm>
-            <a:off x="5214667" y="5944075"/>
-            <a:ext cx="1669646" cy="675861"/>
-          </a:xfrm>
-          <a:prstGeom prst="ellipse">
-            <a:avLst/>
-          </a:prstGeom>
-          <a:ln>
-            <a:headEnd/>
-            <a:tailEnd/>
-          </a:ln>
-        </p:spPr>
-        <p:style>
-          <a:lnRef idx="1">
-            <a:schemeClr val="accent2"/>
-          </a:lnRef>
-          <a:fillRef idx="2">
-            <a:schemeClr val="accent2"/>
-          </a:fillRef>
-          <a:effectRef idx="1">
-            <a:schemeClr val="accent2"/>
-          </a:effectRef>
-          <a:fontRef idx="minor">
-            <a:schemeClr val="dk1"/>
-          </a:fontRef>
-        </p:style>
-        <p:txBody>
-          <a:bodyPr rot="0" spcFirstLastPara="0" vertOverflow="overflow" horzOverflow="overflow" vert="horz" wrap="square" lIns="91440" tIns="45720" rIns="91440" bIns="45720" numCol="1" spcCol="0" rtlCol="0" fromWordArt="0" anchor="ctr" anchorCtr="0" forceAA="0" compatLnSpc="1">
-            <a:prstTxWarp prst="textNoShape">
-              <a:avLst/>
-            </a:prstTxWarp>
-            <a:noAutofit/>
-          </a:bodyPr>
-          <a:lstStyle/>
-          <a:p>
-            <a:pPr algn="ctr"/>
-            <a:r>
-              <a:rPr lang="en-US" sz="2400" dirty="0">
-                <a:solidFill>
-                  <a:schemeClr val="tx1"/>
-                </a:solidFill>
-                <a:latin typeface="Calibri Light" panose="020F0302020204030204" pitchFamily="34" charset="0"/>
-                <a:cs typeface="Arial" panose="020B0604020202020204" pitchFamily="34" charset="0"/>
-              </a:rPr>
-              <a:t>MySQL</a:t>
-            </a:r>
-          </a:p>
-        </p:txBody>
-      </p:sp>
-      <p:sp>
-        <p:nvSpPr>
-          <p:cNvPr id="8" name="Правоъгълник 7"/>
-          <p:cNvSpPr/>
-          <p:nvPr/>
-        </p:nvSpPr>
-        <p:spPr bwMode="auto">
-          <a:xfrm>
-            <a:off x="5033402" y="2894091"/>
-            <a:ext cx="2027582" cy="735649"/>
-          </a:xfrm>
-          <a:prstGeom prst="rect">
-            <a:avLst/>
-          </a:prstGeom>
-          <a:ln>
-            <a:headEnd/>
-            <a:tailEnd/>
-          </a:ln>
-        </p:spPr>
-        <p:style>
-          <a:lnRef idx="1">
-            <a:schemeClr val="accent4"/>
-          </a:lnRef>
-          <a:fillRef idx="2">
-            <a:schemeClr val="accent4"/>
-          </a:fillRef>
-          <a:effectRef idx="1">
-            <a:schemeClr val="accent4"/>
-          </a:effectRef>
-          <a:fontRef idx="minor">
-            <a:schemeClr val="dk1"/>
-          </a:fontRef>
-        </p:style>
-        <p:txBody>
-          <a:bodyPr rot="0" spcFirstLastPara="0" vertOverflow="overflow" horzOverflow="overflow" vert="horz" wrap="square" lIns="91440" tIns="45720" rIns="91440" bIns="45720" numCol="1" spcCol="0" rtlCol="0" fromWordArt="0" anchor="ctr" anchorCtr="0" forceAA="0" compatLnSpc="1">
-            <a:prstTxWarp prst="textNoShape">
-              <a:avLst/>
-            </a:prstTxWarp>
-            <a:noAutofit/>
-          </a:bodyPr>
-          <a:lstStyle/>
-          <a:p>
-            <a:pPr algn="ctr"/>
-            <a:r>
-              <a:rPr lang="en-US" sz="1600" dirty="0">
-                <a:solidFill>
-                  <a:schemeClr val="tx1"/>
-                </a:solidFill>
-                <a:latin typeface="Calibri Light" panose="020F0302020204030204" pitchFamily="34" charset="0"/>
-                <a:cs typeface="Arial" panose="020B0604020202020204" pitchFamily="34" charset="0"/>
-              </a:rPr>
-              <a:t>Importer</a:t>
-            </a:r>
-          </a:p>
-          <a:p>
-            <a:pPr algn="ctr"/>
-            <a:r>
-              <a:rPr lang="en-US" sz="1600" dirty="0">
-                <a:solidFill>
-                  <a:schemeClr val="tx1"/>
-                </a:solidFill>
-                <a:latin typeface="Calibri Light" panose="020F0302020204030204" pitchFamily="34" charset="0"/>
-                <a:cs typeface="Arial" panose="020B0604020202020204" pitchFamily="34" charset="0"/>
-              </a:rPr>
-              <a:t>Spring Boot</a:t>
-            </a:r>
-          </a:p>
-          <a:p>
-            <a:pPr algn="ctr"/>
-            <a:r>
-              <a:rPr lang="en-US" sz="1600" dirty="0">
-                <a:solidFill>
-                  <a:schemeClr val="tx1"/>
-                </a:solidFill>
-                <a:latin typeface="Calibri Light" panose="020F0302020204030204" pitchFamily="34" charset="0"/>
-                <a:cs typeface="Arial" panose="020B0604020202020204" pitchFamily="34" charset="0"/>
-              </a:rPr>
-              <a:t>&lt;&lt;Micro-Service&gt;&gt;</a:t>
-            </a:r>
-          </a:p>
-        </p:txBody>
-      </p:sp>
-      <p:cxnSp>
-        <p:nvCxnSpPr>
-          <p:cNvPr id="12" name="Съединител &quot;права стрелка&quot; 11"/>
-          <p:cNvCxnSpPr>
-            <a:stCxn id="2" idx="2"/>
-            <a:endCxn id="3" idx="0"/>
-          </p:cNvCxnSpPr>
-          <p:nvPr/>
-        </p:nvCxnSpPr>
-        <p:spPr bwMode="auto">
-          <a:xfrm>
-            <a:off x="6047193" y="684621"/>
-            <a:ext cx="0" cy="810276"/>
-          </a:xfrm>
-          <a:prstGeom prst="straightConnector1">
-            <a:avLst/>
-          </a:prstGeom>
-          <a:ln w="19050">
-            <a:solidFill>
-              <a:schemeClr val="tx1"/>
-            </a:solidFill>
-            <a:headEnd type="triangle"/>
-            <a:tailEnd type="triangle"/>
-          </a:ln>
-        </p:spPr>
-        <p:style>
-          <a:lnRef idx="1">
-            <a:schemeClr val="accent1"/>
-          </a:lnRef>
-          <a:fillRef idx="0">
-            <a:schemeClr val="accent1"/>
-          </a:fillRef>
-          <a:effectRef idx="0">
-            <a:schemeClr val="accent1"/>
-          </a:effectRef>
-          <a:fontRef idx="minor">
-            <a:schemeClr val="tx1"/>
-          </a:fontRef>
-        </p:style>
-      </p:cxnSp>
-      <p:cxnSp>
-        <p:nvCxnSpPr>
-          <p:cNvPr id="14" name="Съединител &quot;права стрелка&quot; 13"/>
-          <p:cNvCxnSpPr>
-            <a:cxnSpLocks/>
-            <a:stCxn id="3" idx="2"/>
-            <a:endCxn id="4" idx="0"/>
-          </p:cNvCxnSpPr>
-          <p:nvPr/>
-        </p:nvCxnSpPr>
-        <p:spPr bwMode="auto">
-          <a:xfrm flipH="1">
-            <a:off x="1539155" y="2084461"/>
-            <a:ext cx="4508038" cy="773744"/>
-          </a:xfrm>
-          <a:prstGeom prst="straightConnector1">
-            <a:avLst/>
-          </a:prstGeom>
-          <a:ln w="19050">
-            <a:solidFill>
-              <a:schemeClr val="tx1"/>
-            </a:solidFill>
-            <a:headEnd type="triangle"/>
-            <a:tailEnd type="triangle"/>
-          </a:ln>
-        </p:spPr>
-        <p:style>
-          <a:lnRef idx="1">
-            <a:schemeClr val="accent1"/>
-          </a:lnRef>
-          <a:fillRef idx="0">
-            <a:schemeClr val="accent1"/>
-          </a:fillRef>
-          <a:effectRef idx="0">
-            <a:schemeClr val="accent1"/>
-          </a:effectRef>
-          <a:fontRef idx="minor">
-            <a:schemeClr val="tx1"/>
-          </a:fontRef>
-        </p:style>
-      </p:cxnSp>
-      <p:cxnSp>
-        <p:nvCxnSpPr>
-          <p:cNvPr id="16" name="Съединител &quot;права стрелка&quot; 15"/>
-          <p:cNvCxnSpPr>
-            <a:stCxn id="3" idx="2"/>
-            <a:endCxn id="8" idx="0"/>
-          </p:cNvCxnSpPr>
-          <p:nvPr/>
-        </p:nvCxnSpPr>
-        <p:spPr bwMode="auto">
-          <a:xfrm>
-            <a:off x="6047193" y="2084461"/>
-            <a:ext cx="0" cy="809630"/>
-          </a:xfrm>
-          <a:prstGeom prst="straightConnector1">
-            <a:avLst/>
-          </a:prstGeom>
-          <a:ln w="19050">
-            <a:solidFill>
-              <a:schemeClr val="tx1"/>
-            </a:solidFill>
-            <a:headEnd type="triangle"/>
-            <a:tailEnd type="triangle"/>
-          </a:ln>
-        </p:spPr>
-        <p:style>
-          <a:lnRef idx="1">
-            <a:schemeClr val="accent1"/>
-          </a:lnRef>
-          <a:fillRef idx="0">
-            <a:schemeClr val="accent1"/>
-          </a:fillRef>
-          <a:effectRef idx="0">
-            <a:schemeClr val="accent1"/>
-          </a:effectRef>
-          <a:fontRef idx="minor">
-            <a:schemeClr val="tx1"/>
-          </a:fontRef>
-        </p:style>
-      </p:cxnSp>
-      <p:cxnSp>
-        <p:nvCxnSpPr>
-          <p:cNvPr id="18" name="Съединител &quot;права стрелка&quot; 17"/>
-          <p:cNvCxnSpPr>
-            <a:cxnSpLocks/>
-            <a:stCxn id="3" idx="2"/>
-            <a:endCxn id="6" idx="0"/>
-          </p:cNvCxnSpPr>
-          <p:nvPr/>
-        </p:nvCxnSpPr>
-        <p:spPr bwMode="auto">
-          <a:xfrm>
-            <a:off x="6047193" y="2084461"/>
-            <a:ext cx="4508038" cy="773743"/>
-          </a:xfrm>
-          <a:prstGeom prst="straightConnector1">
-            <a:avLst/>
-          </a:prstGeom>
-          <a:ln w="19050">
-            <a:solidFill>
-              <a:schemeClr val="tx1"/>
-            </a:solidFill>
-            <a:headEnd type="triangle"/>
-            <a:tailEnd type="triangle"/>
-          </a:ln>
-        </p:spPr>
-        <p:style>
-          <a:lnRef idx="1">
-            <a:schemeClr val="accent1"/>
-          </a:lnRef>
-          <a:fillRef idx="0">
-            <a:schemeClr val="accent1"/>
-          </a:fillRef>
-          <a:effectRef idx="0">
-            <a:schemeClr val="accent1"/>
-          </a:effectRef>
-          <a:fontRef idx="minor">
-            <a:schemeClr val="tx1"/>
-          </a:fontRef>
-        </p:style>
-      </p:cxnSp>
-      <p:cxnSp>
-        <p:nvCxnSpPr>
-          <p:cNvPr id="20" name="Съединител &quot;права стрелка&quot; 19"/>
-          <p:cNvCxnSpPr>
-            <a:stCxn id="8" idx="2"/>
-            <a:endCxn id="5" idx="0"/>
-          </p:cNvCxnSpPr>
-          <p:nvPr/>
-        </p:nvCxnSpPr>
-        <p:spPr bwMode="auto">
-          <a:xfrm>
-            <a:off x="6047193" y="3629740"/>
-            <a:ext cx="2297" cy="849016"/>
-          </a:xfrm>
-          <a:prstGeom prst="straightConnector1">
-            <a:avLst/>
-          </a:prstGeom>
-          <a:ln w="19050">
-            <a:solidFill>
-              <a:schemeClr val="tx1"/>
-            </a:solidFill>
-            <a:headEnd type="triangle"/>
-            <a:tailEnd type="triangle"/>
-          </a:ln>
-        </p:spPr>
-        <p:style>
-          <a:lnRef idx="1">
-            <a:schemeClr val="accent1"/>
-          </a:lnRef>
-          <a:fillRef idx="0">
-            <a:schemeClr val="accent1"/>
-          </a:fillRef>
-          <a:effectRef idx="0">
-            <a:schemeClr val="accent1"/>
-          </a:effectRef>
-          <a:fontRef idx="minor">
-            <a:schemeClr val="tx1"/>
-          </a:fontRef>
-        </p:style>
-      </p:cxnSp>
-      <p:cxnSp>
-        <p:nvCxnSpPr>
-          <p:cNvPr id="22" name="Съединител &quot;права стрелка&quot; 21"/>
-          <p:cNvCxnSpPr>
-            <a:stCxn id="5" idx="2"/>
-            <a:endCxn id="7" idx="0"/>
-          </p:cNvCxnSpPr>
-          <p:nvPr/>
-        </p:nvCxnSpPr>
-        <p:spPr bwMode="auto">
-          <a:xfrm>
-            <a:off x="6049490" y="5214405"/>
-            <a:ext cx="0" cy="729670"/>
-          </a:xfrm>
-          <a:prstGeom prst="straightConnector1">
-            <a:avLst/>
-          </a:prstGeom>
-          <a:ln w="19050">
-            <a:solidFill>
-              <a:schemeClr val="tx1"/>
-            </a:solidFill>
-            <a:headEnd type="triangle"/>
-            <a:tailEnd type="triangle"/>
-          </a:ln>
-        </p:spPr>
-        <p:style>
-          <a:lnRef idx="1">
-            <a:schemeClr val="accent1"/>
-          </a:lnRef>
-          <a:fillRef idx="0">
-            <a:schemeClr val="accent1"/>
-          </a:fillRef>
-          <a:effectRef idx="0">
-            <a:schemeClr val="accent1"/>
-          </a:effectRef>
-          <a:fontRef idx="minor">
-            <a:schemeClr val="tx1"/>
-          </a:fontRef>
-        </p:style>
-      </p:cxnSp>
-      <p:sp>
-        <p:nvSpPr>
-          <p:cNvPr id="39" name="Текстово поле 38"/>
-          <p:cNvSpPr txBox="1"/>
-          <p:nvPr/>
-        </p:nvSpPr>
-        <p:spPr>
-          <a:xfrm>
-            <a:off x="5967679" y="907141"/>
-            <a:ext cx="2186609" cy="400110"/>
-          </a:xfrm>
-          <a:prstGeom prst="rect">
-            <a:avLst/>
-          </a:prstGeom>
-          <a:noFill/>
-        </p:spPr>
-        <p:txBody>
-          <a:bodyPr wrap="square" rtlCol="0" anchor="ctr">
-            <a:spAutoFit/>
-          </a:bodyPr>
-          <a:lstStyle/>
-          <a:p>
-            <a:pPr algn="ctr"/>
-            <a:r>
-              <a:rPr lang="en-US" sz="2000" dirty="0">
-                <a:solidFill>
-                  <a:schemeClr val="tx1"/>
-                </a:solidFill>
-                <a:latin typeface="Calibri Light" panose="020F0302020204030204" pitchFamily="34" charset="0"/>
-                <a:cs typeface="Arial" panose="020B0604020202020204" pitchFamily="34" charset="0"/>
-              </a:rPr>
-              <a:t>CSV, JSON / REST</a:t>
-            </a:r>
-          </a:p>
-        </p:txBody>
-      </p:sp>
-      <p:sp>
-        <p:nvSpPr>
-          <p:cNvPr id="40" name="Текстово поле 39"/>
-          <p:cNvSpPr txBox="1"/>
-          <p:nvPr/>
-        </p:nvSpPr>
-        <p:spPr>
-          <a:xfrm>
-            <a:off x="1916716" y="2051656"/>
-            <a:ext cx="2186609" cy="400110"/>
-          </a:xfrm>
-          <a:prstGeom prst="rect">
-            <a:avLst/>
-          </a:prstGeom>
-          <a:noFill/>
-        </p:spPr>
-        <p:txBody>
-          <a:bodyPr wrap="square" rtlCol="0" anchor="ctr">
-            <a:spAutoFit/>
-          </a:bodyPr>
-          <a:lstStyle/>
-          <a:p>
-            <a:pPr algn="ctr"/>
-            <a:r>
-              <a:rPr lang="en-US" sz="2000" dirty="0">
-                <a:solidFill>
-                  <a:schemeClr val="tx1"/>
-                </a:solidFill>
-                <a:latin typeface="Calibri Light" panose="020F0302020204030204" pitchFamily="34" charset="0"/>
-                <a:cs typeface="Arial" panose="020B0604020202020204" pitchFamily="34" charset="0"/>
-              </a:rPr>
-              <a:t>JSON / REST</a:t>
-            </a:r>
-          </a:p>
-        </p:txBody>
-      </p:sp>
-      <p:sp>
-        <p:nvSpPr>
-          <p:cNvPr id="41" name="Текстово поле 40"/>
-          <p:cNvSpPr txBox="1"/>
-          <p:nvPr/>
-        </p:nvSpPr>
-        <p:spPr>
-          <a:xfrm>
-            <a:off x="7782213" y="1988603"/>
-            <a:ext cx="2186609" cy="400110"/>
-          </a:xfrm>
-          <a:prstGeom prst="rect">
-            <a:avLst/>
-          </a:prstGeom>
-          <a:noFill/>
-        </p:spPr>
-        <p:txBody>
-          <a:bodyPr wrap="square" rtlCol="0" anchor="ctr">
-            <a:spAutoFit/>
-          </a:bodyPr>
-          <a:lstStyle/>
-          <a:p>
-            <a:pPr algn="ctr"/>
-            <a:r>
-              <a:rPr lang="en-US" sz="2000" dirty="0">
-                <a:solidFill>
-                  <a:schemeClr val="tx1"/>
-                </a:solidFill>
-                <a:latin typeface="Calibri Light" panose="020F0302020204030204" pitchFamily="34" charset="0"/>
-                <a:cs typeface="Arial" panose="020B0604020202020204" pitchFamily="34" charset="0"/>
-              </a:rPr>
-              <a:t>JSON / REST</a:t>
-            </a:r>
-          </a:p>
-        </p:txBody>
-      </p:sp>
-      <p:sp>
-        <p:nvSpPr>
-          <p:cNvPr id="42" name="Текстово поле 41"/>
-          <p:cNvSpPr txBox="1"/>
-          <p:nvPr/>
-        </p:nvSpPr>
-        <p:spPr>
-          <a:xfrm>
-            <a:off x="5675117" y="2343913"/>
-            <a:ext cx="2186609" cy="400110"/>
-          </a:xfrm>
-          <a:prstGeom prst="rect">
-            <a:avLst/>
-          </a:prstGeom>
-          <a:noFill/>
-        </p:spPr>
-        <p:txBody>
-          <a:bodyPr wrap="square" rtlCol="0" anchor="ctr">
-            <a:spAutoFit/>
-          </a:bodyPr>
-          <a:lstStyle/>
-          <a:p>
-            <a:pPr algn="ctr"/>
-            <a:r>
-              <a:rPr lang="en-US" sz="2000" dirty="0">
-                <a:solidFill>
-                  <a:schemeClr val="tx1"/>
-                </a:solidFill>
-                <a:latin typeface="Calibri Light" panose="020F0302020204030204" pitchFamily="34" charset="0"/>
-                <a:cs typeface="Arial" panose="020B0604020202020204" pitchFamily="34" charset="0"/>
-              </a:rPr>
-              <a:t>JSON / REST</a:t>
-            </a:r>
-          </a:p>
-        </p:txBody>
-      </p:sp>
-      <p:sp>
-        <p:nvSpPr>
-          <p:cNvPr id="43" name="Текстово поле 42"/>
-          <p:cNvSpPr txBox="1"/>
-          <p:nvPr/>
-        </p:nvSpPr>
-        <p:spPr>
-          <a:xfrm>
-            <a:off x="5687354" y="3809210"/>
-            <a:ext cx="2186609" cy="400110"/>
-          </a:xfrm>
-          <a:prstGeom prst="rect">
-            <a:avLst/>
-          </a:prstGeom>
-          <a:noFill/>
-        </p:spPr>
-        <p:txBody>
-          <a:bodyPr wrap="square" rtlCol="0" anchor="ctr">
-            <a:spAutoFit/>
-          </a:bodyPr>
-          <a:lstStyle/>
-          <a:p>
-            <a:pPr algn="ctr"/>
-            <a:r>
-              <a:rPr lang="en-US" sz="2000" dirty="0">
-                <a:solidFill>
-                  <a:schemeClr val="tx1"/>
-                </a:solidFill>
-                <a:latin typeface="Calibri Light" panose="020F0302020204030204" pitchFamily="34" charset="0"/>
-                <a:cs typeface="Arial" panose="020B0604020202020204" pitchFamily="34" charset="0"/>
-              </a:rPr>
-              <a:t>JSON / REST</a:t>
-            </a:r>
-          </a:p>
-        </p:txBody>
-      </p:sp>
-      <p:sp>
-        <p:nvSpPr>
-          <p:cNvPr id="44" name="Текстово поле 43"/>
-          <p:cNvSpPr txBox="1"/>
-          <p:nvPr/>
-        </p:nvSpPr>
-        <p:spPr>
-          <a:xfrm>
-            <a:off x="6032925" y="5387889"/>
-            <a:ext cx="2186609" cy="400110"/>
-          </a:xfrm>
-          <a:prstGeom prst="rect">
-            <a:avLst/>
-          </a:prstGeom>
-          <a:noFill/>
-        </p:spPr>
-        <p:txBody>
-          <a:bodyPr wrap="square" rtlCol="0" anchor="ctr">
-            <a:spAutoFit/>
-          </a:bodyPr>
-          <a:lstStyle/>
-          <a:p>
-            <a:pPr algn="ctr"/>
-            <a:r>
-              <a:rPr lang="en-US" sz="2000" dirty="0">
-                <a:latin typeface="Calibri Light" panose="020F0302020204030204" pitchFamily="34" charset="0"/>
-                <a:cs typeface="Arial" panose="020B0604020202020204" pitchFamily="34" charset="0"/>
-              </a:rPr>
-              <a:t>JDBC, Hibernate</a:t>
-            </a:r>
-            <a:endParaRPr lang="en-US" sz="2000" dirty="0">
-              <a:solidFill>
-                <a:schemeClr val="tx1"/>
-              </a:solidFill>
-              <a:latin typeface="Calibri Light" panose="020F0302020204030204" pitchFamily="34" charset="0"/>
-              <a:cs typeface="Arial" panose="020B0604020202020204" pitchFamily="34" charset="0"/>
-            </a:endParaRPr>
-          </a:p>
-        </p:txBody>
-      </p:sp>
-      <p:cxnSp>
-        <p:nvCxnSpPr>
-          <p:cNvPr id="13" name="Straight Arrow Connector 12"/>
-          <p:cNvCxnSpPr>
-            <a:stCxn id="4" idx="2"/>
-            <a:endCxn id="5" idx="1"/>
-          </p:cNvCxnSpPr>
-          <p:nvPr/>
-        </p:nvCxnSpPr>
-        <p:spPr bwMode="auto">
-          <a:xfrm>
-            <a:off x="1539155" y="3593854"/>
-            <a:ext cx="3496544" cy="1252727"/>
-          </a:xfrm>
-          <a:prstGeom prst="straightConnector1">
-            <a:avLst/>
-          </a:prstGeom>
-          <a:ln w="19050">
-            <a:solidFill>
-              <a:schemeClr val="tx1"/>
-            </a:solidFill>
-            <a:headEnd type="triangle"/>
-            <a:tailEnd type="triangle"/>
-          </a:ln>
-        </p:spPr>
-        <p:style>
-          <a:lnRef idx="1">
-            <a:schemeClr val="accent1"/>
-          </a:lnRef>
-          <a:fillRef idx="0">
-            <a:schemeClr val="accent1"/>
-          </a:fillRef>
-          <a:effectRef idx="0">
-            <a:schemeClr val="accent1"/>
-          </a:effectRef>
-          <a:fontRef idx="minor">
-            <a:schemeClr val="tx1"/>
-          </a:fontRef>
-        </p:style>
-      </p:cxnSp>
-      <p:sp>
-        <p:nvSpPr>
-          <p:cNvPr id="25" name="Текстово поле 39"/>
-          <p:cNvSpPr txBox="1"/>
-          <p:nvPr/>
-        </p:nvSpPr>
-        <p:spPr>
-          <a:xfrm>
-            <a:off x="2403969" y="3723762"/>
-            <a:ext cx="2186609" cy="400110"/>
-          </a:xfrm>
-          <a:prstGeom prst="rect">
-            <a:avLst/>
-          </a:prstGeom>
-          <a:noFill/>
-        </p:spPr>
-        <p:txBody>
-          <a:bodyPr wrap="square" rtlCol="0" anchor="ctr">
-            <a:spAutoFit/>
-          </a:bodyPr>
-          <a:lstStyle/>
-          <a:p>
-            <a:pPr algn="ctr"/>
-            <a:r>
-              <a:rPr lang="en-US" sz="2000" dirty="0">
-                <a:solidFill>
-                  <a:schemeClr val="tx1"/>
-                </a:solidFill>
-                <a:latin typeface="Calibri Light" panose="020F0302020204030204" pitchFamily="34" charset="0"/>
-                <a:cs typeface="Arial" panose="020B0604020202020204" pitchFamily="34" charset="0"/>
-              </a:rPr>
-              <a:t>JSON / REST</a:t>
-            </a:r>
-          </a:p>
-        </p:txBody>
-      </p:sp>
-    </p:spTree>
-    <p:extLst>
-      <p:ext uri="{BB962C8B-B14F-4D97-AF65-F5344CB8AC3E}">
-        <p14:creationId xmlns:p14="http://schemas.microsoft.com/office/powerpoint/2010/main" val="67122437"/>
-      </p:ext>
-    </p:extLst>
-  </p:cSld>
-  <p:clrMapOvr>
-    <a:masterClrMapping/>
-  </p:clrMapOvr>
-</p:sld>
-</file>
-
-<file path=ppt/slides/slide5.xml><?xml version="1.0" encoding="utf-8"?>
-<p:sld xmlns:a="http://schemas.openxmlformats.org/drawingml/2006/main" xmlns:r="http://schemas.openxmlformats.org/officeDocument/2006/relationships" xmlns:p="http://schemas.openxmlformats.org/presentationml/2006/main">
-  <p:cSld>
-    <p:spTree>
-      <p:nvGrpSpPr>
-        <p:cNvPr id="1" name=""/>
-        <p:cNvGrpSpPr/>
-        <p:nvPr/>
-      </p:nvGrpSpPr>
-      <p:grpSpPr>
-        <a:xfrm>
-          <a:off x="0" y="0"/>
-          <a:ext cx="0" cy="0"/>
-          <a:chOff x="0" y="0"/>
-          <a:chExt cx="0" cy="0"/>
-        </a:xfrm>
-      </p:grpSpPr>
-      <p:sp>
-        <p:nvSpPr>
-          <p:cNvPr id="2" name="Titel 1"/>
-          <p:cNvSpPr>
-            <a:spLocks noGrp="1"/>
-          </p:cNvSpPr>
-          <p:nvPr>
-            <p:ph type="ctrTitle"/>
-          </p:nvPr>
-        </p:nvSpPr>
-        <p:spPr>
-          <a:xfrm>
-            <a:off x="384000" y="2487600"/>
-            <a:ext cx="11424000" cy="443198"/>
-          </a:xfrm>
-        </p:spPr>
-        <p:txBody>
-          <a:bodyPr/>
-          <a:lstStyle/>
-          <a:p>
-            <a:r>
-              <a:rPr lang="en-US" dirty="0"/>
-              <a:t>Frontend </a:t>
-            </a:r>
-          </a:p>
-        </p:txBody>
-      </p:sp>
-    </p:spTree>
-    <p:extLst>
-      <p:ext uri="{BB962C8B-B14F-4D97-AF65-F5344CB8AC3E}">
-        <p14:creationId xmlns:p14="http://schemas.microsoft.com/office/powerpoint/2010/main" val="3084618864"/>
-      </p:ext>
-    </p:extLst>
-  </p:cSld>
-  <p:clrMapOvr>
-    <a:masterClrMapping/>
-  </p:clrMapOvr>
-</p:sld>
-</file>
-
-<file path=ppt/slides/slide6.xml><?xml version="1.0" encoding="utf-8"?>
-<p:sld xmlns:a="http://schemas.openxmlformats.org/drawingml/2006/main" xmlns:r="http://schemas.openxmlformats.org/officeDocument/2006/relationships" xmlns:p="http://schemas.openxmlformats.org/presentationml/2006/main">
-  <p:cSld>
-    <p:spTree>
-      <p:nvGrpSpPr>
-        <p:cNvPr id="1" name=""/>
-        <p:cNvGrpSpPr/>
-        <p:nvPr/>
-      </p:nvGrpSpPr>
-      <p:grpSpPr>
-        <a:xfrm>
-          <a:off x="0" y="0"/>
-          <a:ext cx="0" cy="0"/>
-          <a:chOff x="0" y="0"/>
-          <a:chExt cx="0" cy="0"/>
-        </a:xfrm>
-      </p:grpSpPr>
-      <p:sp>
-        <p:nvSpPr>
-          <p:cNvPr id="2" name="Titel 1"/>
-          <p:cNvSpPr>
-            <a:spLocks noGrp="1"/>
-          </p:cNvSpPr>
-          <p:nvPr>
-            <p:ph type="ctrTitle"/>
-          </p:nvPr>
-        </p:nvSpPr>
-        <p:spPr>
-          <a:xfrm>
-            <a:off x="384000" y="2487600"/>
-            <a:ext cx="11424000" cy="443198"/>
-          </a:xfrm>
-        </p:spPr>
-        <p:txBody>
-          <a:bodyPr/>
-          <a:lstStyle/>
-          <a:p>
-            <a:r>
-              <a:rPr lang="en-US" dirty="0"/>
-              <a:t>API</a:t>
-            </a:r>
-          </a:p>
-        </p:txBody>
-      </p:sp>
-    </p:spTree>
-    <p:extLst>
-      <p:ext uri="{BB962C8B-B14F-4D97-AF65-F5344CB8AC3E}">
-        <p14:creationId xmlns:p14="http://schemas.microsoft.com/office/powerpoint/2010/main" val="3301941064"/>
-      </p:ext>
-    </p:extLst>
-  </p:cSld>
-  <p:clrMapOvr>
-    <a:masterClrMapping/>
-  </p:clrMapOvr>
-</p:sld>
-</file>
-
-<file path=ppt/slides/slide7.xml><?xml version="1.0" encoding="utf-8"?>
-<p:sld xmlns:a="http://schemas.openxmlformats.org/drawingml/2006/main" xmlns:r="http://schemas.openxmlformats.org/officeDocument/2006/relationships" xmlns:p="http://schemas.openxmlformats.org/presentationml/2006/main">
-  <p:cSld>
-    <p:spTree>
-      <p:nvGrpSpPr>
-        <p:cNvPr id="1" name=""/>
-        <p:cNvGrpSpPr/>
-        <p:nvPr/>
-      </p:nvGrpSpPr>
-      <p:grpSpPr>
-        <a:xfrm>
-          <a:off x="0" y="0"/>
-          <a:ext cx="0" cy="0"/>
-          <a:chOff x="0" y="0"/>
-          <a:chExt cx="0" cy="0"/>
-        </a:xfrm>
-      </p:grpSpPr>
-      <p:sp>
-        <p:nvSpPr>
-          <p:cNvPr id="2" name="Titel 1"/>
-          <p:cNvSpPr>
-            <a:spLocks noGrp="1"/>
-          </p:cNvSpPr>
-          <p:nvPr>
-            <p:ph type="ctrTitle"/>
-          </p:nvPr>
-        </p:nvSpPr>
-        <p:spPr>
-          <a:xfrm>
-            <a:off x="384000" y="2487600"/>
-            <a:ext cx="11424000" cy="443198"/>
-          </a:xfrm>
-        </p:spPr>
-        <p:txBody>
-          <a:bodyPr/>
-          <a:lstStyle/>
-          <a:p>
-            <a:r>
-              <a:rPr lang="en-US" dirty="0"/>
-              <a:t>Backend (+ </a:t>
-            </a:r>
-            <a:r>
-              <a:rPr lang="en-US" dirty="0" err="1"/>
-              <a:t>Datenbank</a:t>
-            </a:r>
-            <a:r>
-              <a:rPr lang="en-US" dirty="0"/>
-              <a:t>)</a:t>
-            </a:r>
-          </a:p>
-        </p:txBody>
-      </p:sp>
-    </p:spTree>
-    <p:extLst>
-      <p:ext uri="{BB962C8B-B14F-4D97-AF65-F5344CB8AC3E}">
-        <p14:creationId xmlns:p14="http://schemas.microsoft.com/office/powerpoint/2010/main" val="3331473797"/>
-      </p:ext>
-    </p:extLst>
-  </p:cSld>
-  <p:clrMapOvr>
-    <a:masterClrMapping/>
-  </p:clrMapOvr>
-</p:sld>
-</file>
-
-<file path=ppt/slides/slide8.xml><?xml version="1.0" encoding="utf-8"?>
-<p:sld xmlns:a="http://schemas.openxmlformats.org/drawingml/2006/main" xmlns:r="http://schemas.openxmlformats.org/officeDocument/2006/relationships" xmlns:p="http://schemas.openxmlformats.org/presentationml/2006/main">
-  <p:cSld>
-    <p:spTree>
-      <p:nvGrpSpPr>
-        <p:cNvPr id="1" name=""/>
-        <p:cNvGrpSpPr/>
-        <p:nvPr/>
-      </p:nvGrpSpPr>
-      <p:grpSpPr>
-        <a:xfrm>
-          <a:off x="0" y="0"/>
-          <a:ext cx="0" cy="0"/>
-          <a:chOff x="0" y="0"/>
-          <a:chExt cx="0" cy="0"/>
-        </a:xfrm>
-      </p:grpSpPr>
-      <p:sp>
-        <p:nvSpPr>
-          <p:cNvPr id="5" name="Title 4"/>
-          <p:cNvSpPr>
-            <a:spLocks noGrp="1"/>
-          </p:cNvSpPr>
-          <p:nvPr>
-            <p:ph type="title"/>
-          </p:nvPr>
-        </p:nvSpPr>
-        <p:spPr/>
-        <p:txBody>
-          <a:bodyPr/>
-          <a:lstStyle/>
-          <a:p>
-            <a:r>
-              <a:rPr lang="en-US" dirty="0"/>
-              <a:t>Backend Microservices </a:t>
-            </a:r>
-          </a:p>
-        </p:txBody>
-      </p:sp>
-      <p:sp>
-        <p:nvSpPr>
-          <p:cNvPr id="6" name="Content Placeholder 5"/>
-          <p:cNvSpPr>
-            <a:spLocks noGrp="1"/>
-          </p:cNvSpPr>
-          <p:nvPr>
-            <p:ph sz="quarter" idx="12"/>
-          </p:nvPr>
-        </p:nvSpPr>
-        <p:spPr/>
-        <p:txBody>
-          <a:bodyPr/>
-          <a:lstStyle/>
-          <a:p>
-            <a:pPr lvl="1"/>
-            <a:r>
-              <a:rPr lang="en-US" b="1" dirty="0"/>
-              <a:t>Importer:</a:t>
-            </a:r>
-          </a:p>
-          <a:p>
-            <a:pPr lvl="2"/>
-            <a:r>
-              <a:rPr lang="en-US" dirty="0"/>
-              <a:t>RESTful </a:t>
-            </a:r>
-            <a:r>
-              <a:rPr lang="en-US" dirty="0" err="1"/>
-              <a:t>Schnittstellen</a:t>
-            </a:r>
-            <a:r>
-              <a:rPr lang="en-US" dirty="0"/>
-              <a:t> </a:t>
-            </a:r>
-            <a:r>
-              <a:rPr lang="en-US" dirty="0" err="1"/>
-              <a:t>für</a:t>
-            </a:r>
-            <a:r>
-              <a:rPr lang="en-US" dirty="0"/>
-              <a:t> Import, Update, Delete von Tests</a:t>
-            </a:r>
-          </a:p>
-          <a:p>
-            <a:pPr lvl="2"/>
-            <a:endParaRPr lang="en-US" dirty="0"/>
-          </a:p>
-          <a:p>
-            <a:pPr lvl="1"/>
-            <a:r>
-              <a:rPr lang="en-US" b="1" dirty="0"/>
-              <a:t>Exporter:</a:t>
-            </a:r>
-          </a:p>
-          <a:p>
-            <a:pPr lvl="2"/>
-            <a:r>
-              <a:rPr lang="en-US" dirty="0"/>
-              <a:t>RESTful </a:t>
-            </a:r>
-            <a:r>
-              <a:rPr lang="en-US" dirty="0" err="1"/>
-              <a:t>Schnistellen</a:t>
-            </a:r>
-            <a:r>
-              <a:rPr lang="en-US" dirty="0"/>
-              <a:t> Export von Tests</a:t>
-            </a:r>
-          </a:p>
-          <a:p>
-            <a:pPr lvl="1"/>
-            <a:endParaRPr lang="en-US" dirty="0"/>
-          </a:p>
-          <a:p>
-            <a:pPr lvl="1"/>
-            <a:r>
-              <a:rPr lang="en-US" b="1" dirty="0"/>
-              <a:t>Database API: </a:t>
-            </a:r>
-          </a:p>
-          <a:p>
-            <a:pPr lvl="2"/>
-            <a:r>
-              <a:rPr lang="en-US" dirty="0"/>
-              <a:t>RESTful </a:t>
-            </a:r>
-            <a:r>
-              <a:rPr lang="en-US" dirty="0" err="1"/>
-              <a:t>Schnittstellen</a:t>
-            </a:r>
-            <a:r>
-              <a:rPr lang="en-US" dirty="0"/>
-              <a:t> </a:t>
-            </a:r>
-            <a:r>
-              <a:rPr lang="en-US" dirty="0" err="1"/>
-              <a:t>für</a:t>
-            </a:r>
-            <a:r>
-              <a:rPr lang="en-US" dirty="0"/>
-              <a:t> </a:t>
-            </a:r>
-            <a:r>
-              <a:rPr lang="en-US" dirty="0" err="1"/>
-              <a:t>Speichern</a:t>
-            </a:r>
-            <a:r>
-              <a:rPr lang="en-US" dirty="0"/>
-              <a:t> und </a:t>
-            </a:r>
-            <a:r>
-              <a:rPr lang="en-US" dirty="0" err="1"/>
-              <a:t>Lesen</a:t>
-            </a:r>
-            <a:r>
-              <a:rPr lang="en-US" dirty="0"/>
-              <a:t> von Tests in MySQL </a:t>
-            </a:r>
-            <a:r>
-              <a:rPr lang="en-US" dirty="0" err="1"/>
-              <a:t>Datenbank</a:t>
-            </a:r>
-            <a:endParaRPr lang="en-US" dirty="0"/>
-          </a:p>
-          <a:p>
-            <a:pPr lvl="2"/>
-            <a:endParaRPr lang="en-US" dirty="0"/>
-          </a:p>
-          <a:p>
-            <a:pPr lvl="1"/>
-            <a:r>
-              <a:rPr lang="en-US" b="1" dirty="0"/>
-              <a:t>Swagger </a:t>
-            </a:r>
-            <a:r>
-              <a:rPr lang="en-US" b="1" dirty="0" err="1"/>
-              <a:t>Dokumentation</a:t>
-            </a:r>
-            <a:endParaRPr lang="en-US" b="1" dirty="0"/>
-          </a:p>
-        </p:txBody>
-      </p:sp>
-      <p:sp>
-        <p:nvSpPr>
-          <p:cNvPr id="3" name="Footer Placeholder 2"/>
-          <p:cNvSpPr>
-            <a:spLocks noGrp="1"/>
-          </p:cNvSpPr>
-          <p:nvPr>
-            <p:ph type="ftr" sz="quarter" idx="13"/>
-          </p:nvPr>
-        </p:nvSpPr>
-        <p:spPr/>
-        <p:txBody>
-          <a:bodyPr/>
-          <a:lstStyle/>
-          <a:p>
-            <a:endParaRPr lang="de-DE" dirty="0"/>
-          </a:p>
-        </p:txBody>
-      </p:sp>
-      <p:sp>
-        <p:nvSpPr>
-          <p:cNvPr id="4" name="Slide Number Placeholder 3"/>
-          <p:cNvSpPr>
-            <a:spLocks noGrp="1"/>
-          </p:cNvSpPr>
-          <p:nvPr>
-            <p:ph type="sldNum" sz="quarter" idx="14"/>
-          </p:nvPr>
-        </p:nvSpPr>
-        <p:spPr/>
-        <p:txBody>
-          <a:bodyPr/>
-          <a:lstStyle/>
-          <a:p>
-            <a:fld id="{4506F84E-75D2-4715-B6C6-C971E49CE21A}" type="slidenum">
-              <a:rPr lang="de-DE" smtClean="0"/>
-              <a:pPr/>
-              <a:t>8</a:t>
-            </a:fld>
-            <a:endParaRPr lang="de-DE" dirty="0"/>
-          </a:p>
-        </p:txBody>
-      </p:sp>
-    </p:spTree>
-    <p:extLst>
-      <p:ext uri="{BB962C8B-B14F-4D97-AF65-F5344CB8AC3E}">
-        <p14:creationId xmlns:p14="http://schemas.microsoft.com/office/powerpoint/2010/main" val="361520676"/>
-      </p:ext>
-    </p:extLst>
-  </p:cSld>
-  <p:clrMapOvr>
-    <a:masterClrMapping/>
-  </p:clrMapOvr>
-</p:sld>
-</file>
-
-<file path=ppt/slides/slide9.xml><?xml version="1.0" encoding="utf-8"?>
-<p:sld xmlns:a="http://schemas.openxmlformats.org/drawingml/2006/main" xmlns:r="http://schemas.openxmlformats.org/officeDocument/2006/relationships" xmlns:p="http://schemas.openxmlformats.org/presentationml/2006/main">
-  <p:cSld>
-    <p:spTree>
-      <p:nvGrpSpPr>
-        <p:cNvPr id="1" name=""/>
-        <p:cNvGrpSpPr/>
-        <p:nvPr/>
-      </p:nvGrpSpPr>
-      <p:grpSpPr>
-        <a:xfrm>
-          <a:off x="0" y="0"/>
-          <a:ext cx="0" cy="0"/>
-          <a:chOff x="0" y="0"/>
-          <a:chExt cx="0" cy="0"/>
-        </a:xfrm>
-      </p:grpSpPr>
-      <p:sp>
-        <p:nvSpPr>
-          <p:cNvPr id="2" name="Title 1"/>
-          <p:cNvSpPr>
-            <a:spLocks noGrp="1"/>
-          </p:cNvSpPr>
-          <p:nvPr>
-            <p:ph type="title"/>
-          </p:nvPr>
-        </p:nvSpPr>
-        <p:spPr/>
-        <p:txBody>
-          <a:bodyPr/>
-          <a:lstStyle/>
-          <a:p>
-            <a:r>
-              <a:rPr lang="en-US" dirty="0" err="1"/>
-              <a:t>Datenmodell</a:t>
-            </a:r>
-            <a:r>
-              <a:rPr lang="en-US" dirty="0"/>
-              <a:t> </a:t>
-            </a:r>
-            <a:endParaRPr lang="bg-BG" dirty="0"/>
-          </a:p>
-        </p:txBody>
-      </p:sp>
-      <p:sp>
-        <p:nvSpPr>
-          <p:cNvPr id="4" name="Footer Placeholder 3"/>
-          <p:cNvSpPr>
-            <a:spLocks noGrp="1"/>
-          </p:cNvSpPr>
-          <p:nvPr>
-            <p:ph type="ftr" sz="quarter" idx="13"/>
-          </p:nvPr>
-        </p:nvSpPr>
-        <p:spPr/>
-        <p:txBody>
-          <a:bodyPr/>
-          <a:lstStyle/>
-          <a:p>
-            <a:pPr algn="l"/>
-            <a:endParaRPr lang="de-DE" dirty="0"/>
-          </a:p>
-        </p:txBody>
-      </p:sp>
-      <p:sp>
-        <p:nvSpPr>
-          <p:cNvPr id="5" name="Slide Number Placeholder 4"/>
-          <p:cNvSpPr>
-            <a:spLocks noGrp="1"/>
-          </p:cNvSpPr>
-          <p:nvPr>
-            <p:ph type="sldNum" sz="quarter" idx="14"/>
-          </p:nvPr>
-        </p:nvSpPr>
-        <p:spPr/>
-        <p:txBody>
-          <a:bodyPr/>
-          <a:lstStyle/>
-          <a:p>
-            <a:fld id="{4506F84E-75D2-4715-B6C6-C971E49CE21A}" type="slidenum">
-              <a:rPr lang="de-DE" smtClean="0"/>
-              <a:pPr/>
-              <a:t>9</a:t>
             </a:fld>
             <a:endParaRPr lang="de-DE" dirty="0"/>
           </a:p>
@@ -7342,6 +5420,2309 @@
     <p:extLst>
       <p:ext uri="{BB962C8B-B14F-4D97-AF65-F5344CB8AC3E}">
         <p14:creationId xmlns:p14="http://schemas.microsoft.com/office/powerpoint/2010/main" val="4228497296"/>
+      </p:ext>
+    </p:extLst>
+  </p:cSld>
+  <p:clrMapOvr>
+    <a:masterClrMapping/>
+  </p:clrMapOvr>
+</p:sld>
+</file>
+
+<file path=ppt/slides/slide12.xml><?xml version="1.0" encoding="utf-8"?>
+<p:sld xmlns:a="http://schemas.openxmlformats.org/drawingml/2006/main" xmlns:r="http://schemas.openxmlformats.org/officeDocument/2006/relationships" xmlns:p="http://schemas.openxmlformats.org/presentationml/2006/main">
+  <p:cSld>
+    <p:spTree>
+      <p:nvGrpSpPr>
+        <p:cNvPr id="1" name=""/>
+        <p:cNvGrpSpPr/>
+        <p:nvPr/>
+      </p:nvGrpSpPr>
+      <p:grpSpPr>
+        <a:xfrm>
+          <a:off x="0" y="0"/>
+          <a:ext cx="0" cy="0"/>
+          <a:chOff x="0" y="0"/>
+          <a:chExt cx="0" cy="0"/>
+        </a:xfrm>
+      </p:grpSpPr>
+      <p:sp>
+        <p:nvSpPr>
+          <p:cNvPr id="2" name="Titel 1"/>
+          <p:cNvSpPr>
+            <a:spLocks noGrp="1"/>
+          </p:cNvSpPr>
+          <p:nvPr>
+            <p:ph type="ctrTitle"/>
+          </p:nvPr>
+        </p:nvSpPr>
+        <p:spPr>
+          <a:xfrm>
+            <a:off x="384000" y="2487600"/>
+            <a:ext cx="11424000" cy="443198"/>
+          </a:xfrm>
+        </p:spPr>
+        <p:txBody>
+          <a:bodyPr/>
+          <a:lstStyle/>
+          <a:p>
+            <a:r>
+              <a:rPr lang="en-US" dirty="0"/>
+              <a:t>Features </a:t>
+            </a:r>
+            <a:r>
+              <a:rPr lang="en-US" dirty="0" err="1"/>
+              <a:t>für</a:t>
+            </a:r>
+            <a:r>
+              <a:rPr lang="en-US" dirty="0"/>
+              <a:t> Beta Version</a:t>
+            </a:r>
+          </a:p>
+        </p:txBody>
+      </p:sp>
+    </p:spTree>
+    <p:extLst>
+      <p:ext uri="{BB962C8B-B14F-4D97-AF65-F5344CB8AC3E}">
+        <p14:creationId xmlns:p14="http://schemas.microsoft.com/office/powerpoint/2010/main" val="4250935669"/>
+      </p:ext>
+    </p:extLst>
+  </p:cSld>
+  <p:clrMapOvr>
+    <a:masterClrMapping/>
+  </p:clrMapOvr>
+</p:sld>
+</file>
+
+<file path=ppt/slides/slide13.xml><?xml version="1.0" encoding="utf-8"?>
+<p:sld xmlns:a="http://schemas.openxmlformats.org/drawingml/2006/main" xmlns:r="http://schemas.openxmlformats.org/officeDocument/2006/relationships" xmlns:p="http://schemas.openxmlformats.org/presentationml/2006/main">
+  <p:cSld>
+    <p:spTree>
+      <p:nvGrpSpPr>
+        <p:cNvPr id="1" name=""/>
+        <p:cNvGrpSpPr/>
+        <p:nvPr/>
+      </p:nvGrpSpPr>
+      <p:grpSpPr>
+        <a:xfrm>
+          <a:off x="0" y="0"/>
+          <a:ext cx="0" cy="0"/>
+          <a:chOff x="0" y="0"/>
+          <a:chExt cx="0" cy="0"/>
+        </a:xfrm>
+      </p:grpSpPr>
+      <p:sp>
+        <p:nvSpPr>
+          <p:cNvPr id="5" name="Title 4"/>
+          <p:cNvSpPr>
+            <a:spLocks noGrp="1"/>
+          </p:cNvSpPr>
+          <p:nvPr>
+            <p:ph type="title"/>
+          </p:nvPr>
+        </p:nvSpPr>
+        <p:spPr/>
+        <p:txBody>
+          <a:bodyPr/>
+          <a:lstStyle/>
+          <a:p>
+            <a:r>
+              <a:rPr lang="en-US" dirty="0" err="1"/>
+              <a:t>Plänne</a:t>
+            </a:r>
+            <a:r>
+              <a:rPr lang="en-US" dirty="0"/>
+              <a:t> </a:t>
+            </a:r>
+            <a:r>
+              <a:rPr lang="en-US" dirty="0" err="1"/>
+              <a:t>für</a:t>
+            </a:r>
+            <a:r>
+              <a:rPr lang="en-US" dirty="0"/>
+              <a:t> Beta Version</a:t>
+            </a:r>
+          </a:p>
+        </p:txBody>
+      </p:sp>
+      <p:sp>
+        <p:nvSpPr>
+          <p:cNvPr id="6" name="Content Placeholder 5"/>
+          <p:cNvSpPr>
+            <a:spLocks noGrp="1"/>
+          </p:cNvSpPr>
+          <p:nvPr>
+            <p:ph sz="quarter" idx="12"/>
+          </p:nvPr>
+        </p:nvSpPr>
+        <p:spPr/>
+        <p:txBody>
+          <a:bodyPr/>
+          <a:lstStyle/>
+          <a:p>
+            <a:pPr lvl="1"/>
+            <a:r>
+              <a:rPr lang="en-US" b="1" dirty="0"/>
+              <a:t>Jenkins Integration</a:t>
+            </a:r>
+            <a:endParaRPr lang="en-US" dirty="0"/>
+          </a:p>
+          <a:p>
+            <a:pPr lvl="1"/>
+            <a:r>
+              <a:rPr lang="en-US" b="1" dirty="0" err="1"/>
+              <a:t>Sicherheit</a:t>
+            </a:r>
+            <a:r>
+              <a:rPr lang="en-US" b="1" dirty="0"/>
+              <a:t>: </a:t>
+            </a:r>
+            <a:r>
+              <a:rPr lang="en-US" dirty="0"/>
+              <a:t>Authentication, Session Management, Token Generation, etc. </a:t>
+            </a:r>
+          </a:p>
+          <a:p>
+            <a:pPr lvl="1"/>
+            <a:r>
+              <a:rPr lang="en-US" b="1" dirty="0"/>
+              <a:t>Import von CSV </a:t>
+            </a:r>
+            <a:r>
+              <a:rPr lang="en-US" b="1" dirty="0" err="1"/>
+              <a:t>Datei</a:t>
+            </a:r>
+            <a:r>
+              <a:rPr lang="en-US" b="1" dirty="0"/>
+              <a:t> von Links (</a:t>
+            </a:r>
+            <a:r>
+              <a:rPr lang="en-US" b="1" dirty="0" err="1"/>
+              <a:t>z.B</a:t>
+            </a:r>
+            <a:r>
+              <a:rPr lang="en-US" b="1" dirty="0"/>
+              <a:t>. </a:t>
+            </a:r>
+            <a:r>
+              <a:rPr lang="en-US" b="1" dirty="0" err="1"/>
+              <a:t>Git</a:t>
+            </a:r>
+            <a:r>
+              <a:rPr lang="en-US" b="1" dirty="0"/>
+              <a:t>) </a:t>
+            </a:r>
+          </a:p>
+          <a:p>
+            <a:pPr lvl="1"/>
+            <a:r>
+              <a:rPr lang="en-US" b="1" dirty="0"/>
+              <a:t>Export von </a:t>
+            </a:r>
+            <a:r>
+              <a:rPr lang="en-US" b="1" dirty="0" err="1"/>
+              <a:t>Testdaten</a:t>
+            </a:r>
+            <a:r>
+              <a:rPr lang="en-US" b="1" dirty="0"/>
+              <a:t> in CSV </a:t>
+            </a:r>
+            <a:r>
+              <a:rPr lang="en-US" b="1" dirty="0" err="1"/>
+              <a:t>Dateien</a:t>
+            </a:r>
+            <a:r>
+              <a:rPr lang="en-US" b="1" dirty="0"/>
+              <a:t> </a:t>
+            </a:r>
+          </a:p>
+          <a:p>
+            <a:pPr lvl="1"/>
+            <a:r>
+              <a:rPr lang="en-US" b="1" dirty="0"/>
+              <a:t>Data Consistency und Concurrency </a:t>
+            </a:r>
+          </a:p>
+          <a:p>
+            <a:pPr lvl="1"/>
+            <a:r>
+              <a:rPr lang="en-US" b="1" dirty="0" err="1"/>
+              <a:t>Elasticsearch</a:t>
+            </a:r>
+            <a:endParaRPr lang="en-US" b="1" dirty="0"/>
+          </a:p>
+        </p:txBody>
+      </p:sp>
+      <p:sp>
+        <p:nvSpPr>
+          <p:cNvPr id="3" name="Footer Placeholder 2"/>
+          <p:cNvSpPr>
+            <a:spLocks noGrp="1"/>
+          </p:cNvSpPr>
+          <p:nvPr>
+            <p:ph type="ftr" sz="quarter" idx="13"/>
+          </p:nvPr>
+        </p:nvSpPr>
+        <p:spPr/>
+        <p:txBody>
+          <a:bodyPr/>
+          <a:lstStyle/>
+          <a:p>
+            <a:endParaRPr lang="de-DE" dirty="0"/>
+          </a:p>
+        </p:txBody>
+      </p:sp>
+      <p:sp>
+        <p:nvSpPr>
+          <p:cNvPr id="4" name="Slide Number Placeholder 3"/>
+          <p:cNvSpPr>
+            <a:spLocks noGrp="1"/>
+          </p:cNvSpPr>
+          <p:nvPr>
+            <p:ph type="sldNum" sz="quarter" idx="14"/>
+          </p:nvPr>
+        </p:nvSpPr>
+        <p:spPr/>
+        <p:txBody>
+          <a:bodyPr/>
+          <a:lstStyle/>
+          <a:p>
+            <a:fld id="{4506F84E-75D2-4715-B6C6-C971E49CE21A}" type="slidenum">
+              <a:rPr lang="de-DE" smtClean="0"/>
+              <a:pPr/>
+              <a:t>13</a:t>
+            </a:fld>
+            <a:endParaRPr lang="de-DE" dirty="0"/>
+          </a:p>
+        </p:txBody>
+      </p:sp>
+    </p:spTree>
+    <p:extLst>
+      <p:ext uri="{BB962C8B-B14F-4D97-AF65-F5344CB8AC3E}">
+        <p14:creationId xmlns:p14="http://schemas.microsoft.com/office/powerpoint/2010/main" val="1912622530"/>
+      </p:ext>
+    </p:extLst>
+  </p:cSld>
+  <p:clrMapOvr>
+    <a:masterClrMapping/>
+  </p:clrMapOvr>
+</p:sld>
+</file>
+
+<file path=ppt/slides/slide14.xml><?xml version="1.0" encoding="utf-8"?>
+<p:sld xmlns:a="http://schemas.openxmlformats.org/drawingml/2006/main" xmlns:r="http://schemas.openxmlformats.org/officeDocument/2006/relationships" xmlns:p="http://schemas.openxmlformats.org/presentationml/2006/main">
+  <p:cSld>
+    <p:spTree>
+      <p:nvGrpSpPr>
+        <p:cNvPr id="1" name=""/>
+        <p:cNvGrpSpPr/>
+        <p:nvPr/>
+      </p:nvGrpSpPr>
+      <p:grpSpPr>
+        <a:xfrm>
+          <a:off x="0" y="0"/>
+          <a:ext cx="0" cy="0"/>
+          <a:chOff x="0" y="0"/>
+          <a:chExt cx="0" cy="0"/>
+        </a:xfrm>
+      </p:grpSpPr>
+      <p:sp>
+        <p:nvSpPr>
+          <p:cNvPr id="2" name="Titel 1"/>
+          <p:cNvSpPr>
+            <a:spLocks noGrp="1"/>
+          </p:cNvSpPr>
+          <p:nvPr>
+            <p:ph type="ctrTitle"/>
+          </p:nvPr>
+        </p:nvSpPr>
+        <p:spPr>
+          <a:xfrm>
+            <a:off x="384000" y="2487600"/>
+            <a:ext cx="11424000" cy="443198"/>
+          </a:xfrm>
+        </p:spPr>
+        <p:txBody>
+          <a:bodyPr/>
+          <a:lstStyle/>
+          <a:p>
+            <a:r>
+              <a:rPr lang="en-US" dirty="0" err="1"/>
+              <a:t>Danke</a:t>
+            </a:r>
+            <a:r>
+              <a:rPr lang="en-US" dirty="0"/>
+              <a:t> </a:t>
+            </a:r>
+            <a:r>
+              <a:rPr lang="en-US" dirty="0" err="1"/>
+              <a:t>für</a:t>
+            </a:r>
+            <a:r>
+              <a:rPr lang="en-US" dirty="0"/>
+              <a:t> die </a:t>
+            </a:r>
+            <a:r>
+              <a:rPr lang="en-US" dirty="0" err="1"/>
+              <a:t>Aufmerksamkeit</a:t>
+            </a:r>
+            <a:r>
+              <a:rPr lang="en-US"/>
+              <a:t>!</a:t>
+            </a:r>
+            <a:endParaRPr lang="en-US" dirty="0"/>
+          </a:p>
+        </p:txBody>
+      </p:sp>
+    </p:spTree>
+    <p:extLst>
+      <p:ext uri="{BB962C8B-B14F-4D97-AF65-F5344CB8AC3E}">
+        <p14:creationId xmlns:p14="http://schemas.microsoft.com/office/powerpoint/2010/main" val="3713188748"/>
+      </p:ext>
+    </p:extLst>
+  </p:cSld>
+  <p:clrMapOvr>
+    <a:masterClrMapping/>
+  </p:clrMapOvr>
+</p:sld>
+</file>
+
+<file path=ppt/slides/slide2.xml><?xml version="1.0" encoding="utf-8"?>
+<p:sld xmlns:a="http://schemas.openxmlformats.org/drawingml/2006/main" xmlns:r="http://schemas.openxmlformats.org/officeDocument/2006/relationships" xmlns:p="http://schemas.openxmlformats.org/presentationml/2006/main">
+  <p:cSld>
+    <p:spTree>
+      <p:nvGrpSpPr>
+        <p:cNvPr id="1" name=""/>
+        <p:cNvGrpSpPr/>
+        <p:nvPr/>
+      </p:nvGrpSpPr>
+      <p:grpSpPr>
+        <a:xfrm>
+          <a:off x="0" y="0"/>
+          <a:ext cx="0" cy="0"/>
+          <a:chOff x="0" y="0"/>
+          <a:chExt cx="0" cy="0"/>
+        </a:xfrm>
+      </p:grpSpPr>
+      <p:sp>
+        <p:nvSpPr>
+          <p:cNvPr id="2" name="Titel 1"/>
+          <p:cNvSpPr>
+            <a:spLocks noGrp="1"/>
+          </p:cNvSpPr>
+          <p:nvPr>
+            <p:ph type="ctrTitle"/>
+          </p:nvPr>
+        </p:nvSpPr>
+        <p:spPr>
+          <a:xfrm>
+            <a:off x="384000" y="2487600"/>
+            <a:ext cx="11424000" cy="443198"/>
+          </a:xfrm>
+        </p:spPr>
+        <p:txBody>
+          <a:bodyPr/>
+          <a:lstStyle/>
+          <a:p>
+            <a:r>
+              <a:rPr lang="en-US" dirty="0" err="1"/>
+              <a:t>Architektur</a:t>
+            </a:r>
+            <a:r>
+              <a:rPr lang="en-US" dirty="0"/>
+              <a:t> + </a:t>
+            </a:r>
+            <a:r>
+              <a:rPr lang="en-US" dirty="0" err="1"/>
+              <a:t>Technologien</a:t>
+            </a:r>
+            <a:endParaRPr lang="en-US" dirty="0"/>
+          </a:p>
+        </p:txBody>
+      </p:sp>
+    </p:spTree>
+    <p:extLst>
+      <p:ext uri="{BB962C8B-B14F-4D97-AF65-F5344CB8AC3E}">
+        <p14:creationId xmlns:p14="http://schemas.microsoft.com/office/powerpoint/2010/main" val="4293155205"/>
+      </p:ext>
+    </p:extLst>
+  </p:cSld>
+  <p:clrMapOvr>
+    <a:masterClrMapping/>
+  </p:clrMapOvr>
+</p:sld>
+</file>
+
+<file path=ppt/slides/slide3.xml><?xml version="1.0" encoding="utf-8"?>
+<p:sld xmlns:a="http://schemas.openxmlformats.org/drawingml/2006/main" xmlns:r="http://schemas.openxmlformats.org/officeDocument/2006/relationships" xmlns:p="http://schemas.openxmlformats.org/presentationml/2006/main">
+  <p:cSld>
+    <p:spTree>
+      <p:nvGrpSpPr>
+        <p:cNvPr id="1" name=""/>
+        <p:cNvGrpSpPr/>
+        <p:nvPr/>
+      </p:nvGrpSpPr>
+      <p:grpSpPr>
+        <a:xfrm>
+          <a:off x="0" y="0"/>
+          <a:ext cx="0" cy="0"/>
+          <a:chOff x="0" y="0"/>
+          <a:chExt cx="0" cy="0"/>
+        </a:xfrm>
+      </p:grpSpPr>
+      <p:sp>
+        <p:nvSpPr>
+          <p:cNvPr id="2" name="Title 1"/>
+          <p:cNvSpPr>
+            <a:spLocks noGrp="1"/>
+          </p:cNvSpPr>
+          <p:nvPr>
+            <p:ph type="title"/>
+          </p:nvPr>
+        </p:nvSpPr>
+        <p:spPr/>
+        <p:txBody>
+          <a:bodyPr/>
+          <a:lstStyle/>
+          <a:p>
+            <a:r>
+              <a:rPr lang="en-US" dirty="0" err="1"/>
+              <a:t>Technologien</a:t>
+            </a:r>
+            <a:endParaRPr lang="bg-BG" dirty="0"/>
+          </a:p>
+        </p:txBody>
+      </p:sp>
+      <p:sp>
+        <p:nvSpPr>
+          <p:cNvPr id="4" name="Footer Placeholder 3"/>
+          <p:cNvSpPr>
+            <a:spLocks noGrp="1"/>
+          </p:cNvSpPr>
+          <p:nvPr>
+            <p:ph type="ftr" sz="quarter" idx="13"/>
+          </p:nvPr>
+        </p:nvSpPr>
+        <p:spPr/>
+        <p:txBody>
+          <a:bodyPr/>
+          <a:lstStyle/>
+          <a:p>
+            <a:pPr algn="l"/>
+            <a:endParaRPr lang="de-DE" dirty="0"/>
+          </a:p>
+        </p:txBody>
+      </p:sp>
+      <p:sp>
+        <p:nvSpPr>
+          <p:cNvPr id="5" name="Slide Number Placeholder 4"/>
+          <p:cNvSpPr>
+            <a:spLocks noGrp="1"/>
+          </p:cNvSpPr>
+          <p:nvPr>
+            <p:ph type="sldNum" sz="quarter" idx="14"/>
+          </p:nvPr>
+        </p:nvSpPr>
+        <p:spPr/>
+        <p:txBody>
+          <a:bodyPr/>
+          <a:lstStyle/>
+          <a:p>
+            <a:fld id="{4506F84E-75D2-4715-B6C6-C971E49CE21A}" type="slidenum">
+              <a:rPr lang="de-DE" smtClean="0"/>
+              <a:pPr/>
+              <a:t>3</a:t>
+            </a:fld>
+            <a:endParaRPr lang="de-DE" dirty="0"/>
+          </a:p>
+        </p:txBody>
+      </p:sp>
+      <p:sp>
+        <p:nvSpPr>
+          <p:cNvPr id="6" name="Content Placeholder 5"/>
+          <p:cNvSpPr>
+            <a:spLocks noGrp="1"/>
+          </p:cNvSpPr>
+          <p:nvPr>
+            <p:ph sz="quarter" idx="12"/>
+          </p:nvPr>
+        </p:nvSpPr>
+        <p:spPr>
+          <a:xfrm>
+            <a:off x="383117" y="883577"/>
+            <a:ext cx="11425764" cy="5082249"/>
+          </a:xfrm>
+        </p:spPr>
+        <p:txBody>
+          <a:bodyPr/>
+          <a:lstStyle/>
+          <a:p>
+            <a:pPr lvl="1"/>
+            <a:r>
+              <a:rPr lang="en-US" b="1" dirty="0"/>
+              <a:t>Front-End:</a:t>
+            </a:r>
+          </a:p>
+          <a:p>
+            <a:pPr lvl="2"/>
+            <a:r>
+              <a:rPr lang="en-US" dirty="0"/>
+              <a:t>Angular.js und Node.js App</a:t>
+            </a:r>
+          </a:p>
+          <a:p>
+            <a:pPr lvl="2"/>
+            <a:r>
+              <a:rPr lang="en-US" dirty="0"/>
+              <a:t>Bootstrap</a:t>
+            </a:r>
+          </a:p>
+          <a:p>
+            <a:pPr lvl="1"/>
+            <a:r>
+              <a:rPr lang="en-US" b="1" dirty="0"/>
+              <a:t>API:</a:t>
+            </a:r>
+          </a:p>
+          <a:p>
+            <a:pPr lvl="2"/>
+            <a:r>
+              <a:rPr lang="en-US" dirty="0"/>
+              <a:t>Python(Flask)</a:t>
+            </a:r>
+          </a:p>
+          <a:p>
+            <a:pPr lvl="1"/>
+            <a:r>
+              <a:rPr lang="en-US" b="1" dirty="0"/>
+              <a:t>Backend: </a:t>
+            </a:r>
+          </a:p>
+          <a:p>
+            <a:pPr lvl="2"/>
+            <a:r>
+              <a:rPr lang="en-US" dirty="0"/>
+              <a:t>RESTful Spring Boot Microservices (Importer, Exporter, Database API)</a:t>
+            </a:r>
+          </a:p>
+          <a:p>
+            <a:pPr lvl="2"/>
+            <a:r>
+              <a:rPr lang="en-US" dirty="0"/>
+              <a:t>MySQL, Jackson, Hibernate, JDBC</a:t>
+            </a:r>
+          </a:p>
+          <a:p>
+            <a:pPr lvl="1"/>
+            <a:r>
+              <a:rPr lang="en-US" b="1" dirty="0"/>
+              <a:t> Communication: </a:t>
+            </a:r>
+            <a:r>
+              <a:rPr lang="en-US" dirty="0"/>
+              <a:t>JSON/REST</a:t>
+            </a:r>
+          </a:p>
+          <a:p>
+            <a:pPr lvl="1"/>
+            <a:r>
+              <a:rPr lang="en-US" b="1" dirty="0"/>
+              <a:t>Deployment: </a:t>
+            </a:r>
+            <a:r>
+              <a:rPr lang="en-US" dirty="0"/>
+              <a:t>Docker</a:t>
+            </a:r>
+            <a:endParaRPr lang="en-US" b="1" dirty="0"/>
+          </a:p>
+        </p:txBody>
+      </p:sp>
+    </p:spTree>
+    <p:extLst>
+      <p:ext uri="{BB962C8B-B14F-4D97-AF65-F5344CB8AC3E}">
+        <p14:creationId xmlns:p14="http://schemas.microsoft.com/office/powerpoint/2010/main" val="1232417916"/>
+      </p:ext>
+    </p:extLst>
+  </p:cSld>
+  <p:clrMapOvr>
+    <a:masterClrMapping/>
+  </p:clrMapOvr>
+</p:sld>
+</file>
+
+<file path=ppt/slides/slide4.xml><?xml version="1.0" encoding="utf-8"?>
+<p:sld xmlns:a="http://schemas.openxmlformats.org/drawingml/2006/main" xmlns:r="http://schemas.openxmlformats.org/officeDocument/2006/relationships" xmlns:p="http://schemas.openxmlformats.org/presentationml/2006/main">
+  <p:cSld>
+    <p:spTree>
+      <p:nvGrpSpPr>
+        <p:cNvPr id="1" name=""/>
+        <p:cNvGrpSpPr/>
+        <p:nvPr/>
+      </p:nvGrpSpPr>
+      <p:grpSpPr>
+        <a:xfrm>
+          <a:off x="0" y="0"/>
+          <a:ext cx="0" cy="0"/>
+          <a:chOff x="0" y="0"/>
+          <a:chExt cx="0" cy="0"/>
+        </a:xfrm>
+      </p:grpSpPr>
+      <p:sp>
+        <p:nvSpPr>
+          <p:cNvPr id="2" name="Правоъгълник 1"/>
+          <p:cNvSpPr/>
+          <p:nvPr/>
+        </p:nvSpPr>
+        <p:spPr bwMode="auto">
+          <a:xfrm>
+            <a:off x="5033402" y="95057"/>
+            <a:ext cx="2027582" cy="589564"/>
+          </a:xfrm>
+          <a:prstGeom prst="rect">
+            <a:avLst/>
+          </a:prstGeom>
+          <a:ln>
+            <a:headEnd/>
+            <a:tailEnd/>
+          </a:ln>
+        </p:spPr>
+        <p:style>
+          <a:lnRef idx="1">
+            <a:schemeClr val="accent6"/>
+          </a:lnRef>
+          <a:fillRef idx="2">
+            <a:schemeClr val="accent6"/>
+          </a:fillRef>
+          <a:effectRef idx="1">
+            <a:schemeClr val="accent6"/>
+          </a:effectRef>
+          <a:fontRef idx="minor">
+            <a:schemeClr val="dk1"/>
+          </a:fontRef>
+        </p:style>
+        <p:txBody>
+          <a:bodyPr rot="0" spcFirstLastPara="0" vertOverflow="overflow" horzOverflow="overflow" vert="horz" wrap="square" lIns="91440" tIns="45720" rIns="91440" bIns="45720" numCol="1" spcCol="0" rtlCol="0" fromWordArt="0" anchor="ctr" anchorCtr="0" forceAA="0" compatLnSpc="1">
+            <a:prstTxWarp prst="textNoShape">
+              <a:avLst/>
+            </a:prstTxWarp>
+            <a:noAutofit/>
+          </a:bodyPr>
+          <a:lstStyle/>
+          <a:p>
+            <a:pPr algn="ctr"/>
+            <a:r>
+              <a:rPr lang="en-US" sz="1600" dirty="0">
+                <a:solidFill>
+                  <a:schemeClr val="tx1"/>
+                </a:solidFill>
+                <a:latin typeface="Calibri Light" panose="020F0302020204030204" pitchFamily="34" charset="0"/>
+                <a:cs typeface="Arial" panose="020B0604020202020204" pitchFamily="34" charset="0"/>
+              </a:rPr>
+              <a:t>Front-End</a:t>
+            </a:r>
+          </a:p>
+          <a:p>
+            <a:pPr algn="ctr"/>
+            <a:r>
+              <a:rPr lang="en-US" sz="1600" dirty="0">
+                <a:solidFill>
+                  <a:schemeClr val="tx1"/>
+                </a:solidFill>
+                <a:latin typeface="Calibri Light" panose="020F0302020204030204" pitchFamily="34" charset="0"/>
+                <a:cs typeface="Arial" panose="020B0604020202020204" pitchFamily="34" charset="0"/>
+              </a:rPr>
+              <a:t>Angular </a:t>
+            </a:r>
+            <a:r>
+              <a:rPr lang="en-US" sz="1600" dirty="0" err="1">
+                <a:solidFill>
+                  <a:schemeClr val="tx1"/>
+                </a:solidFill>
+                <a:latin typeface="Calibri Light" panose="020F0302020204030204" pitchFamily="34" charset="0"/>
+                <a:cs typeface="Arial" panose="020B0604020202020204" pitchFamily="34" charset="0"/>
+              </a:rPr>
+              <a:t>Js</a:t>
+            </a:r>
+            <a:r>
+              <a:rPr lang="en-US" sz="1600" dirty="0">
+                <a:solidFill>
+                  <a:schemeClr val="tx1"/>
+                </a:solidFill>
+                <a:latin typeface="Calibri Light" panose="020F0302020204030204" pitchFamily="34" charset="0"/>
+                <a:cs typeface="Arial" panose="020B0604020202020204" pitchFamily="34" charset="0"/>
+              </a:rPr>
+              <a:t> 4.0</a:t>
+            </a:r>
+          </a:p>
+        </p:txBody>
+      </p:sp>
+      <p:sp>
+        <p:nvSpPr>
+          <p:cNvPr id="3" name="Правоъгълник 2"/>
+          <p:cNvSpPr/>
+          <p:nvPr/>
+        </p:nvSpPr>
+        <p:spPr bwMode="auto">
+          <a:xfrm>
+            <a:off x="5033402" y="1494897"/>
+            <a:ext cx="2027582" cy="589564"/>
+          </a:xfrm>
+          <a:prstGeom prst="rect">
+            <a:avLst/>
+          </a:prstGeom>
+          <a:ln>
+            <a:headEnd/>
+            <a:tailEnd/>
+          </a:ln>
+        </p:spPr>
+        <p:style>
+          <a:lnRef idx="1">
+            <a:schemeClr val="accent3"/>
+          </a:lnRef>
+          <a:fillRef idx="2">
+            <a:schemeClr val="accent3"/>
+          </a:fillRef>
+          <a:effectRef idx="1">
+            <a:schemeClr val="accent3"/>
+          </a:effectRef>
+          <a:fontRef idx="minor">
+            <a:schemeClr val="dk1"/>
+          </a:fontRef>
+        </p:style>
+        <p:txBody>
+          <a:bodyPr rot="0" spcFirstLastPara="0" vertOverflow="overflow" horzOverflow="overflow" vert="horz" wrap="square" lIns="91440" tIns="45720" rIns="91440" bIns="45720" numCol="1" spcCol="0" rtlCol="0" fromWordArt="0" anchor="ctr" anchorCtr="0" forceAA="0" compatLnSpc="1">
+            <a:prstTxWarp prst="textNoShape">
+              <a:avLst/>
+            </a:prstTxWarp>
+            <a:noAutofit/>
+          </a:bodyPr>
+          <a:lstStyle/>
+          <a:p>
+            <a:pPr algn="ctr"/>
+            <a:r>
+              <a:rPr lang="en-US" sz="1600" dirty="0">
+                <a:solidFill>
+                  <a:schemeClr val="tx1"/>
+                </a:solidFill>
+                <a:latin typeface="Calibri Light" panose="020F0302020204030204" pitchFamily="34" charset="0"/>
+                <a:cs typeface="Arial" panose="020B0604020202020204" pitchFamily="34" charset="0"/>
+              </a:rPr>
+              <a:t>API</a:t>
+            </a:r>
+          </a:p>
+          <a:p>
+            <a:pPr algn="ctr"/>
+            <a:r>
+              <a:rPr lang="en-US" sz="1600" dirty="0">
+                <a:solidFill>
+                  <a:schemeClr val="tx1"/>
+                </a:solidFill>
+                <a:latin typeface="Calibri Light" panose="020F0302020204030204" pitchFamily="34" charset="0"/>
+                <a:cs typeface="Arial" panose="020B0604020202020204" pitchFamily="34" charset="0"/>
+              </a:rPr>
+              <a:t>Python (Flask)</a:t>
+            </a:r>
+          </a:p>
+        </p:txBody>
+      </p:sp>
+      <p:sp>
+        <p:nvSpPr>
+          <p:cNvPr id="4" name="Правоъгълник 3"/>
+          <p:cNvSpPr/>
+          <p:nvPr/>
+        </p:nvSpPr>
+        <p:spPr bwMode="auto">
+          <a:xfrm>
+            <a:off x="525364" y="2858205"/>
+            <a:ext cx="2027582" cy="735649"/>
+          </a:xfrm>
+          <a:prstGeom prst="rect">
+            <a:avLst/>
+          </a:prstGeom>
+          <a:ln>
+            <a:headEnd/>
+            <a:tailEnd/>
+          </a:ln>
+        </p:spPr>
+        <p:style>
+          <a:lnRef idx="1">
+            <a:schemeClr val="accent4"/>
+          </a:lnRef>
+          <a:fillRef idx="2">
+            <a:schemeClr val="accent4"/>
+          </a:fillRef>
+          <a:effectRef idx="1">
+            <a:schemeClr val="accent4"/>
+          </a:effectRef>
+          <a:fontRef idx="minor">
+            <a:schemeClr val="dk1"/>
+          </a:fontRef>
+        </p:style>
+        <p:txBody>
+          <a:bodyPr rot="0" spcFirstLastPara="0" vertOverflow="overflow" horzOverflow="overflow" vert="horz" wrap="square" lIns="91440" tIns="45720" rIns="91440" bIns="45720" numCol="1" spcCol="0" rtlCol="0" fromWordArt="0" anchor="ctr" anchorCtr="0" forceAA="0" compatLnSpc="1">
+            <a:prstTxWarp prst="textNoShape">
+              <a:avLst/>
+            </a:prstTxWarp>
+            <a:noAutofit/>
+          </a:bodyPr>
+          <a:lstStyle/>
+          <a:p>
+            <a:pPr algn="ctr"/>
+            <a:r>
+              <a:rPr lang="en-US" sz="1600" dirty="0">
+                <a:solidFill>
+                  <a:schemeClr val="tx1"/>
+                </a:solidFill>
+                <a:latin typeface="Calibri Light" panose="020F0302020204030204" pitchFamily="34" charset="0"/>
+                <a:cs typeface="Arial" panose="020B0604020202020204" pitchFamily="34" charset="0"/>
+              </a:rPr>
+              <a:t>Exporter</a:t>
+            </a:r>
+          </a:p>
+          <a:p>
+            <a:pPr algn="ctr"/>
+            <a:r>
+              <a:rPr lang="en-US" sz="1600" dirty="0">
+                <a:solidFill>
+                  <a:schemeClr val="tx1"/>
+                </a:solidFill>
+                <a:latin typeface="Calibri Light" panose="020F0302020204030204" pitchFamily="34" charset="0"/>
+                <a:cs typeface="Arial" panose="020B0604020202020204" pitchFamily="34" charset="0"/>
+              </a:rPr>
+              <a:t>Spring Boot</a:t>
+            </a:r>
+          </a:p>
+          <a:p>
+            <a:pPr algn="ctr"/>
+            <a:r>
+              <a:rPr lang="en-US" sz="1600" dirty="0">
+                <a:solidFill>
+                  <a:schemeClr val="tx1"/>
+                </a:solidFill>
+                <a:latin typeface="Calibri Light" panose="020F0302020204030204" pitchFamily="34" charset="0"/>
+                <a:cs typeface="Arial" panose="020B0604020202020204" pitchFamily="34" charset="0"/>
+              </a:rPr>
+              <a:t>&lt;&lt;Micro-Service&gt;&gt;</a:t>
+            </a:r>
+          </a:p>
+        </p:txBody>
+      </p:sp>
+      <p:sp>
+        <p:nvSpPr>
+          <p:cNvPr id="5" name="Правоъгълник 4"/>
+          <p:cNvSpPr/>
+          <p:nvPr/>
+        </p:nvSpPr>
+        <p:spPr bwMode="auto">
+          <a:xfrm>
+            <a:off x="5035699" y="4478756"/>
+            <a:ext cx="2027582" cy="735649"/>
+          </a:xfrm>
+          <a:prstGeom prst="rect">
+            <a:avLst/>
+          </a:prstGeom>
+          <a:ln>
+            <a:headEnd/>
+            <a:tailEnd/>
+          </a:ln>
+        </p:spPr>
+        <p:style>
+          <a:lnRef idx="1">
+            <a:schemeClr val="accent4"/>
+          </a:lnRef>
+          <a:fillRef idx="2">
+            <a:schemeClr val="accent4"/>
+          </a:fillRef>
+          <a:effectRef idx="1">
+            <a:schemeClr val="accent4"/>
+          </a:effectRef>
+          <a:fontRef idx="minor">
+            <a:schemeClr val="dk1"/>
+          </a:fontRef>
+        </p:style>
+        <p:txBody>
+          <a:bodyPr rot="0" spcFirstLastPara="0" vertOverflow="overflow" horzOverflow="overflow" vert="horz" wrap="square" lIns="91440" tIns="45720" rIns="91440" bIns="45720" numCol="1" spcCol="0" rtlCol="0" fromWordArt="0" anchor="ctr" anchorCtr="0" forceAA="0" compatLnSpc="1">
+            <a:prstTxWarp prst="textNoShape">
+              <a:avLst/>
+            </a:prstTxWarp>
+            <a:noAutofit/>
+          </a:bodyPr>
+          <a:lstStyle/>
+          <a:p>
+            <a:pPr algn="ctr"/>
+            <a:r>
+              <a:rPr lang="en-US" sz="1600" dirty="0">
+                <a:solidFill>
+                  <a:schemeClr val="tx1"/>
+                </a:solidFill>
+                <a:latin typeface="Calibri Light" panose="020F0302020204030204" pitchFamily="34" charset="0"/>
+                <a:cs typeface="Arial" panose="020B0604020202020204" pitchFamily="34" charset="0"/>
+              </a:rPr>
+              <a:t>DB Interface</a:t>
+            </a:r>
+          </a:p>
+          <a:p>
+            <a:pPr algn="ctr"/>
+            <a:r>
+              <a:rPr lang="en-US" sz="1600" dirty="0">
+                <a:solidFill>
+                  <a:schemeClr val="tx1"/>
+                </a:solidFill>
+                <a:latin typeface="Calibri Light" panose="020F0302020204030204" pitchFamily="34" charset="0"/>
+                <a:cs typeface="Arial" panose="020B0604020202020204" pitchFamily="34" charset="0"/>
+              </a:rPr>
+              <a:t>Spring Boot</a:t>
+            </a:r>
+          </a:p>
+          <a:p>
+            <a:pPr algn="ctr"/>
+            <a:r>
+              <a:rPr lang="en-US" sz="1600" dirty="0">
+                <a:solidFill>
+                  <a:schemeClr val="tx1"/>
+                </a:solidFill>
+                <a:latin typeface="Calibri Light" panose="020F0302020204030204" pitchFamily="34" charset="0"/>
+                <a:cs typeface="Arial" panose="020B0604020202020204" pitchFamily="34" charset="0"/>
+              </a:rPr>
+              <a:t>&lt;&lt;Micro-Service&gt;&gt;</a:t>
+            </a:r>
+          </a:p>
+        </p:txBody>
+      </p:sp>
+      <p:sp>
+        <p:nvSpPr>
+          <p:cNvPr id="6" name="Правоъгълник 5"/>
+          <p:cNvSpPr/>
+          <p:nvPr/>
+        </p:nvSpPr>
+        <p:spPr bwMode="auto">
+          <a:xfrm>
+            <a:off x="9541440" y="2858204"/>
+            <a:ext cx="2027582" cy="735649"/>
+          </a:xfrm>
+          <a:prstGeom prst="rect">
+            <a:avLst/>
+          </a:prstGeom>
+          <a:ln>
+            <a:headEnd type="none" w="med" len="med"/>
+            <a:tailEnd type="none" w="med" len="med"/>
+          </a:ln>
+        </p:spPr>
+        <p:style>
+          <a:lnRef idx="1">
+            <a:schemeClr val="accent4"/>
+          </a:lnRef>
+          <a:fillRef idx="2">
+            <a:schemeClr val="accent4"/>
+          </a:fillRef>
+          <a:effectRef idx="1">
+            <a:schemeClr val="accent4"/>
+          </a:effectRef>
+          <a:fontRef idx="minor">
+            <a:schemeClr val="dk1"/>
+          </a:fontRef>
+        </p:style>
+        <p:txBody>
+          <a:bodyPr rot="0" spcFirstLastPara="0" vertOverflow="overflow" horzOverflow="overflow" vert="horz" wrap="square" lIns="91440" tIns="45720" rIns="91440" bIns="45720" numCol="1" spcCol="0" rtlCol="0" fromWordArt="0" anchor="ctr" anchorCtr="0" forceAA="0" compatLnSpc="1">
+            <a:prstTxWarp prst="textNoShape">
+              <a:avLst/>
+            </a:prstTxWarp>
+            <a:noAutofit/>
+          </a:bodyPr>
+          <a:lstStyle/>
+          <a:p>
+            <a:pPr algn="ctr"/>
+            <a:r>
+              <a:rPr lang="en-US" sz="1600" dirty="0">
+                <a:solidFill>
+                  <a:schemeClr val="tx1"/>
+                </a:solidFill>
+                <a:latin typeface="Calibri Light" panose="020F0302020204030204" pitchFamily="34" charset="0"/>
+                <a:cs typeface="Arial" panose="020B0604020202020204" pitchFamily="34" charset="0"/>
+              </a:rPr>
+              <a:t>…</a:t>
+            </a:r>
+          </a:p>
+          <a:p>
+            <a:pPr algn="ctr"/>
+            <a:r>
+              <a:rPr lang="en-US" sz="1600" dirty="0">
+                <a:solidFill>
+                  <a:schemeClr val="tx1"/>
+                </a:solidFill>
+                <a:latin typeface="Calibri Light" panose="020F0302020204030204" pitchFamily="34" charset="0"/>
+                <a:cs typeface="Arial" panose="020B0604020202020204" pitchFamily="34" charset="0"/>
+              </a:rPr>
+              <a:t>Spring Boot</a:t>
+            </a:r>
+          </a:p>
+          <a:p>
+            <a:pPr algn="ctr"/>
+            <a:r>
+              <a:rPr lang="en-US" sz="1600" dirty="0">
+                <a:solidFill>
+                  <a:schemeClr val="tx1"/>
+                </a:solidFill>
+                <a:latin typeface="Calibri Light" panose="020F0302020204030204" pitchFamily="34" charset="0"/>
+                <a:cs typeface="Arial" panose="020B0604020202020204" pitchFamily="34" charset="0"/>
+              </a:rPr>
+              <a:t>&lt;&lt;Micro-Service&gt;&gt;</a:t>
+            </a:r>
+          </a:p>
+        </p:txBody>
+      </p:sp>
+      <p:sp>
+        <p:nvSpPr>
+          <p:cNvPr id="7" name="Овал 6"/>
+          <p:cNvSpPr/>
+          <p:nvPr/>
+        </p:nvSpPr>
+        <p:spPr bwMode="auto">
+          <a:xfrm>
+            <a:off x="5214667" y="5944075"/>
+            <a:ext cx="1669646" cy="675861"/>
+          </a:xfrm>
+          <a:prstGeom prst="ellipse">
+            <a:avLst/>
+          </a:prstGeom>
+          <a:ln>
+            <a:headEnd/>
+            <a:tailEnd/>
+          </a:ln>
+        </p:spPr>
+        <p:style>
+          <a:lnRef idx="1">
+            <a:schemeClr val="accent2"/>
+          </a:lnRef>
+          <a:fillRef idx="2">
+            <a:schemeClr val="accent2"/>
+          </a:fillRef>
+          <a:effectRef idx="1">
+            <a:schemeClr val="accent2"/>
+          </a:effectRef>
+          <a:fontRef idx="minor">
+            <a:schemeClr val="dk1"/>
+          </a:fontRef>
+        </p:style>
+        <p:txBody>
+          <a:bodyPr rot="0" spcFirstLastPara="0" vertOverflow="overflow" horzOverflow="overflow" vert="horz" wrap="square" lIns="91440" tIns="45720" rIns="91440" bIns="45720" numCol="1" spcCol="0" rtlCol="0" fromWordArt="0" anchor="ctr" anchorCtr="0" forceAA="0" compatLnSpc="1">
+            <a:prstTxWarp prst="textNoShape">
+              <a:avLst/>
+            </a:prstTxWarp>
+            <a:noAutofit/>
+          </a:bodyPr>
+          <a:lstStyle/>
+          <a:p>
+            <a:pPr algn="ctr"/>
+            <a:r>
+              <a:rPr lang="en-US" sz="2400" dirty="0">
+                <a:solidFill>
+                  <a:schemeClr val="tx1"/>
+                </a:solidFill>
+                <a:latin typeface="Calibri Light" panose="020F0302020204030204" pitchFamily="34" charset="0"/>
+                <a:cs typeface="Arial" panose="020B0604020202020204" pitchFamily="34" charset="0"/>
+              </a:rPr>
+              <a:t>MySQL</a:t>
+            </a:r>
+          </a:p>
+        </p:txBody>
+      </p:sp>
+      <p:sp>
+        <p:nvSpPr>
+          <p:cNvPr id="8" name="Правоъгълник 7"/>
+          <p:cNvSpPr/>
+          <p:nvPr/>
+        </p:nvSpPr>
+        <p:spPr bwMode="auto">
+          <a:xfrm>
+            <a:off x="5033402" y="2894091"/>
+            <a:ext cx="2027582" cy="735649"/>
+          </a:xfrm>
+          <a:prstGeom prst="rect">
+            <a:avLst/>
+          </a:prstGeom>
+          <a:ln>
+            <a:headEnd/>
+            <a:tailEnd/>
+          </a:ln>
+        </p:spPr>
+        <p:style>
+          <a:lnRef idx="1">
+            <a:schemeClr val="accent4"/>
+          </a:lnRef>
+          <a:fillRef idx="2">
+            <a:schemeClr val="accent4"/>
+          </a:fillRef>
+          <a:effectRef idx="1">
+            <a:schemeClr val="accent4"/>
+          </a:effectRef>
+          <a:fontRef idx="minor">
+            <a:schemeClr val="dk1"/>
+          </a:fontRef>
+        </p:style>
+        <p:txBody>
+          <a:bodyPr rot="0" spcFirstLastPara="0" vertOverflow="overflow" horzOverflow="overflow" vert="horz" wrap="square" lIns="91440" tIns="45720" rIns="91440" bIns="45720" numCol="1" spcCol="0" rtlCol="0" fromWordArt="0" anchor="ctr" anchorCtr="0" forceAA="0" compatLnSpc="1">
+            <a:prstTxWarp prst="textNoShape">
+              <a:avLst/>
+            </a:prstTxWarp>
+            <a:noAutofit/>
+          </a:bodyPr>
+          <a:lstStyle/>
+          <a:p>
+            <a:pPr algn="ctr"/>
+            <a:r>
+              <a:rPr lang="en-US" sz="1600" dirty="0">
+                <a:solidFill>
+                  <a:schemeClr val="tx1"/>
+                </a:solidFill>
+                <a:latin typeface="Calibri Light" panose="020F0302020204030204" pitchFamily="34" charset="0"/>
+                <a:cs typeface="Arial" panose="020B0604020202020204" pitchFamily="34" charset="0"/>
+              </a:rPr>
+              <a:t>Importer</a:t>
+            </a:r>
+          </a:p>
+          <a:p>
+            <a:pPr algn="ctr"/>
+            <a:r>
+              <a:rPr lang="en-US" sz="1600" dirty="0">
+                <a:solidFill>
+                  <a:schemeClr val="tx1"/>
+                </a:solidFill>
+                <a:latin typeface="Calibri Light" panose="020F0302020204030204" pitchFamily="34" charset="0"/>
+                <a:cs typeface="Arial" panose="020B0604020202020204" pitchFamily="34" charset="0"/>
+              </a:rPr>
+              <a:t>Spring Boot</a:t>
+            </a:r>
+          </a:p>
+          <a:p>
+            <a:pPr algn="ctr"/>
+            <a:r>
+              <a:rPr lang="en-US" sz="1600" dirty="0">
+                <a:solidFill>
+                  <a:schemeClr val="tx1"/>
+                </a:solidFill>
+                <a:latin typeface="Calibri Light" panose="020F0302020204030204" pitchFamily="34" charset="0"/>
+                <a:cs typeface="Arial" panose="020B0604020202020204" pitchFamily="34" charset="0"/>
+              </a:rPr>
+              <a:t>&lt;&lt;Micro-Service&gt;&gt;</a:t>
+            </a:r>
+          </a:p>
+        </p:txBody>
+      </p:sp>
+      <p:cxnSp>
+        <p:nvCxnSpPr>
+          <p:cNvPr id="12" name="Съединител &quot;права стрелка&quot; 11"/>
+          <p:cNvCxnSpPr>
+            <a:stCxn id="2" idx="2"/>
+            <a:endCxn id="3" idx="0"/>
+          </p:cNvCxnSpPr>
+          <p:nvPr/>
+        </p:nvCxnSpPr>
+        <p:spPr bwMode="auto">
+          <a:xfrm>
+            <a:off x="6047193" y="684621"/>
+            <a:ext cx="0" cy="810276"/>
+          </a:xfrm>
+          <a:prstGeom prst="straightConnector1">
+            <a:avLst/>
+          </a:prstGeom>
+          <a:ln w="19050">
+            <a:solidFill>
+              <a:schemeClr val="tx1"/>
+            </a:solidFill>
+            <a:headEnd type="triangle"/>
+            <a:tailEnd type="triangle"/>
+          </a:ln>
+        </p:spPr>
+        <p:style>
+          <a:lnRef idx="1">
+            <a:schemeClr val="accent1"/>
+          </a:lnRef>
+          <a:fillRef idx="0">
+            <a:schemeClr val="accent1"/>
+          </a:fillRef>
+          <a:effectRef idx="0">
+            <a:schemeClr val="accent1"/>
+          </a:effectRef>
+          <a:fontRef idx="minor">
+            <a:schemeClr val="tx1"/>
+          </a:fontRef>
+        </p:style>
+      </p:cxnSp>
+      <p:cxnSp>
+        <p:nvCxnSpPr>
+          <p:cNvPr id="14" name="Съединител &quot;права стрелка&quot; 13"/>
+          <p:cNvCxnSpPr>
+            <a:cxnSpLocks/>
+            <a:stCxn id="3" idx="2"/>
+            <a:endCxn id="4" idx="0"/>
+          </p:cNvCxnSpPr>
+          <p:nvPr/>
+        </p:nvCxnSpPr>
+        <p:spPr bwMode="auto">
+          <a:xfrm flipH="1">
+            <a:off x="1539155" y="2084461"/>
+            <a:ext cx="4508038" cy="773744"/>
+          </a:xfrm>
+          <a:prstGeom prst="straightConnector1">
+            <a:avLst/>
+          </a:prstGeom>
+          <a:ln w="19050">
+            <a:solidFill>
+              <a:schemeClr val="tx1"/>
+            </a:solidFill>
+            <a:headEnd type="triangle"/>
+            <a:tailEnd type="triangle"/>
+          </a:ln>
+        </p:spPr>
+        <p:style>
+          <a:lnRef idx="1">
+            <a:schemeClr val="accent1"/>
+          </a:lnRef>
+          <a:fillRef idx="0">
+            <a:schemeClr val="accent1"/>
+          </a:fillRef>
+          <a:effectRef idx="0">
+            <a:schemeClr val="accent1"/>
+          </a:effectRef>
+          <a:fontRef idx="minor">
+            <a:schemeClr val="tx1"/>
+          </a:fontRef>
+        </p:style>
+      </p:cxnSp>
+      <p:cxnSp>
+        <p:nvCxnSpPr>
+          <p:cNvPr id="16" name="Съединител &quot;права стрелка&quot; 15"/>
+          <p:cNvCxnSpPr>
+            <a:stCxn id="3" idx="2"/>
+            <a:endCxn id="8" idx="0"/>
+          </p:cNvCxnSpPr>
+          <p:nvPr/>
+        </p:nvCxnSpPr>
+        <p:spPr bwMode="auto">
+          <a:xfrm>
+            <a:off x="6047193" y="2084461"/>
+            <a:ext cx="0" cy="809630"/>
+          </a:xfrm>
+          <a:prstGeom prst="straightConnector1">
+            <a:avLst/>
+          </a:prstGeom>
+          <a:ln w="19050">
+            <a:solidFill>
+              <a:schemeClr val="tx1"/>
+            </a:solidFill>
+            <a:headEnd type="triangle"/>
+            <a:tailEnd type="triangle"/>
+          </a:ln>
+        </p:spPr>
+        <p:style>
+          <a:lnRef idx="1">
+            <a:schemeClr val="accent1"/>
+          </a:lnRef>
+          <a:fillRef idx="0">
+            <a:schemeClr val="accent1"/>
+          </a:fillRef>
+          <a:effectRef idx="0">
+            <a:schemeClr val="accent1"/>
+          </a:effectRef>
+          <a:fontRef idx="minor">
+            <a:schemeClr val="tx1"/>
+          </a:fontRef>
+        </p:style>
+      </p:cxnSp>
+      <p:cxnSp>
+        <p:nvCxnSpPr>
+          <p:cNvPr id="18" name="Съединител &quot;права стрелка&quot; 17"/>
+          <p:cNvCxnSpPr>
+            <a:cxnSpLocks/>
+            <a:stCxn id="3" idx="2"/>
+            <a:endCxn id="6" idx="0"/>
+          </p:cNvCxnSpPr>
+          <p:nvPr/>
+        </p:nvCxnSpPr>
+        <p:spPr bwMode="auto">
+          <a:xfrm>
+            <a:off x="6047193" y="2084461"/>
+            <a:ext cx="4508038" cy="773743"/>
+          </a:xfrm>
+          <a:prstGeom prst="straightConnector1">
+            <a:avLst/>
+          </a:prstGeom>
+          <a:ln w="19050">
+            <a:solidFill>
+              <a:schemeClr val="tx1"/>
+            </a:solidFill>
+            <a:headEnd type="triangle"/>
+            <a:tailEnd type="triangle"/>
+          </a:ln>
+        </p:spPr>
+        <p:style>
+          <a:lnRef idx="1">
+            <a:schemeClr val="accent1"/>
+          </a:lnRef>
+          <a:fillRef idx="0">
+            <a:schemeClr val="accent1"/>
+          </a:fillRef>
+          <a:effectRef idx="0">
+            <a:schemeClr val="accent1"/>
+          </a:effectRef>
+          <a:fontRef idx="minor">
+            <a:schemeClr val="tx1"/>
+          </a:fontRef>
+        </p:style>
+      </p:cxnSp>
+      <p:cxnSp>
+        <p:nvCxnSpPr>
+          <p:cNvPr id="20" name="Съединител &quot;права стрелка&quot; 19"/>
+          <p:cNvCxnSpPr>
+            <a:stCxn id="8" idx="2"/>
+            <a:endCxn id="5" idx="0"/>
+          </p:cNvCxnSpPr>
+          <p:nvPr/>
+        </p:nvCxnSpPr>
+        <p:spPr bwMode="auto">
+          <a:xfrm>
+            <a:off x="6047193" y="3629740"/>
+            <a:ext cx="2297" cy="849016"/>
+          </a:xfrm>
+          <a:prstGeom prst="straightConnector1">
+            <a:avLst/>
+          </a:prstGeom>
+          <a:ln w="19050">
+            <a:solidFill>
+              <a:schemeClr val="tx1"/>
+            </a:solidFill>
+            <a:headEnd type="triangle"/>
+            <a:tailEnd type="triangle"/>
+          </a:ln>
+        </p:spPr>
+        <p:style>
+          <a:lnRef idx="1">
+            <a:schemeClr val="accent1"/>
+          </a:lnRef>
+          <a:fillRef idx="0">
+            <a:schemeClr val="accent1"/>
+          </a:fillRef>
+          <a:effectRef idx="0">
+            <a:schemeClr val="accent1"/>
+          </a:effectRef>
+          <a:fontRef idx="minor">
+            <a:schemeClr val="tx1"/>
+          </a:fontRef>
+        </p:style>
+      </p:cxnSp>
+      <p:cxnSp>
+        <p:nvCxnSpPr>
+          <p:cNvPr id="22" name="Съединител &quot;права стрелка&quot; 21"/>
+          <p:cNvCxnSpPr>
+            <a:stCxn id="5" idx="2"/>
+            <a:endCxn id="7" idx="0"/>
+          </p:cNvCxnSpPr>
+          <p:nvPr/>
+        </p:nvCxnSpPr>
+        <p:spPr bwMode="auto">
+          <a:xfrm>
+            <a:off x="6049490" y="5214405"/>
+            <a:ext cx="0" cy="729670"/>
+          </a:xfrm>
+          <a:prstGeom prst="straightConnector1">
+            <a:avLst/>
+          </a:prstGeom>
+          <a:ln w="19050">
+            <a:solidFill>
+              <a:schemeClr val="tx1"/>
+            </a:solidFill>
+            <a:headEnd type="triangle"/>
+            <a:tailEnd type="triangle"/>
+          </a:ln>
+        </p:spPr>
+        <p:style>
+          <a:lnRef idx="1">
+            <a:schemeClr val="accent1"/>
+          </a:lnRef>
+          <a:fillRef idx="0">
+            <a:schemeClr val="accent1"/>
+          </a:fillRef>
+          <a:effectRef idx="0">
+            <a:schemeClr val="accent1"/>
+          </a:effectRef>
+          <a:fontRef idx="minor">
+            <a:schemeClr val="tx1"/>
+          </a:fontRef>
+        </p:style>
+      </p:cxnSp>
+      <p:sp>
+        <p:nvSpPr>
+          <p:cNvPr id="39" name="Текстово поле 38"/>
+          <p:cNvSpPr txBox="1"/>
+          <p:nvPr/>
+        </p:nvSpPr>
+        <p:spPr>
+          <a:xfrm>
+            <a:off x="5967679" y="907141"/>
+            <a:ext cx="2186609" cy="400110"/>
+          </a:xfrm>
+          <a:prstGeom prst="rect">
+            <a:avLst/>
+          </a:prstGeom>
+          <a:noFill/>
+        </p:spPr>
+        <p:txBody>
+          <a:bodyPr wrap="square" rtlCol="0" anchor="ctr">
+            <a:spAutoFit/>
+          </a:bodyPr>
+          <a:lstStyle/>
+          <a:p>
+            <a:pPr algn="ctr"/>
+            <a:r>
+              <a:rPr lang="en-US" sz="2000" dirty="0">
+                <a:solidFill>
+                  <a:schemeClr val="tx1"/>
+                </a:solidFill>
+                <a:latin typeface="Calibri Light" panose="020F0302020204030204" pitchFamily="34" charset="0"/>
+                <a:cs typeface="Arial" panose="020B0604020202020204" pitchFamily="34" charset="0"/>
+              </a:rPr>
+              <a:t>CSV, JSON / REST</a:t>
+            </a:r>
+          </a:p>
+        </p:txBody>
+      </p:sp>
+      <p:sp>
+        <p:nvSpPr>
+          <p:cNvPr id="40" name="Текстово поле 39"/>
+          <p:cNvSpPr txBox="1"/>
+          <p:nvPr/>
+        </p:nvSpPr>
+        <p:spPr>
+          <a:xfrm>
+            <a:off x="1916716" y="2051656"/>
+            <a:ext cx="2186609" cy="400110"/>
+          </a:xfrm>
+          <a:prstGeom prst="rect">
+            <a:avLst/>
+          </a:prstGeom>
+          <a:noFill/>
+        </p:spPr>
+        <p:txBody>
+          <a:bodyPr wrap="square" rtlCol="0" anchor="ctr">
+            <a:spAutoFit/>
+          </a:bodyPr>
+          <a:lstStyle/>
+          <a:p>
+            <a:pPr algn="ctr"/>
+            <a:r>
+              <a:rPr lang="en-US" sz="2000" dirty="0">
+                <a:solidFill>
+                  <a:schemeClr val="tx1"/>
+                </a:solidFill>
+                <a:latin typeface="Calibri Light" panose="020F0302020204030204" pitchFamily="34" charset="0"/>
+                <a:cs typeface="Arial" panose="020B0604020202020204" pitchFamily="34" charset="0"/>
+              </a:rPr>
+              <a:t>JSON / REST</a:t>
+            </a:r>
+          </a:p>
+        </p:txBody>
+      </p:sp>
+      <p:sp>
+        <p:nvSpPr>
+          <p:cNvPr id="41" name="Текстово поле 40"/>
+          <p:cNvSpPr txBox="1"/>
+          <p:nvPr/>
+        </p:nvSpPr>
+        <p:spPr>
+          <a:xfrm>
+            <a:off x="7782213" y="1988603"/>
+            <a:ext cx="2186609" cy="400110"/>
+          </a:xfrm>
+          <a:prstGeom prst="rect">
+            <a:avLst/>
+          </a:prstGeom>
+          <a:noFill/>
+        </p:spPr>
+        <p:txBody>
+          <a:bodyPr wrap="square" rtlCol="0" anchor="ctr">
+            <a:spAutoFit/>
+          </a:bodyPr>
+          <a:lstStyle/>
+          <a:p>
+            <a:pPr algn="ctr"/>
+            <a:r>
+              <a:rPr lang="en-US" sz="2000" dirty="0">
+                <a:solidFill>
+                  <a:schemeClr val="tx1"/>
+                </a:solidFill>
+                <a:latin typeface="Calibri Light" panose="020F0302020204030204" pitchFamily="34" charset="0"/>
+                <a:cs typeface="Arial" panose="020B0604020202020204" pitchFamily="34" charset="0"/>
+              </a:rPr>
+              <a:t>JSON / REST</a:t>
+            </a:r>
+          </a:p>
+        </p:txBody>
+      </p:sp>
+      <p:sp>
+        <p:nvSpPr>
+          <p:cNvPr id="42" name="Текстово поле 41"/>
+          <p:cNvSpPr txBox="1"/>
+          <p:nvPr/>
+        </p:nvSpPr>
+        <p:spPr>
+          <a:xfrm>
+            <a:off x="5675117" y="2343913"/>
+            <a:ext cx="2186609" cy="400110"/>
+          </a:xfrm>
+          <a:prstGeom prst="rect">
+            <a:avLst/>
+          </a:prstGeom>
+          <a:noFill/>
+        </p:spPr>
+        <p:txBody>
+          <a:bodyPr wrap="square" rtlCol="0" anchor="ctr">
+            <a:spAutoFit/>
+          </a:bodyPr>
+          <a:lstStyle/>
+          <a:p>
+            <a:pPr algn="ctr"/>
+            <a:r>
+              <a:rPr lang="en-US" sz="2000" dirty="0">
+                <a:solidFill>
+                  <a:schemeClr val="tx1"/>
+                </a:solidFill>
+                <a:latin typeface="Calibri Light" panose="020F0302020204030204" pitchFamily="34" charset="0"/>
+                <a:cs typeface="Arial" panose="020B0604020202020204" pitchFamily="34" charset="0"/>
+              </a:rPr>
+              <a:t>JSON / REST</a:t>
+            </a:r>
+          </a:p>
+        </p:txBody>
+      </p:sp>
+      <p:sp>
+        <p:nvSpPr>
+          <p:cNvPr id="43" name="Текстово поле 42"/>
+          <p:cNvSpPr txBox="1"/>
+          <p:nvPr/>
+        </p:nvSpPr>
+        <p:spPr>
+          <a:xfrm>
+            <a:off x="5687354" y="3809210"/>
+            <a:ext cx="2186609" cy="400110"/>
+          </a:xfrm>
+          <a:prstGeom prst="rect">
+            <a:avLst/>
+          </a:prstGeom>
+          <a:noFill/>
+        </p:spPr>
+        <p:txBody>
+          <a:bodyPr wrap="square" rtlCol="0" anchor="ctr">
+            <a:spAutoFit/>
+          </a:bodyPr>
+          <a:lstStyle/>
+          <a:p>
+            <a:pPr algn="ctr"/>
+            <a:r>
+              <a:rPr lang="en-US" sz="2000" dirty="0">
+                <a:solidFill>
+                  <a:schemeClr val="tx1"/>
+                </a:solidFill>
+                <a:latin typeface="Calibri Light" panose="020F0302020204030204" pitchFamily="34" charset="0"/>
+                <a:cs typeface="Arial" panose="020B0604020202020204" pitchFamily="34" charset="0"/>
+              </a:rPr>
+              <a:t>JSON / REST</a:t>
+            </a:r>
+          </a:p>
+        </p:txBody>
+      </p:sp>
+      <p:sp>
+        <p:nvSpPr>
+          <p:cNvPr id="44" name="Текстово поле 43"/>
+          <p:cNvSpPr txBox="1"/>
+          <p:nvPr/>
+        </p:nvSpPr>
+        <p:spPr>
+          <a:xfrm>
+            <a:off x="6032925" y="5387889"/>
+            <a:ext cx="2186609" cy="400110"/>
+          </a:xfrm>
+          <a:prstGeom prst="rect">
+            <a:avLst/>
+          </a:prstGeom>
+          <a:noFill/>
+        </p:spPr>
+        <p:txBody>
+          <a:bodyPr wrap="square" rtlCol="0" anchor="ctr">
+            <a:spAutoFit/>
+          </a:bodyPr>
+          <a:lstStyle/>
+          <a:p>
+            <a:pPr algn="ctr"/>
+            <a:r>
+              <a:rPr lang="en-US" sz="2000" dirty="0">
+                <a:latin typeface="Calibri Light" panose="020F0302020204030204" pitchFamily="34" charset="0"/>
+                <a:cs typeface="Arial" panose="020B0604020202020204" pitchFamily="34" charset="0"/>
+              </a:rPr>
+              <a:t>JDBC, Hibernate</a:t>
+            </a:r>
+            <a:endParaRPr lang="en-US" sz="2000" dirty="0">
+              <a:solidFill>
+                <a:schemeClr val="tx1"/>
+              </a:solidFill>
+              <a:latin typeface="Calibri Light" panose="020F0302020204030204" pitchFamily="34" charset="0"/>
+              <a:cs typeface="Arial" panose="020B0604020202020204" pitchFamily="34" charset="0"/>
+            </a:endParaRPr>
+          </a:p>
+        </p:txBody>
+      </p:sp>
+      <p:cxnSp>
+        <p:nvCxnSpPr>
+          <p:cNvPr id="13" name="Straight Arrow Connector 12"/>
+          <p:cNvCxnSpPr>
+            <a:stCxn id="4" idx="2"/>
+            <a:endCxn id="5" idx="1"/>
+          </p:cNvCxnSpPr>
+          <p:nvPr/>
+        </p:nvCxnSpPr>
+        <p:spPr bwMode="auto">
+          <a:xfrm>
+            <a:off x="1539155" y="3593854"/>
+            <a:ext cx="3496544" cy="1252727"/>
+          </a:xfrm>
+          <a:prstGeom prst="straightConnector1">
+            <a:avLst/>
+          </a:prstGeom>
+          <a:ln w="19050">
+            <a:solidFill>
+              <a:schemeClr val="tx1"/>
+            </a:solidFill>
+            <a:headEnd type="triangle"/>
+            <a:tailEnd type="triangle"/>
+          </a:ln>
+        </p:spPr>
+        <p:style>
+          <a:lnRef idx="1">
+            <a:schemeClr val="accent1"/>
+          </a:lnRef>
+          <a:fillRef idx="0">
+            <a:schemeClr val="accent1"/>
+          </a:fillRef>
+          <a:effectRef idx="0">
+            <a:schemeClr val="accent1"/>
+          </a:effectRef>
+          <a:fontRef idx="minor">
+            <a:schemeClr val="tx1"/>
+          </a:fontRef>
+        </p:style>
+      </p:cxnSp>
+      <p:sp>
+        <p:nvSpPr>
+          <p:cNvPr id="25" name="Текстово поле 39"/>
+          <p:cNvSpPr txBox="1"/>
+          <p:nvPr/>
+        </p:nvSpPr>
+        <p:spPr>
+          <a:xfrm>
+            <a:off x="2403969" y="3723762"/>
+            <a:ext cx="2186609" cy="400110"/>
+          </a:xfrm>
+          <a:prstGeom prst="rect">
+            <a:avLst/>
+          </a:prstGeom>
+          <a:noFill/>
+        </p:spPr>
+        <p:txBody>
+          <a:bodyPr wrap="square" rtlCol="0" anchor="ctr">
+            <a:spAutoFit/>
+          </a:bodyPr>
+          <a:lstStyle/>
+          <a:p>
+            <a:pPr algn="ctr"/>
+            <a:r>
+              <a:rPr lang="en-US" sz="2000" dirty="0">
+                <a:solidFill>
+                  <a:schemeClr val="tx1"/>
+                </a:solidFill>
+                <a:latin typeface="Calibri Light" panose="020F0302020204030204" pitchFamily="34" charset="0"/>
+                <a:cs typeface="Arial" panose="020B0604020202020204" pitchFamily="34" charset="0"/>
+              </a:rPr>
+              <a:t>JSON / REST</a:t>
+            </a:r>
+          </a:p>
+        </p:txBody>
+      </p:sp>
+    </p:spTree>
+    <p:extLst>
+      <p:ext uri="{BB962C8B-B14F-4D97-AF65-F5344CB8AC3E}">
+        <p14:creationId xmlns:p14="http://schemas.microsoft.com/office/powerpoint/2010/main" val="67122437"/>
+      </p:ext>
+    </p:extLst>
+  </p:cSld>
+  <p:clrMapOvr>
+    <a:masterClrMapping/>
+  </p:clrMapOvr>
+</p:sld>
+</file>
+
+<file path=ppt/slides/slide5.xml><?xml version="1.0" encoding="utf-8"?>
+<p:sld xmlns:a="http://schemas.openxmlformats.org/drawingml/2006/main" xmlns:r="http://schemas.openxmlformats.org/officeDocument/2006/relationships" xmlns:p="http://schemas.openxmlformats.org/presentationml/2006/main">
+  <p:cSld>
+    <p:spTree>
+      <p:nvGrpSpPr>
+        <p:cNvPr id="1" name=""/>
+        <p:cNvGrpSpPr/>
+        <p:nvPr/>
+      </p:nvGrpSpPr>
+      <p:grpSpPr>
+        <a:xfrm>
+          <a:off x="0" y="0"/>
+          <a:ext cx="0" cy="0"/>
+          <a:chOff x="0" y="0"/>
+          <a:chExt cx="0" cy="0"/>
+        </a:xfrm>
+      </p:grpSpPr>
+      <p:sp>
+        <p:nvSpPr>
+          <p:cNvPr id="2" name="Titel 1"/>
+          <p:cNvSpPr>
+            <a:spLocks noGrp="1"/>
+          </p:cNvSpPr>
+          <p:nvPr>
+            <p:ph type="ctrTitle"/>
+          </p:nvPr>
+        </p:nvSpPr>
+        <p:spPr>
+          <a:xfrm>
+            <a:off x="384000" y="2487600"/>
+            <a:ext cx="11424000" cy="443198"/>
+          </a:xfrm>
+        </p:spPr>
+        <p:txBody>
+          <a:bodyPr/>
+          <a:lstStyle/>
+          <a:p>
+            <a:r>
+              <a:rPr lang="en-US" dirty="0"/>
+              <a:t>Frontend </a:t>
+            </a:r>
+          </a:p>
+        </p:txBody>
+      </p:sp>
+    </p:spTree>
+    <p:extLst>
+      <p:ext uri="{BB962C8B-B14F-4D97-AF65-F5344CB8AC3E}">
+        <p14:creationId xmlns:p14="http://schemas.microsoft.com/office/powerpoint/2010/main" val="3084618864"/>
+      </p:ext>
+    </p:extLst>
+  </p:cSld>
+  <p:clrMapOvr>
+    <a:masterClrMapping/>
+  </p:clrMapOvr>
+</p:sld>
+</file>
+
+<file path=ppt/slides/slide6.xml><?xml version="1.0" encoding="utf-8"?>
+<p:sld xmlns:a="http://schemas.openxmlformats.org/drawingml/2006/main" xmlns:r="http://schemas.openxmlformats.org/officeDocument/2006/relationships" xmlns:p="http://schemas.openxmlformats.org/presentationml/2006/main">
+  <p:cSld>
+    <p:spTree>
+      <p:nvGrpSpPr>
+        <p:cNvPr id="1" name=""/>
+        <p:cNvGrpSpPr/>
+        <p:nvPr/>
+      </p:nvGrpSpPr>
+      <p:grpSpPr>
+        <a:xfrm>
+          <a:off x="0" y="0"/>
+          <a:ext cx="0" cy="0"/>
+          <a:chOff x="0" y="0"/>
+          <a:chExt cx="0" cy="0"/>
+        </a:xfrm>
+      </p:grpSpPr>
+      <p:sp>
+        <p:nvSpPr>
+          <p:cNvPr id="2" name="Titel 1"/>
+          <p:cNvSpPr>
+            <a:spLocks noGrp="1"/>
+          </p:cNvSpPr>
+          <p:nvPr>
+            <p:ph type="ctrTitle"/>
+          </p:nvPr>
+        </p:nvSpPr>
+        <p:spPr>
+          <a:xfrm>
+            <a:off x="384000" y="2487600"/>
+            <a:ext cx="11424000" cy="443198"/>
+          </a:xfrm>
+        </p:spPr>
+        <p:txBody>
+          <a:bodyPr/>
+          <a:lstStyle/>
+          <a:p>
+            <a:r>
+              <a:rPr lang="en-US" dirty="0"/>
+              <a:t>API</a:t>
+            </a:r>
+          </a:p>
+        </p:txBody>
+      </p:sp>
+    </p:spTree>
+    <p:extLst>
+      <p:ext uri="{BB962C8B-B14F-4D97-AF65-F5344CB8AC3E}">
+        <p14:creationId xmlns:p14="http://schemas.microsoft.com/office/powerpoint/2010/main" val="3301941064"/>
+      </p:ext>
+    </p:extLst>
+  </p:cSld>
+  <p:clrMapOvr>
+    <a:masterClrMapping/>
+  </p:clrMapOvr>
+</p:sld>
+</file>
+
+<file path=ppt/slides/slide7.xml><?xml version="1.0" encoding="utf-8"?>
+<p:sld xmlns:a="http://schemas.openxmlformats.org/drawingml/2006/main" xmlns:r="http://schemas.openxmlformats.org/officeDocument/2006/relationships" xmlns:p="http://schemas.openxmlformats.org/presentationml/2006/main">
+  <p:cSld>
+    <p:spTree>
+      <p:nvGrpSpPr>
+        <p:cNvPr id="1" name=""/>
+        <p:cNvGrpSpPr/>
+        <p:nvPr/>
+      </p:nvGrpSpPr>
+      <p:grpSpPr>
+        <a:xfrm>
+          <a:off x="0" y="0"/>
+          <a:ext cx="0" cy="0"/>
+          <a:chOff x="0" y="0"/>
+          <a:chExt cx="0" cy="0"/>
+        </a:xfrm>
+      </p:grpSpPr>
+      <p:sp>
+        <p:nvSpPr>
+          <p:cNvPr id="5" name="Title 4"/>
+          <p:cNvSpPr>
+            <a:spLocks noGrp="1"/>
+          </p:cNvSpPr>
+          <p:nvPr>
+            <p:ph type="title"/>
+          </p:nvPr>
+        </p:nvSpPr>
+        <p:spPr/>
+        <p:txBody>
+          <a:bodyPr/>
+          <a:lstStyle/>
+          <a:p>
+            <a:r>
+              <a:rPr lang="en-US" dirty="0"/>
+              <a:t>API (Nils)</a:t>
+            </a:r>
+          </a:p>
+        </p:txBody>
+      </p:sp>
+      <p:sp>
+        <p:nvSpPr>
+          <p:cNvPr id="6" name="Content Placeholder 5"/>
+          <p:cNvSpPr>
+            <a:spLocks noGrp="1"/>
+          </p:cNvSpPr>
+          <p:nvPr>
+            <p:ph sz="quarter" idx="12"/>
+          </p:nvPr>
+        </p:nvSpPr>
+        <p:spPr/>
+        <p:txBody>
+          <a:bodyPr/>
+          <a:lstStyle/>
+          <a:p>
+            <a:pPr marL="0" lvl="1" indent="0">
+              <a:buNone/>
+            </a:pPr>
+            <a:r>
+              <a:rPr lang="en-US" dirty="0"/>
+              <a:t> Swagger </a:t>
+            </a:r>
+            <a:r>
+              <a:rPr lang="en-US" dirty="0" err="1"/>
+              <a:t>Doku</a:t>
+            </a:r>
+            <a:endParaRPr lang="en-US" dirty="0"/>
+          </a:p>
+          <a:p>
+            <a:pPr marL="0" lvl="1" indent="0">
+              <a:buNone/>
+            </a:pPr>
+            <a:endParaRPr lang="en-US" dirty="0"/>
+          </a:p>
+          <a:p>
+            <a:pPr marL="0" lvl="1" indent="0">
+              <a:buNone/>
+            </a:pPr>
+            <a:r>
+              <a:rPr lang="en-US" dirty="0"/>
+              <a:t>                                                                                                               /record und </a:t>
+            </a:r>
+          </a:p>
+          <a:p>
+            <a:pPr marL="0" lvl="1" indent="0">
+              <a:buNone/>
+            </a:pPr>
+            <a:r>
+              <a:rPr lang="en-US" dirty="0"/>
+              <a:t>                                                                                                               /record/</a:t>
+            </a:r>
+            <a:r>
+              <a:rPr lang="en-US" dirty="0" err="1"/>
+              <a:t>json</a:t>
+            </a:r>
+            <a:r>
+              <a:rPr lang="en-US" dirty="0"/>
+              <a:t>                                                            </a:t>
+            </a:r>
+          </a:p>
+          <a:p>
+            <a:pPr marL="0" lvl="1" indent="0">
+              <a:buNone/>
+            </a:pPr>
+            <a:r>
+              <a:rPr lang="en-US" dirty="0"/>
+              <a:t>                                                                                                               </a:t>
+            </a:r>
+            <a:r>
+              <a:rPr lang="en-US" dirty="0" err="1"/>
+              <a:t>klappen</a:t>
+            </a:r>
+            <a:endParaRPr lang="en-US" dirty="0"/>
+          </a:p>
+        </p:txBody>
+      </p:sp>
+      <p:sp>
+        <p:nvSpPr>
+          <p:cNvPr id="3" name="Footer Placeholder 2"/>
+          <p:cNvSpPr>
+            <a:spLocks noGrp="1"/>
+          </p:cNvSpPr>
+          <p:nvPr>
+            <p:ph type="ftr" sz="quarter" idx="13"/>
+          </p:nvPr>
+        </p:nvSpPr>
+        <p:spPr/>
+        <p:txBody>
+          <a:bodyPr/>
+          <a:lstStyle/>
+          <a:p>
+            <a:endParaRPr lang="de-DE" dirty="0"/>
+          </a:p>
+        </p:txBody>
+      </p:sp>
+      <p:sp>
+        <p:nvSpPr>
+          <p:cNvPr id="4" name="Slide Number Placeholder 3"/>
+          <p:cNvSpPr>
+            <a:spLocks noGrp="1"/>
+          </p:cNvSpPr>
+          <p:nvPr>
+            <p:ph type="sldNum" sz="quarter" idx="14"/>
+          </p:nvPr>
+        </p:nvSpPr>
+        <p:spPr/>
+        <p:txBody>
+          <a:bodyPr/>
+          <a:lstStyle/>
+          <a:p>
+            <a:fld id="{4506F84E-75D2-4715-B6C6-C971E49CE21A}" type="slidenum">
+              <a:rPr lang="de-DE" smtClean="0"/>
+              <a:pPr/>
+              <a:t>7</a:t>
+            </a:fld>
+            <a:endParaRPr lang="de-DE" dirty="0"/>
+          </a:p>
+        </p:txBody>
+      </p:sp>
+      <p:pic>
+        <p:nvPicPr>
+          <p:cNvPr id="7" name="Grafik 6"/>
+          <p:cNvPicPr>
+            <a:picLocks noChangeAspect="1"/>
+          </p:cNvPicPr>
+          <p:nvPr/>
+        </p:nvPicPr>
+        <p:blipFill>
+          <a:blip r:embed="rId2" cstate="print">
+            <a:extLst>
+              <a:ext uri="{28A0092B-C50C-407E-A947-70E740481C1C}">
+                <a14:useLocalDpi xmlns:a14="http://schemas.microsoft.com/office/drawing/2010/main" val="0"/>
+              </a:ext>
+            </a:extLst>
+          </a:blip>
+          <a:stretch>
+            <a:fillRect/>
+          </a:stretch>
+        </p:blipFill>
+        <p:spPr>
+          <a:xfrm>
+            <a:off x="352904" y="1380930"/>
+            <a:ext cx="8822198" cy="4414342"/>
+          </a:xfrm>
+          <a:prstGeom prst="rect">
+            <a:avLst/>
+          </a:prstGeom>
+        </p:spPr>
+      </p:pic>
+    </p:spTree>
+    <p:extLst>
+      <p:ext uri="{BB962C8B-B14F-4D97-AF65-F5344CB8AC3E}">
+        <p14:creationId xmlns:p14="http://schemas.microsoft.com/office/powerpoint/2010/main" val="780322075"/>
+      </p:ext>
+    </p:extLst>
+  </p:cSld>
+  <p:clrMapOvr>
+    <a:masterClrMapping/>
+  </p:clrMapOvr>
+</p:sld>
+</file>
+
+<file path=ppt/slides/slide8.xml><?xml version="1.0" encoding="utf-8"?>
+<p:sld xmlns:a="http://schemas.openxmlformats.org/drawingml/2006/main" xmlns:r="http://schemas.openxmlformats.org/officeDocument/2006/relationships" xmlns:p="http://schemas.openxmlformats.org/presentationml/2006/main">
+  <p:cSld>
+    <p:spTree>
+      <p:nvGrpSpPr>
+        <p:cNvPr id="1" name=""/>
+        <p:cNvGrpSpPr/>
+        <p:nvPr/>
+      </p:nvGrpSpPr>
+      <p:grpSpPr>
+        <a:xfrm>
+          <a:off x="0" y="0"/>
+          <a:ext cx="0" cy="0"/>
+          <a:chOff x="0" y="0"/>
+          <a:chExt cx="0" cy="0"/>
+        </a:xfrm>
+      </p:grpSpPr>
+      <p:sp>
+        <p:nvSpPr>
+          <p:cNvPr id="2" name="Titel 1"/>
+          <p:cNvSpPr>
+            <a:spLocks noGrp="1"/>
+          </p:cNvSpPr>
+          <p:nvPr>
+            <p:ph type="title"/>
+          </p:nvPr>
+        </p:nvSpPr>
+        <p:spPr/>
+        <p:txBody>
+          <a:bodyPr/>
+          <a:lstStyle/>
+          <a:p>
+            <a:r>
+              <a:rPr lang="de-DE" dirty="0"/>
+              <a:t>API (Nils)</a:t>
+            </a:r>
+          </a:p>
+        </p:txBody>
+      </p:sp>
+      <p:sp>
+        <p:nvSpPr>
+          <p:cNvPr id="3" name="Inhaltsplatzhalter 2"/>
+          <p:cNvSpPr>
+            <a:spLocks noGrp="1"/>
+          </p:cNvSpPr>
+          <p:nvPr>
+            <p:ph sz="quarter" idx="12"/>
+          </p:nvPr>
+        </p:nvSpPr>
+        <p:spPr/>
+        <p:txBody>
+          <a:bodyPr>
+            <a:normAutofit/>
+          </a:bodyPr>
+          <a:lstStyle/>
+          <a:p>
+            <a:pPr marL="457200" indent="-457200">
+              <a:buFont typeface="Arial" panose="020B0604020202020204" pitchFamily="34" charset="0"/>
+              <a:buChar char="•"/>
+            </a:pPr>
+            <a:r>
+              <a:rPr lang="de-DE" sz="2000" dirty="0"/>
+              <a:t>Code hinter Endpunkten geschrieben</a:t>
+            </a:r>
+          </a:p>
+          <a:p>
+            <a:pPr marL="457200" indent="-457200">
+              <a:buFont typeface="Arial" panose="020B0604020202020204" pitchFamily="34" charset="0"/>
+              <a:buChar char="•"/>
+            </a:pPr>
+            <a:r>
+              <a:rPr lang="de-DE" sz="2000" dirty="0"/>
+              <a:t>Anbindung an </a:t>
+            </a:r>
+            <a:r>
+              <a:rPr lang="de-DE" sz="2000" dirty="0" err="1"/>
+              <a:t>Kaloyans</a:t>
+            </a:r>
+            <a:r>
+              <a:rPr lang="de-DE" sz="2000" dirty="0"/>
+              <a:t> Service</a:t>
+            </a:r>
+          </a:p>
+          <a:p>
+            <a:pPr marL="457200" indent="-457200">
+              <a:buFont typeface="Arial" panose="020B0604020202020204" pitchFamily="34" charset="0"/>
+              <a:buChar char="•"/>
+            </a:pPr>
+            <a:r>
+              <a:rPr lang="de-DE" sz="2000" dirty="0"/>
+              <a:t>Page zum Testen von /records </a:t>
+            </a:r>
+          </a:p>
+          <a:p>
+            <a:pPr marL="457200" indent="-457200">
+              <a:buFont typeface="Arial" panose="020B0604020202020204" pitchFamily="34" charset="0"/>
+              <a:buChar char="•"/>
+            </a:pPr>
+            <a:r>
+              <a:rPr lang="de-DE" sz="2000" dirty="0"/>
+              <a:t>Docker Container</a:t>
+            </a:r>
+          </a:p>
+        </p:txBody>
+      </p:sp>
+      <p:sp>
+        <p:nvSpPr>
+          <p:cNvPr id="4" name="Fußzeilenplatzhalter 3"/>
+          <p:cNvSpPr>
+            <a:spLocks noGrp="1"/>
+          </p:cNvSpPr>
+          <p:nvPr>
+            <p:ph type="ftr" sz="quarter" idx="13"/>
+          </p:nvPr>
+        </p:nvSpPr>
+        <p:spPr/>
+        <p:txBody>
+          <a:bodyPr/>
+          <a:lstStyle/>
+          <a:p>
+            <a:pPr algn="l"/>
+            <a:endParaRPr lang="de-DE" dirty="0"/>
+          </a:p>
+        </p:txBody>
+      </p:sp>
+      <p:sp>
+        <p:nvSpPr>
+          <p:cNvPr id="5" name="Foliennummernplatzhalter 4"/>
+          <p:cNvSpPr>
+            <a:spLocks noGrp="1"/>
+          </p:cNvSpPr>
+          <p:nvPr>
+            <p:ph type="sldNum" sz="quarter" idx="14"/>
+          </p:nvPr>
+        </p:nvSpPr>
+        <p:spPr/>
+        <p:txBody>
+          <a:bodyPr/>
+          <a:lstStyle/>
+          <a:p>
+            <a:fld id="{4506F84E-75D2-4715-B6C6-C971E49CE21A}" type="slidenum">
+              <a:rPr lang="de-DE" smtClean="0"/>
+              <a:pPr/>
+              <a:t>8</a:t>
+            </a:fld>
+            <a:endParaRPr lang="de-DE" dirty="0"/>
+          </a:p>
+        </p:txBody>
+      </p:sp>
+      <p:pic>
+        <p:nvPicPr>
+          <p:cNvPr id="7" name="Grafik 6"/>
+          <p:cNvPicPr>
+            <a:picLocks noChangeAspect="1"/>
+          </p:cNvPicPr>
+          <p:nvPr/>
+        </p:nvPicPr>
+        <p:blipFill>
+          <a:blip r:embed="rId2">
+            <a:extLst>
+              <a:ext uri="{28A0092B-C50C-407E-A947-70E740481C1C}">
+                <a14:useLocalDpi xmlns:a14="http://schemas.microsoft.com/office/drawing/2010/main" val="0"/>
+              </a:ext>
+            </a:extLst>
+          </a:blip>
+          <a:stretch>
+            <a:fillRect/>
+          </a:stretch>
+        </p:blipFill>
+        <p:spPr>
+          <a:xfrm>
+            <a:off x="383115" y="2547554"/>
+            <a:ext cx="8503298" cy="3534183"/>
+          </a:xfrm>
+          <a:prstGeom prst="rect">
+            <a:avLst/>
+          </a:prstGeom>
+        </p:spPr>
+      </p:pic>
+    </p:spTree>
+    <p:extLst>
+      <p:ext uri="{BB962C8B-B14F-4D97-AF65-F5344CB8AC3E}">
+        <p14:creationId xmlns:p14="http://schemas.microsoft.com/office/powerpoint/2010/main" val="3526108726"/>
+      </p:ext>
+    </p:extLst>
+  </p:cSld>
+  <p:clrMapOvr>
+    <a:masterClrMapping/>
+  </p:clrMapOvr>
+</p:sld>
+</file>
+
+<file path=ppt/slides/slide9.xml><?xml version="1.0" encoding="utf-8"?>
+<p:sld xmlns:a="http://schemas.openxmlformats.org/drawingml/2006/main" xmlns:r="http://schemas.openxmlformats.org/officeDocument/2006/relationships" xmlns:p="http://schemas.openxmlformats.org/presentationml/2006/main">
+  <p:cSld>
+    <p:spTree>
+      <p:nvGrpSpPr>
+        <p:cNvPr id="1" name=""/>
+        <p:cNvGrpSpPr/>
+        <p:nvPr/>
+      </p:nvGrpSpPr>
+      <p:grpSpPr>
+        <a:xfrm>
+          <a:off x="0" y="0"/>
+          <a:ext cx="0" cy="0"/>
+          <a:chOff x="0" y="0"/>
+          <a:chExt cx="0" cy="0"/>
+        </a:xfrm>
+      </p:grpSpPr>
+      <p:sp>
+        <p:nvSpPr>
+          <p:cNvPr id="2" name="Titel 1"/>
+          <p:cNvSpPr>
+            <a:spLocks noGrp="1"/>
+          </p:cNvSpPr>
+          <p:nvPr>
+            <p:ph type="ctrTitle"/>
+          </p:nvPr>
+        </p:nvSpPr>
+        <p:spPr>
+          <a:xfrm>
+            <a:off x="384000" y="2487600"/>
+            <a:ext cx="11424000" cy="443198"/>
+          </a:xfrm>
+        </p:spPr>
+        <p:txBody>
+          <a:bodyPr/>
+          <a:lstStyle/>
+          <a:p>
+            <a:r>
+              <a:rPr lang="en-US" dirty="0"/>
+              <a:t>Backend (+ </a:t>
+            </a:r>
+            <a:r>
+              <a:rPr lang="en-US" dirty="0" err="1"/>
+              <a:t>Datenbank</a:t>
+            </a:r>
+            <a:r>
+              <a:rPr lang="en-US" dirty="0"/>
+              <a:t>)</a:t>
+            </a:r>
+          </a:p>
+        </p:txBody>
+      </p:sp>
+    </p:spTree>
+    <p:extLst>
+      <p:ext uri="{BB962C8B-B14F-4D97-AF65-F5344CB8AC3E}">
+        <p14:creationId xmlns:p14="http://schemas.microsoft.com/office/powerpoint/2010/main" val="3331473797"/>
       </p:ext>
     </p:extLst>
   </p:cSld>

</xml_diff>

<commit_message>
Updated Presentation for the Alpha
</commit_message>
<xml_diff>
--- a/orga/Sprint_4_Presentation(Alpha).pptx
+++ b/orga/Sprint_4_Presentation(Alpha).pptx
@@ -5,26 +5,27 @@
     <p:sldMasterId id="2147483738" r:id="rId1"/>
   </p:sldMasterIdLst>
   <p:notesMasterIdLst>
-    <p:notesMasterId r:id="rId16"/>
+    <p:notesMasterId r:id="rId17"/>
   </p:notesMasterIdLst>
   <p:handoutMasterIdLst>
-    <p:handoutMasterId r:id="rId17"/>
+    <p:handoutMasterId r:id="rId18"/>
   </p:handoutMasterIdLst>
   <p:sldIdLst>
     <p:sldId id="256" r:id="rId2"/>
-    <p:sldId id="266" r:id="rId3"/>
-    <p:sldId id="277" r:id="rId4"/>
-    <p:sldId id="272" r:id="rId5"/>
-    <p:sldId id="262" r:id="rId6"/>
-    <p:sldId id="276" r:id="rId7"/>
-    <p:sldId id="281" r:id="rId8"/>
-    <p:sldId id="282" r:id="rId9"/>
-    <p:sldId id="267" r:id="rId10"/>
-    <p:sldId id="264" r:id="rId11"/>
-    <p:sldId id="278" r:id="rId12"/>
-    <p:sldId id="279" r:id="rId13"/>
-    <p:sldId id="280" r:id="rId14"/>
-    <p:sldId id="269" r:id="rId15"/>
+    <p:sldId id="283" r:id="rId3"/>
+    <p:sldId id="266" r:id="rId4"/>
+    <p:sldId id="277" r:id="rId5"/>
+    <p:sldId id="272" r:id="rId6"/>
+    <p:sldId id="262" r:id="rId7"/>
+    <p:sldId id="276" r:id="rId8"/>
+    <p:sldId id="281" r:id="rId9"/>
+    <p:sldId id="282" r:id="rId10"/>
+    <p:sldId id="267" r:id="rId11"/>
+    <p:sldId id="264" r:id="rId12"/>
+    <p:sldId id="278" r:id="rId13"/>
+    <p:sldId id="279" r:id="rId14"/>
+    <p:sldId id="280" r:id="rId15"/>
+    <p:sldId id="269" r:id="rId16"/>
   </p:sldIdLst>
   <p:sldSz cx="12192000" cy="6858000"/>
   <p:notesSz cx="7099300" cy="10234613"/>
@@ -303,7 +304,7 @@
               <a:pPr>
                 <a:defRPr/>
               </a:pPr>
-              <a:t>16.06.2017</a:t>
+              <a:t>17.06.2017</a:t>
             </a:fld>
             <a:endParaRPr lang="de-DE" sz="1000" dirty="0">
               <a:latin typeface="Arial" pitchFamily="34" charset="0"/>
@@ -532,7 +533,7 @@
               <a:pPr>
                 <a:defRPr/>
               </a:pPr>
-              <a:t>16.06.2017</a:t>
+              <a:t>17.06.2017</a:t>
             </a:fld>
             <a:endParaRPr lang="de-DE" dirty="0"/>
           </a:p>
@@ -4170,216 +4171,43 @@
       </p:grpSpPr>
       <p:sp>
         <p:nvSpPr>
-          <p:cNvPr id="5" name="Title 4"/>
+          <p:cNvPr id="2" name="Titel 1"/>
           <p:cNvSpPr>
             <a:spLocks noGrp="1"/>
           </p:cNvSpPr>
           <p:nvPr>
-            <p:ph type="title"/>
-          </p:nvPr>
-        </p:nvSpPr>
-        <p:spPr/>
+            <p:ph type="ctrTitle"/>
+          </p:nvPr>
+        </p:nvSpPr>
+        <p:spPr>
+          <a:xfrm>
+            <a:off x="384000" y="2487600"/>
+            <a:ext cx="11424000" cy="443198"/>
+          </a:xfrm>
+        </p:spPr>
         <p:txBody>
           <a:bodyPr/>
           <a:lstStyle/>
           <a:p>
             <a:r>
               <a:rPr lang="en-US" dirty="0"/>
-              <a:t>Backend Microservices </a:t>
-            </a:r>
-          </a:p>
-        </p:txBody>
-      </p:sp>
-      <p:sp>
-        <p:nvSpPr>
-          <p:cNvPr id="6" name="Content Placeholder 5"/>
-          <p:cNvSpPr>
-            <a:spLocks noGrp="1"/>
-          </p:cNvSpPr>
-          <p:nvPr>
-            <p:ph sz="quarter" idx="12"/>
-          </p:nvPr>
-        </p:nvSpPr>
-        <p:spPr/>
-        <p:txBody>
-          <a:bodyPr/>
-          <a:lstStyle/>
-          <a:p>
-            <a:pPr lvl="1"/>
-            <a:r>
-              <a:rPr lang="en-US" b="1" dirty="0"/>
-              <a:t>Importer:</a:t>
-            </a:r>
-          </a:p>
-          <a:p>
-            <a:pPr lvl="2"/>
-            <a:r>
-              <a:rPr lang="en-US" dirty="0"/>
-              <a:t>RESTful </a:t>
-            </a:r>
-            <a:r>
-              <a:rPr lang="en-US" dirty="0" err="1"/>
-              <a:t>Schnittstellen</a:t>
-            </a:r>
-            <a:r>
-              <a:rPr lang="en-US" dirty="0"/>
-              <a:t> </a:t>
-            </a:r>
-            <a:r>
-              <a:rPr lang="en-US" dirty="0" err="1"/>
-              <a:t>für</a:t>
-            </a:r>
-            <a:r>
-              <a:rPr lang="en-US" dirty="0"/>
-              <a:t> Import, Update, Delete von Tests</a:t>
-            </a:r>
-          </a:p>
-          <a:p>
-            <a:pPr lvl="2"/>
-            <a:endParaRPr lang="en-US" dirty="0"/>
-          </a:p>
-          <a:p>
-            <a:pPr lvl="1"/>
-            <a:r>
-              <a:rPr lang="en-US" b="1" dirty="0"/>
-              <a:t>Exporter:</a:t>
-            </a:r>
-          </a:p>
-          <a:p>
-            <a:pPr lvl="2"/>
-            <a:r>
-              <a:rPr lang="en-US" dirty="0"/>
-              <a:t>RESTful </a:t>
-            </a:r>
-            <a:r>
-              <a:rPr lang="en-US" dirty="0" err="1"/>
-              <a:t>Schnistellen</a:t>
-            </a:r>
-            <a:r>
-              <a:rPr lang="en-US" dirty="0"/>
-              <a:t> Export von Tests</a:t>
-            </a:r>
-          </a:p>
-          <a:p>
-            <a:pPr lvl="1"/>
-            <a:endParaRPr lang="en-US" dirty="0"/>
-          </a:p>
-          <a:p>
-            <a:pPr lvl="1"/>
-            <a:r>
-              <a:rPr lang="en-US" b="1" dirty="0"/>
-              <a:t>Database API: </a:t>
-            </a:r>
-          </a:p>
-          <a:p>
-            <a:pPr lvl="2"/>
-            <a:r>
-              <a:rPr lang="en-US" dirty="0"/>
-              <a:t>RESTful </a:t>
-            </a:r>
-            <a:r>
-              <a:rPr lang="en-US" dirty="0" err="1"/>
-              <a:t>Schnittstellen</a:t>
-            </a:r>
-            <a:r>
-              <a:rPr lang="en-US" dirty="0"/>
-              <a:t> </a:t>
-            </a:r>
-            <a:r>
-              <a:rPr lang="en-US" dirty="0" err="1"/>
-              <a:t>für</a:t>
-            </a:r>
-            <a:r>
-              <a:rPr lang="en-US" dirty="0"/>
-              <a:t> </a:t>
-            </a:r>
-            <a:r>
-              <a:rPr lang="en-US" dirty="0" err="1"/>
-              <a:t>Speichern</a:t>
-            </a:r>
-            <a:r>
-              <a:rPr lang="en-US" dirty="0"/>
-              <a:t> und </a:t>
-            </a:r>
-            <a:r>
-              <a:rPr lang="en-US" dirty="0" err="1"/>
-              <a:t>Lesen</a:t>
-            </a:r>
-            <a:r>
-              <a:rPr lang="en-US" dirty="0"/>
-              <a:t> von Tests in MySQL </a:t>
+              <a:t>Backend (+ </a:t>
             </a:r>
             <a:r>
               <a:rPr lang="en-US" dirty="0" err="1"/>
               <a:t>Datenbank</a:t>
             </a:r>
-            <a:endParaRPr lang="en-US" dirty="0"/>
-          </a:p>
-          <a:p>
-            <a:pPr lvl="2"/>
-            <a:endParaRPr lang="en-US" dirty="0"/>
-          </a:p>
-          <a:p>
-            <a:pPr lvl="1"/>
-            <a:r>
-              <a:rPr lang="en-US" b="1" dirty="0"/>
-              <a:t>Swagger </a:t>
-            </a:r>
-            <a:r>
-              <a:rPr lang="en-US" b="1" dirty="0" err="1"/>
-              <a:t>Dokumentation</a:t>
-            </a:r>
-            <a:endParaRPr lang="en-US" b="1" dirty="0"/>
-          </a:p>
-        </p:txBody>
-      </p:sp>
-      <p:sp>
-        <p:nvSpPr>
-          <p:cNvPr id="3" name="Footer Placeholder 2"/>
-          <p:cNvSpPr>
-            <a:spLocks noGrp="1"/>
-          </p:cNvSpPr>
-          <p:nvPr>
-            <p:ph type="ftr" sz="quarter" idx="13"/>
-          </p:nvPr>
-        </p:nvSpPr>
-        <p:spPr/>
-        <p:txBody>
-          <a:bodyPr/>
-          <a:lstStyle/>
-          <a:p>
-            <a:endParaRPr lang="de-DE" dirty="0"/>
-          </a:p>
-        </p:txBody>
-      </p:sp>
-      <p:sp>
-        <p:nvSpPr>
-          <p:cNvPr id="4" name="Slide Number Placeholder 3"/>
-          <p:cNvSpPr>
-            <a:spLocks noGrp="1"/>
-          </p:cNvSpPr>
-          <p:nvPr>
-            <p:ph type="sldNum" sz="quarter" idx="14"/>
-          </p:nvPr>
-        </p:nvSpPr>
-        <p:spPr/>
-        <p:txBody>
-          <a:bodyPr/>
-          <a:lstStyle/>
-          <a:p>
-            <a:fld id="{4506F84E-75D2-4715-B6C6-C971E49CE21A}" type="slidenum">
-              <a:rPr lang="de-DE" smtClean="0"/>
-              <a:pPr/>
-              <a:t>10</a:t>
-            </a:fld>
-            <a:endParaRPr lang="de-DE" dirty="0"/>
+            <a:r>
+              <a:rPr lang="en-US" dirty="0"/>
+              <a:t>)</a:t>
+            </a:r>
           </a:p>
         </p:txBody>
       </p:sp>
     </p:spTree>
     <p:extLst>
       <p:ext uri="{BB962C8B-B14F-4D97-AF65-F5344CB8AC3E}">
-        <p14:creationId xmlns:p14="http://schemas.microsoft.com/office/powerpoint/2010/main" val="361520676"/>
+        <p14:creationId xmlns:p14="http://schemas.microsoft.com/office/powerpoint/2010/main" val="3331473797"/>
       </p:ext>
     </p:extLst>
   </p:cSld>
@@ -4408,7 +4236,7 @@
       </p:grpSpPr>
       <p:sp>
         <p:nvSpPr>
-          <p:cNvPr id="2" name="Title 1"/>
+          <p:cNvPr id="5" name="Title 4"/>
           <p:cNvSpPr>
             <a:spLocks noGrp="1"/>
           </p:cNvSpPr>
@@ -4422,20 +4250,158 @@
           <a:lstStyle/>
           <a:p>
             <a:r>
+              <a:rPr lang="en-US" dirty="0"/>
+              <a:t>Backend Microservices </a:t>
+            </a:r>
+          </a:p>
+        </p:txBody>
+      </p:sp>
+      <p:sp>
+        <p:nvSpPr>
+          <p:cNvPr id="6" name="Content Placeholder 5"/>
+          <p:cNvSpPr>
+            <a:spLocks noGrp="1"/>
+          </p:cNvSpPr>
+          <p:nvPr>
+            <p:ph sz="quarter" idx="12"/>
+          </p:nvPr>
+        </p:nvSpPr>
+        <p:spPr/>
+        <p:txBody>
+          <a:bodyPr/>
+          <a:lstStyle/>
+          <a:p>
+            <a:pPr lvl="1"/>
+            <a:r>
+              <a:rPr lang="en-US" b="1" dirty="0"/>
+              <a:t>Importer:</a:t>
+            </a:r>
+          </a:p>
+          <a:p>
+            <a:pPr lvl="2"/>
+            <a:r>
+              <a:rPr lang="en-US" dirty="0"/>
+              <a:t>RESTful </a:t>
+            </a:r>
+            <a:r>
               <a:rPr lang="en-US" dirty="0" err="1"/>
-              <a:t>Datenmodell</a:t>
+              <a:t>Schnittstellen</a:t>
             </a:r>
             <a:r>
               <a:rPr lang="en-US" dirty="0"/>
               <a:t> </a:t>
             </a:r>
-            <a:endParaRPr lang="bg-BG" dirty="0"/>
-          </a:p>
-        </p:txBody>
-      </p:sp>
-      <p:sp>
-        <p:nvSpPr>
-          <p:cNvPr id="4" name="Footer Placeholder 3"/>
+            <a:r>
+              <a:rPr lang="en-US" dirty="0" err="1"/>
+              <a:t>für</a:t>
+            </a:r>
+            <a:r>
+              <a:rPr lang="en-US" dirty="0"/>
+              <a:t> Import, Update, Delete von Tests</a:t>
+            </a:r>
+          </a:p>
+          <a:p>
+            <a:pPr lvl="2"/>
+            <a:endParaRPr lang="en-US" dirty="0"/>
+          </a:p>
+          <a:p>
+            <a:pPr lvl="1"/>
+            <a:r>
+              <a:rPr lang="en-US" b="1" dirty="0"/>
+              <a:t>Exporter:</a:t>
+            </a:r>
+          </a:p>
+          <a:p>
+            <a:pPr lvl="2"/>
+            <a:r>
+              <a:rPr lang="en-US" dirty="0"/>
+              <a:t>RESTful </a:t>
+            </a:r>
+            <a:r>
+              <a:rPr lang="en-US" dirty="0" err="1"/>
+              <a:t>Schnistellen</a:t>
+            </a:r>
+            <a:r>
+              <a:rPr lang="en-US" dirty="0"/>
+              <a:t> Export von Tests</a:t>
+            </a:r>
+          </a:p>
+          <a:p>
+            <a:pPr lvl="1"/>
+            <a:endParaRPr lang="en-US" dirty="0"/>
+          </a:p>
+          <a:p>
+            <a:pPr lvl="1"/>
+            <a:r>
+              <a:rPr lang="en-US" b="1" dirty="0"/>
+              <a:t>Database API: </a:t>
+            </a:r>
+          </a:p>
+          <a:p>
+            <a:pPr lvl="2"/>
+            <a:r>
+              <a:rPr lang="en-US" dirty="0"/>
+              <a:t>RESTful </a:t>
+            </a:r>
+            <a:r>
+              <a:rPr lang="en-US" dirty="0" err="1"/>
+              <a:t>Schnittstellen</a:t>
+            </a:r>
+            <a:r>
+              <a:rPr lang="en-US" dirty="0"/>
+              <a:t> </a:t>
+            </a:r>
+            <a:r>
+              <a:rPr lang="en-US" dirty="0" err="1"/>
+              <a:t>für</a:t>
+            </a:r>
+            <a:r>
+              <a:rPr lang="en-US" dirty="0"/>
+              <a:t> </a:t>
+            </a:r>
+            <a:r>
+              <a:rPr lang="en-US" dirty="0" err="1"/>
+              <a:t>Speichern</a:t>
+            </a:r>
+            <a:r>
+              <a:rPr lang="en-US" dirty="0"/>
+              <a:t> und </a:t>
+            </a:r>
+            <a:r>
+              <a:rPr lang="en-US" dirty="0" err="1"/>
+              <a:t>Lesen</a:t>
+            </a:r>
+            <a:r>
+              <a:rPr lang="en-US" dirty="0"/>
+              <a:t> von Tests in MySQL </a:t>
+            </a:r>
+            <a:r>
+              <a:rPr lang="en-US" dirty="0" err="1"/>
+              <a:t>Datenbank</a:t>
+            </a:r>
+            <a:endParaRPr lang="en-US" dirty="0"/>
+          </a:p>
+          <a:p>
+            <a:pPr lvl="2"/>
+            <a:endParaRPr lang="en-US" dirty="0"/>
+          </a:p>
+          <a:p>
+            <a:pPr lvl="1"/>
+            <a:r>
+              <a:rPr lang="en-US" b="1" dirty="0"/>
+              <a:t>Swagger </a:t>
+            </a:r>
+            <a:r>
+              <a:rPr lang="en-US" b="1" dirty="0" err="1"/>
+              <a:t>Dokumentation</a:t>
+            </a:r>
+            <a:endParaRPr lang="en-US" b="1" dirty="0"/>
+          </a:p>
+        </p:txBody>
+      </p:sp>
+      <p:sp>
+        <p:nvSpPr>
+          <p:cNvPr id="3" name="Footer Placeholder 2"/>
           <p:cNvSpPr>
             <a:spLocks noGrp="1"/>
           </p:cNvSpPr>
@@ -4448,14 +4414,13 @@
           <a:bodyPr/>
           <a:lstStyle/>
           <a:p>
-            <a:pPr algn="l"/>
             <a:endParaRPr lang="de-DE" dirty="0"/>
           </a:p>
         </p:txBody>
       </p:sp>
       <p:sp>
         <p:nvSpPr>
-          <p:cNvPr id="5" name="Slide Number Placeholder 4"/>
+          <p:cNvPr id="4" name="Slide Number Placeholder 3"/>
           <p:cNvSpPr>
             <a:spLocks noGrp="1"/>
           </p:cNvSpPr>
@@ -4472,6 +4437,107 @@
               <a:rPr lang="de-DE" smtClean="0"/>
               <a:pPr/>
               <a:t>11</a:t>
+            </a:fld>
+            <a:endParaRPr lang="de-DE" dirty="0"/>
+          </a:p>
+        </p:txBody>
+      </p:sp>
+    </p:spTree>
+    <p:extLst>
+      <p:ext uri="{BB962C8B-B14F-4D97-AF65-F5344CB8AC3E}">
+        <p14:creationId xmlns:p14="http://schemas.microsoft.com/office/powerpoint/2010/main" val="361520676"/>
+      </p:ext>
+    </p:extLst>
+  </p:cSld>
+  <p:clrMapOvr>
+    <a:masterClrMapping/>
+  </p:clrMapOvr>
+</p:sld>
+</file>
+
+<file path=ppt/slides/slide12.xml><?xml version="1.0" encoding="utf-8"?>
+<p:sld xmlns:a="http://schemas.openxmlformats.org/drawingml/2006/main" xmlns:r="http://schemas.openxmlformats.org/officeDocument/2006/relationships" xmlns:p="http://schemas.openxmlformats.org/presentationml/2006/main">
+  <p:cSld>
+    <p:spTree>
+      <p:nvGrpSpPr>
+        <p:cNvPr id="1" name=""/>
+        <p:cNvGrpSpPr/>
+        <p:nvPr/>
+      </p:nvGrpSpPr>
+      <p:grpSpPr>
+        <a:xfrm>
+          <a:off x="0" y="0"/>
+          <a:ext cx="0" cy="0"/>
+          <a:chOff x="0" y="0"/>
+          <a:chExt cx="0" cy="0"/>
+        </a:xfrm>
+      </p:grpSpPr>
+      <p:sp>
+        <p:nvSpPr>
+          <p:cNvPr id="2" name="Title 1"/>
+          <p:cNvSpPr>
+            <a:spLocks noGrp="1"/>
+          </p:cNvSpPr>
+          <p:nvPr>
+            <p:ph type="title"/>
+          </p:nvPr>
+        </p:nvSpPr>
+        <p:spPr/>
+        <p:txBody>
+          <a:bodyPr/>
+          <a:lstStyle/>
+          <a:p>
+            <a:r>
+              <a:rPr lang="en-US" dirty="0" err="1"/>
+              <a:t>Datenmodell</a:t>
+            </a:r>
+            <a:r>
+              <a:rPr lang="en-US" dirty="0"/>
+              <a:t> </a:t>
+            </a:r>
+            <a:endParaRPr lang="bg-BG" dirty="0"/>
+          </a:p>
+        </p:txBody>
+      </p:sp>
+      <p:sp>
+        <p:nvSpPr>
+          <p:cNvPr id="4" name="Footer Placeholder 3"/>
+          <p:cNvSpPr>
+            <a:spLocks noGrp="1"/>
+          </p:cNvSpPr>
+          <p:nvPr>
+            <p:ph type="ftr" sz="quarter" idx="13"/>
+          </p:nvPr>
+        </p:nvSpPr>
+        <p:spPr/>
+        <p:txBody>
+          <a:bodyPr/>
+          <a:lstStyle/>
+          <a:p>
+            <a:pPr algn="l"/>
+            <a:endParaRPr lang="de-DE" dirty="0"/>
+          </a:p>
+        </p:txBody>
+      </p:sp>
+      <p:sp>
+        <p:nvSpPr>
+          <p:cNvPr id="5" name="Slide Number Placeholder 4"/>
+          <p:cNvSpPr>
+            <a:spLocks noGrp="1"/>
+          </p:cNvSpPr>
+          <p:nvPr>
+            <p:ph type="sldNum" sz="quarter" idx="14"/>
+          </p:nvPr>
+        </p:nvSpPr>
+        <p:spPr/>
+        <p:txBody>
+          <a:bodyPr/>
+          <a:lstStyle/>
+          <a:p>
+            <a:fld id="{4506F84E-75D2-4715-B6C6-C971E49CE21A}" type="slidenum">
+              <a:rPr lang="de-DE" smtClean="0"/>
+              <a:pPr/>
+              <a:t>12</a:t>
             </a:fld>
             <a:endParaRPr lang="de-DE" dirty="0"/>
           </a:p>
@@ -5429,71 +5495,6 @@
 </p:sld>
 </file>
 
-<file path=ppt/slides/slide12.xml><?xml version="1.0" encoding="utf-8"?>
-<p:sld xmlns:a="http://schemas.openxmlformats.org/drawingml/2006/main" xmlns:r="http://schemas.openxmlformats.org/officeDocument/2006/relationships" xmlns:p="http://schemas.openxmlformats.org/presentationml/2006/main">
-  <p:cSld>
-    <p:spTree>
-      <p:nvGrpSpPr>
-        <p:cNvPr id="1" name=""/>
-        <p:cNvGrpSpPr/>
-        <p:nvPr/>
-      </p:nvGrpSpPr>
-      <p:grpSpPr>
-        <a:xfrm>
-          <a:off x="0" y="0"/>
-          <a:ext cx="0" cy="0"/>
-          <a:chOff x="0" y="0"/>
-          <a:chExt cx="0" cy="0"/>
-        </a:xfrm>
-      </p:grpSpPr>
-      <p:sp>
-        <p:nvSpPr>
-          <p:cNvPr id="2" name="Titel 1"/>
-          <p:cNvSpPr>
-            <a:spLocks noGrp="1"/>
-          </p:cNvSpPr>
-          <p:nvPr>
-            <p:ph type="ctrTitle"/>
-          </p:nvPr>
-        </p:nvSpPr>
-        <p:spPr>
-          <a:xfrm>
-            <a:off x="384000" y="2487600"/>
-            <a:ext cx="11424000" cy="443198"/>
-          </a:xfrm>
-        </p:spPr>
-        <p:txBody>
-          <a:bodyPr/>
-          <a:lstStyle/>
-          <a:p>
-            <a:r>
-              <a:rPr lang="en-US" dirty="0"/>
-              <a:t>Features </a:t>
-            </a:r>
-            <a:r>
-              <a:rPr lang="en-US" dirty="0" err="1"/>
-              <a:t>für</a:t>
-            </a:r>
-            <a:r>
-              <a:rPr lang="en-US" dirty="0"/>
-              <a:t> Beta Version</a:t>
-            </a:r>
-          </a:p>
-        </p:txBody>
-      </p:sp>
-    </p:spTree>
-    <p:extLst>
-      <p:ext uri="{BB962C8B-B14F-4D97-AF65-F5344CB8AC3E}">
-        <p14:creationId xmlns:p14="http://schemas.microsoft.com/office/powerpoint/2010/main" val="4250935669"/>
-      </p:ext>
-    </p:extLst>
-  </p:cSld>
-  <p:clrMapOvr>
-    <a:masterClrMapping/>
-  </p:clrMapOvr>
-</p:sld>
-</file>
-
 <file path=ppt/slides/slide13.xml><?xml version="1.0" encoding="utf-8"?>
 <p:sld xmlns:a="http://schemas.openxmlformats.org/drawingml/2006/main" xmlns:r="http://schemas.openxmlformats.org/officeDocument/2006/relationships" xmlns:p="http://schemas.openxmlformats.org/presentationml/2006/main">
   <p:cSld>
@@ -5513,6 +5514,71 @@
       </p:grpSpPr>
       <p:sp>
         <p:nvSpPr>
+          <p:cNvPr id="2" name="Titel 1"/>
+          <p:cNvSpPr>
+            <a:spLocks noGrp="1"/>
+          </p:cNvSpPr>
+          <p:nvPr>
+            <p:ph type="ctrTitle"/>
+          </p:nvPr>
+        </p:nvSpPr>
+        <p:spPr>
+          <a:xfrm>
+            <a:off x="384000" y="2487600"/>
+            <a:ext cx="11424000" cy="443198"/>
+          </a:xfrm>
+        </p:spPr>
+        <p:txBody>
+          <a:bodyPr/>
+          <a:lstStyle/>
+          <a:p>
+            <a:r>
+              <a:rPr lang="en-US" dirty="0"/>
+              <a:t>Features </a:t>
+            </a:r>
+            <a:r>
+              <a:rPr lang="en-US" dirty="0" err="1"/>
+              <a:t>für</a:t>
+            </a:r>
+            <a:r>
+              <a:rPr lang="en-US" dirty="0"/>
+              <a:t> Beta Version</a:t>
+            </a:r>
+          </a:p>
+        </p:txBody>
+      </p:sp>
+    </p:spTree>
+    <p:extLst>
+      <p:ext uri="{BB962C8B-B14F-4D97-AF65-F5344CB8AC3E}">
+        <p14:creationId xmlns:p14="http://schemas.microsoft.com/office/powerpoint/2010/main" val="4250935669"/>
+      </p:ext>
+    </p:extLst>
+  </p:cSld>
+  <p:clrMapOvr>
+    <a:masterClrMapping/>
+  </p:clrMapOvr>
+</p:sld>
+</file>
+
+<file path=ppt/slides/slide14.xml><?xml version="1.0" encoding="utf-8"?>
+<p:sld xmlns:a="http://schemas.openxmlformats.org/drawingml/2006/main" xmlns:r="http://schemas.openxmlformats.org/officeDocument/2006/relationships" xmlns:p="http://schemas.openxmlformats.org/presentationml/2006/main">
+  <p:cSld>
+    <p:spTree>
+      <p:nvGrpSpPr>
+        <p:cNvPr id="1" name=""/>
+        <p:cNvGrpSpPr/>
+        <p:nvPr/>
+      </p:nvGrpSpPr>
+      <p:grpSpPr>
+        <a:xfrm>
+          <a:off x="0" y="0"/>
+          <a:ext cx="0" cy="0"/>
+          <a:chOff x="0" y="0"/>
+          <a:chExt cx="0" cy="0"/>
+        </a:xfrm>
+      </p:grpSpPr>
+      <p:sp>
+        <p:nvSpPr>
           <p:cNvPr id="5" name="Title 4"/>
           <p:cNvSpPr>
             <a:spLocks noGrp="1"/>
@@ -5690,7 +5756,7 @@
             <a:fld id="{4506F84E-75D2-4715-B6C6-C971E49CE21A}" type="slidenum">
               <a:rPr lang="de-DE" smtClean="0"/>
               <a:pPr/>
-              <a:t>13</a:t>
+              <a:t>14</a:t>
             </a:fld>
             <a:endParaRPr lang="de-DE" dirty="0"/>
           </a:p>
@@ -5709,7 +5775,7 @@
 </p:sld>
 </file>
 
-<file path=ppt/slides/slide14.xml><?xml version="1.0" encoding="utf-8"?>
+<file path=ppt/slides/slide15.xml><?xml version="1.0" encoding="utf-8"?>
 <p:sld xmlns:a="http://schemas.openxmlformats.org/drawingml/2006/main" xmlns:r="http://schemas.openxmlformats.org/officeDocument/2006/relationships" xmlns:p="http://schemas.openxmlformats.org/presentationml/2006/main">
   <p:cSld>
     <p:spTree>
@@ -5806,44 +5872,317 @@
       </p:grpSpPr>
       <p:sp>
         <p:nvSpPr>
-          <p:cNvPr id="2" name="Titel 1"/>
+          <p:cNvPr id="2" name="Title 1"/>
           <p:cNvSpPr>
             <a:spLocks noGrp="1"/>
           </p:cNvSpPr>
           <p:nvPr>
-            <p:ph type="ctrTitle"/>
-          </p:nvPr>
-        </p:nvSpPr>
-        <p:spPr>
-          <a:xfrm>
-            <a:off x="384000" y="2487600"/>
-            <a:ext cx="11424000" cy="443198"/>
-          </a:xfrm>
-        </p:spPr>
+            <p:ph type="title"/>
+          </p:nvPr>
+        </p:nvSpPr>
+        <p:spPr/>
         <p:txBody>
           <a:bodyPr/>
           <a:lstStyle/>
           <a:p>
             <a:r>
               <a:rPr lang="en-US" dirty="0" err="1"/>
+              <a:t>Aufgabenstellung</a:t>
+            </a:r>
+            <a:endParaRPr lang="bg-BG" dirty="0"/>
+          </a:p>
+        </p:txBody>
+      </p:sp>
+      <p:sp>
+        <p:nvSpPr>
+          <p:cNvPr id="3" name="Content Placeholder 2"/>
+          <p:cNvSpPr>
+            <a:spLocks noGrp="1"/>
+          </p:cNvSpPr>
+          <p:nvPr>
+            <p:ph sz="quarter" idx="12"/>
+          </p:nvPr>
+        </p:nvSpPr>
+        <p:spPr/>
+        <p:txBody>
+          <a:bodyPr/>
+          <a:lstStyle/>
+          <a:p>
+            <a:pPr marL="457200" indent="-457200">
+              <a:buFont typeface="Arial" panose="020B0604020202020204" pitchFamily="34" charset="0"/>
+              <a:buChar char="•"/>
+            </a:pPr>
+            <a:r>
+              <a:rPr lang="en-US" dirty="0"/>
+              <a:t>Web </a:t>
+            </a:r>
+            <a:r>
+              <a:rPr lang="en-US" dirty="0" err="1"/>
+              <a:t>basiertes</a:t>
+            </a:r>
+            <a:r>
+              <a:rPr lang="en-US" dirty="0"/>
+              <a:t> System </a:t>
+            </a:r>
+            <a:r>
+              <a:rPr lang="en-US" dirty="0" err="1"/>
+              <a:t>mit</a:t>
+            </a:r>
+            <a:r>
+              <a:rPr lang="en-US" dirty="0"/>
+              <a:t> Microservice </a:t>
+            </a:r>
+            <a:r>
+              <a:rPr lang="en-US" dirty="0" err="1"/>
               <a:t>Architektur</a:t>
             </a:r>
             <a:r>
               <a:rPr lang="en-US" dirty="0"/>
-              <a:t> + </a:t>
+              <a:t> </a:t>
             </a:r>
             <a:r>
               <a:rPr lang="en-US" dirty="0" err="1"/>
-              <a:t>Technologien</a:t>
-            </a:r>
-            <a:endParaRPr lang="en-US" dirty="0"/>
+              <a:t>zur</a:t>
+            </a:r>
+            <a:r>
+              <a:rPr lang="en-US" dirty="0"/>
+              <a:t> </a:t>
+            </a:r>
+            <a:r>
+              <a:rPr lang="en-US" dirty="0" err="1"/>
+              <a:t>Verwaltung</a:t>
+            </a:r>
+            <a:r>
+              <a:rPr lang="en-US" dirty="0"/>
+              <a:t> von Tests</a:t>
+            </a:r>
+          </a:p>
+          <a:p>
+            <a:pPr marL="457200" indent="-457200">
+              <a:buFont typeface="Arial" panose="020B0604020202020204" pitchFamily="34" charset="0"/>
+              <a:buChar char="•"/>
+            </a:pPr>
+            <a:r>
+              <a:rPr lang="en-US" dirty="0"/>
+              <a:t>CSV </a:t>
+            </a:r>
+            <a:r>
+              <a:rPr lang="en-US" dirty="0" err="1"/>
+              <a:t>Dateien</a:t>
+            </a:r>
+            <a:r>
+              <a:rPr lang="en-US" dirty="0"/>
+              <a:t> </a:t>
+            </a:r>
+            <a:r>
+              <a:rPr lang="en-US" dirty="0" err="1"/>
+              <a:t>mit</a:t>
+            </a:r>
+            <a:r>
+              <a:rPr lang="en-US" dirty="0"/>
+              <a:t> </a:t>
+            </a:r>
+            <a:r>
+              <a:rPr lang="en-US" dirty="0" err="1"/>
+              <a:t>Testdaten</a:t>
+            </a:r>
+            <a:r>
+              <a:rPr lang="en-US" dirty="0"/>
+              <a:t> </a:t>
+            </a:r>
+            <a:r>
+              <a:rPr lang="en-US" dirty="0" err="1"/>
+              <a:t>im</a:t>
+            </a:r>
+            <a:r>
+              <a:rPr lang="en-US" dirty="0"/>
+              <a:t> Frontend </a:t>
+            </a:r>
+            <a:r>
+              <a:rPr lang="en-US" dirty="0" err="1"/>
+              <a:t>importieren</a:t>
+            </a:r>
+            <a:r>
+              <a:rPr lang="en-US" dirty="0"/>
+              <a:t> und </a:t>
+            </a:r>
+          </a:p>
+          <a:p>
+            <a:pPr marL="0" lvl="1" indent="0">
+              <a:buNone/>
+            </a:pPr>
+            <a:r>
+              <a:rPr lang="en-US" dirty="0"/>
+              <a:t>      in </a:t>
+            </a:r>
+            <a:r>
+              <a:rPr lang="en-US" dirty="0" err="1"/>
+              <a:t>einer</a:t>
+            </a:r>
+            <a:r>
+              <a:rPr lang="en-US" dirty="0"/>
+              <a:t> </a:t>
+            </a:r>
+            <a:r>
+              <a:rPr lang="en-US" dirty="0" err="1"/>
+              <a:t>Datenbank</a:t>
+            </a:r>
+            <a:r>
+              <a:rPr lang="en-US" dirty="0"/>
+              <a:t> Speicher</a:t>
+            </a:r>
+          </a:p>
+          <a:p>
+            <a:pPr lvl="1"/>
+            <a:r>
+              <a:rPr lang="en-US" dirty="0" err="1"/>
+              <a:t>Zusätzliche</a:t>
+            </a:r>
+            <a:r>
+              <a:rPr lang="en-US" dirty="0"/>
+              <a:t> Features </a:t>
+            </a:r>
+            <a:r>
+              <a:rPr lang="en-US" dirty="0" err="1"/>
+              <a:t>sind</a:t>
+            </a:r>
+            <a:r>
+              <a:rPr lang="en-US" dirty="0"/>
+              <a:t> </a:t>
+            </a:r>
+            <a:r>
+              <a:rPr lang="en-US" dirty="0" err="1"/>
+              <a:t>auch</a:t>
+            </a:r>
+            <a:r>
+              <a:rPr lang="en-US" dirty="0"/>
+              <a:t> </a:t>
+            </a:r>
+            <a:r>
+              <a:rPr lang="en-US" dirty="0" err="1"/>
+              <a:t>gewünscht</a:t>
+            </a:r>
+            <a:r>
+              <a:rPr lang="en-US" dirty="0"/>
+              <a:t> </a:t>
+            </a:r>
+          </a:p>
+          <a:p>
+            <a:pPr lvl="1"/>
+            <a:r>
+              <a:rPr lang="en-US" dirty="0" err="1"/>
+              <a:t>Technologieanforderung</a:t>
+            </a:r>
+            <a:r>
+              <a:rPr lang="en-US" dirty="0"/>
+              <a:t>: </a:t>
+            </a:r>
+          </a:p>
+          <a:p>
+            <a:pPr lvl="2"/>
+            <a:r>
+              <a:rPr lang="en-US" dirty="0"/>
+              <a:t>Spring Boot </a:t>
+            </a:r>
+            <a:r>
+              <a:rPr lang="en-US" dirty="0" err="1"/>
+              <a:t>für</a:t>
+            </a:r>
+            <a:r>
+              <a:rPr lang="en-US" dirty="0"/>
+              <a:t> die </a:t>
+            </a:r>
+            <a:r>
+              <a:rPr lang="en-US" dirty="0" err="1"/>
+              <a:t>verschiedenen</a:t>
+            </a:r>
+            <a:r>
+              <a:rPr lang="en-US" dirty="0"/>
+              <a:t> Microservices </a:t>
+            </a:r>
+            <a:r>
+              <a:rPr lang="en-US" dirty="0" err="1"/>
+              <a:t>im</a:t>
+            </a:r>
+            <a:r>
+              <a:rPr lang="en-US" dirty="0"/>
+              <a:t> Backend</a:t>
+            </a:r>
+          </a:p>
+          <a:p>
+            <a:pPr lvl="2"/>
+            <a:r>
+              <a:rPr lang="en-US" dirty="0"/>
+              <a:t>Angular </a:t>
+            </a:r>
+            <a:r>
+              <a:rPr lang="en-US" dirty="0" err="1"/>
+              <a:t>o.ä</a:t>
+            </a:r>
+            <a:r>
+              <a:rPr lang="en-US" dirty="0"/>
+              <a:t>. Framework </a:t>
+            </a:r>
+            <a:r>
+              <a:rPr lang="en-US" dirty="0" err="1"/>
+              <a:t>für</a:t>
+            </a:r>
+            <a:r>
+              <a:rPr lang="en-US" dirty="0"/>
+              <a:t> Frontend</a:t>
+            </a:r>
+            <a:endParaRPr lang="bg-BG" dirty="0"/>
+          </a:p>
+        </p:txBody>
+      </p:sp>
+      <p:sp>
+        <p:nvSpPr>
+          <p:cNvPr id="4" name="Footer Placeholder 3"/>
+          <p:cNvSpPr>
+            <a:spLocks noGrp="1"/>
+          </p:cNvSpPr>
+          <p:nvPr>
+            <p:ph type="ftr" sz="quarter" idx="13"/>
+          </p:nvPr>
+        </p:nvSpPr>
+        <p:spPr/>
+        <p:txBody>
+          <a:bodyPr/>
+          <a:lstStyle/>
+          <a:p>
+            <a:pPr algn="l"/>
+            <a:endParaRPr lang="de-DE" dirty="0"/>
+          </a:p>
+        </p:txBody>
+      </p:sp>
+      <p:sp>
+        <p:nvSpPr>
+          <p:cNvPr id="5" name="Slide Number Placeholder 4"/>
+          <p:cNvSpPr>
+            <a:spLocks noGrp="1"/>
+          </p:cNvSpPr>
+          <p:nvPr>
+            <p:ph type="sldNum" sz="quarter" idx="14"/>
+          </p:nvPr>
+        </p:nvSpPr>
+        <p:spPr/>
+        <p:txBody>
+          <a:bodyPr/>
+          <a:lstStyle/>
+          <a:p>
+            <a:fld id="{4506F84E-75D2-4715-B6C6-C971E49CE21A}" type="slidenum">
+              <a:rPr lang="de-DE" smtClean="0"/>
+              <a:pPr/>
+              <a:t>2</a:t>
+            </a:fld>
+            <a:endParaRPr lang="de-DE" dirty="0"/>
           </a:p>
         </p:txBody>
       </p:sp>
     </p:spTree>
     <p:extLst>
       <p:ext uri="{BB962C8B-B14F-4D97-AF65-F5344CB8AC3E}">
-        <p14:creationId xmlns:p14="http://schemas.microsoft.com/office/powerpoint/2010/main" val="4293155205"/>
+        <p14:creationId xmlns:p14="http://schemas.microsoft.com/office/powerpoint/2010/main" val="2462763281"/>
       </p:ext>
     </p:extLst>
   </p:cSld>
@@ -5872,6 +6211,72 @@
       </p:grpSpPr>
       <p:sp>
         <p:nvSpPr>
+          <p:cNvPr id="2" name="Titel 1"/>
+          <p:cNvSpPr>
+            <a:spLocks noGrp="1"/>
+          </p:cNvSpPr>
+          <p:nvPr>
+            <p:ph type="ctrTitle"/>
+          </p:nvPr>
+        </p:nvSpPr>
+        <p:spPr>
+          <a:xfrm>
+            <a:off x="384000" y="2487600"/>
+            <a:ext cx="11424000" cy="443198"/>
+          </a:xfrm>
+        </p:spPr>
+        <p:txBody>
+          <a:bodyPr/>
+          <a:lstStyle/>
+          <a:p>
+            <a:r>
+              <a:rPr lang="en-US" dirty="0" err="1"/>
+              <a:t>Architektur</a:t>
+            </a:r>
+            <a:r>
+              <a:rPr lang="en-US" dirty="0"/>
+              <a:t> + </a:t>
+            </a:r>
+            <a:r>
+              <a:rPr lang="en-US" dirty="0" err="1"/>
+              <a:t>Technologien</a:t>
+            </a:r>
+            <a:endParaRPr lang="en-US" dirty="0"/>
+          </a:p>
+        </p:txBody>
+      </p:sp>
+    </p:spTree>
+    <p:extLst>
+      <p:ext uri="{BB962C8B-B14F-4D97-AF65-F5344CB8AC3E}">
+        <p14:creationId xmlns:p14="http://schemas.microsoft.com/office/powerpoint/2010/main" val="4293155205"/>
+      </p:ext>
+    </p:extLst>
+  </p:cSld>
+  <p:clrMapOvr>
+    <a:masterClrMapping/>
+  </p:clrMapOvr>
+</p:sld>
+</file>
+
+<file path=ppt/slides/slide4.xml><?xml version="1.0" encoding="utf-8"?>
+<p:sld xmlns:a="http://schemas.openxmlformats.org/drawingml/2006/main" xmlns:r="http://schemas.openxmlformats.org/officeDocument/2006/relationships" xmlns:p="http://schemas.openxmlformats.org/presentationml/2006/main">
+  <p:cSld>
+    <p:spTree>
+      <p:nvGrpSpPr>
+        <p:cNvPr id="1" name=""/>
+        <p:cNvGrpSpPr/>
+        <p:nvPr/>
+      </p:nvGrpSpPr>
+      <p:grpSpPr>
+        <a:xfrm>
+          <a:off x="0" y="0"/>
+          <a:ext cx="0" cy="0"/>
+          <a:chOff x="0" y="0"/>
+          <a:chExt cx="0" cy="0"/>
+        </a:xfrm>
+      </p:grpSpPr>
+      <p:sp>
+        <p:nvSpPr>
           <p:cNvPr id="2" name="Title 1"/>
           <p:cNvSpPr>
             <a:spLocks noGrp="1"/>
@@ -5931,7 +6336,7 @@
             <a:fld id="{4506F84E-75D2-4715-B6C6-C971E49CE21A}" type="slidenum">
               <a:rPr lang="de-DE" smtClean="0"/>
               <a:pPr/>
-              <a:t>3</a:t>
+              <a:t>4</a:t>
             </a:fld>
             <a:endParaRPr lang="de-DE" dirty="0"/>
           </a:p>
@@ -6050,7 +6455,7 @@
 </p:sld>
 </file>
 
-<file path=ppt/slides/slide4.xml><?xml version="1.0" encoding="utf-8"?>
+<file path=ppt/slides/slide5.xml><?xml version="1.0" encoding="utf-8"?>
 <p:sld xmlns:a="http://schemas.openxmlformats.org/drawingml/2006/main" xmlns:r="http://schemas.openxmlformats.org/officeDocument/2006/relationships" xmlns:p="http://schemas.openxmlformats.org/presentationml/2006/main">
   <p:cSld>
     <p:spTree>
@@ -7160,63 +7565,6 @@
 </p:sld>
 </file>
 
-<file path=ppt/slides/slide5.xml><?xml version="1.0" encoding="utf-8"?>
-<p:sld xmlns:a="http://schemas.openxmlformats.org/drawingml/2006/main" xmlns:r="http://schemas.openxmlformats.org/officeDocument/2006/relationships" xmlns:p="http://schemas.openxmlformats.org/presentationml/2006/main">
-  <p:cSld>
-    <p:spTree>
-      <p:nvGrpSpPr>
-        <p:cNvPr id="1" name=""/>
-        <p:cNvGrpSpPr/>
-        <p:nvPr/>
-      </p:nvGrpSpPr>
-      <p:grpSpPr>
-        <a:xfrm>
-          <a:off x="0" y="0"/>
-          <a:ext cx="0" cy="0"/>
-          <a:chOff x="0" y="0"/>
-          <a:chExt cx="0" cy="0"/>
-        </a:xfrm>
-      </p:grpSpPr>
-      <p:sp>
-        <p:nvSpPr>
-          <p:cNvPr id="2" name="Titel 1"/>
-          <p:cNvSpPr>
-            <a:spLocks noGrp="1"/>
-          </p:cNvSpPr>
-          <p:nvPr>
-            <p:ph type="ctrTitle"/>
-          </p:nvPr>
-        </p:nvSpPr>
-        <p:spPr>
-          <a:xfrm>
-            <a:off x="384000" y="2487600"/>
-            <a:ext cx="11424000" cy="443198"/>
-          </a:xfrm>
-        </p:spPr>
-        <p:txBody>
-          <a:bodyPr/>
-          <a:lstStyle/>
-          <a:p>
-            <a:r>
-              <a:rPr lang="en-US" dirty="0"/>
-              <a:t>Frontend </a:t>
-            </a:r>
-          </a:p>
-        </p:txBody>
-      </p:sp>
-    </p:spTree>
-    <p:extLst>
-      <p:ext uri="{BB962C8B-B14F-4D97-AF65-F5344CB8AC3E}">
-        <p14:creationId xmlns:p14="http://schemas.microsoft.com/office/powerpoint/2010/main" val="3084618864"/>
-      </p:ext>
-    </p:extLst>
-  </p:cSld>
-  <p:clrMapOvr>
-    <a:masterClrMapping/>
-  </p:clrMapOvr>
-</p:sld>
-</file>
-
 <file path=ppt/slides/slide6.xml><?xml version="1.0" encoding="utf-8"?>
 <p:sld xmlns:a="http://schemas.openxmlformats.org/drawingml/2006/main" xmlns:r="http://schemas.openxmlformats.org/officeDocument/2006/relationships" xmlns:p="http://schemas.openxmlformats.org/presentationml/2006/main">
   <p:cSld>
@@ -7256,7 +7604,7 @@
           <a:p>
             <a:r>
               <a:rPr lang="en-US" dirty="0"/>
-              <a:t>API</a:t>
+              <a:t>Frontend </a:t>
             </a:r>
           </a:p>
         </p:txBody>
@@ -7264,7 +7612,7 @@
     </p:spTree>
     <p:extLst>
       <p:ext uri="{BB962C8B-B14F-4D97-AF65-F5344CB8AC3E}">
-        <p14:creationId xmlns:p14="http://schemas.microsoft.com/office/powerpoint/2010/main" val="3301941064"/>
+        <p14:creationId xmlns:p14="http://schemas.microsoft.com/office/powerpoint/2010/main" val="3084618864"/>
       </p:ext>
     </p:extLst>
   </p:cSld>
@@ -7293,22 +7641,79 @@
       </p:grpSpPr>
       <p:sp>
         <p:nvSpPr>
-          <p:cNvPr id="5" name="Title 4"/>
+          <p:cNvPr id="2" name="Titel 1"/>
           <p:cNvSpPr>
             <a:spLocks noGrp="1"/>
           </p:cNvSpPr>
           <p:nvPr>
-            <p:ph type="title"/>
-          </p:nvPr>
-        </p:nvSpPr>
-        <p:spPr/>
+            <p:ph type="ctrTitle"/>
+          </p:nvPr>
+        </p:nvSpPr>
+        <p:spPr>
+          <a:xfrm>
+            <a:off x="384000" y="2487600"/>
+            <a:ext cx="11424000" cy="443198"/>
+          </a:xfrm>
+        </p:spPr>
         <p:txBody>
           <a:bodyPr/>
           <a:lstStyle/>
           <a:p>
             <a:r>
               <a:rPr lang="en-US" dirty="0"/>
-              <a:t>API (Nils)</a:t>
+              <a:t>API</a:t>
+            </a:r>
+          </a:p>
+        </p:txBody>
+      </p:sp>
+    </p:spTree>
+    <p:extLst>
+      <p:ext uri="{BB962C8B-B14F-4D97-AF65-F5344CB8AC3E}">
+        <p14:creationId xmlns:p14="http://schemas.microsoft.com/office/powerpoint/2010/main" val="3301941064"/>
+      </p:ext>
+    </p:extLst>
+  </p:cSld>
+  <p:clrMapOvr>
+    <a:masterClrMapping/>
+  </p:clrMapOvr>
+</p:sld>
+</file>
+
+<file path=ppt/slides/slide8.xml><?xml version="1.0" encoding="utf-8"?>
+<p:sld xmlns:a="http://schemas.openxmlformats.org/drawingml/2006/main" xmlns:r="http://schemas.openxmlformats.org/officeDocument/2006/relationships" xmlns:p="http://schemas.openxmlformats.org/presentationml/2006/main">
+  <p:cSld>
+    <p:spTree>
+      <p:nvGrpSpPr>
+        <p:cNvPr id="1" name=""/>
+        <p:cNvGrpSpPr/>
+        <p:nvPr/>
+      </p:nvGrpSpPr>
+      <p:grpSpPr>
+        <a:xfrm>
+          <a:off x="0" y="0"/>
+          <a:ext cx="0" cy="0"/>
+          <a:chOff x="0" y="0"/>
+          <a:chExt cx="0" cy="0"/>
+        </a:xfrm>
+      </p:grpSpPr>
+      <p:sp>
+        <p:nvSpPr>
+          <p:cNvPr id="5" name="Title 4"/>
+          <p:cNvSpPr>
+            <a:spLocks noGrp="1"/>
+          </p:cNvSpPr>
+          <p:nvPr>
+            <p:ph type="title"/>
+          </p:nvPr>
+        </p:nvSpPr>
+        <p:spPr/>
+        <p:txBody>
+          <a:bodyPr/>
+          <a:lstStyle/>
+          <a:p>
+            <a:r>
+              <a:rPr lang="en-US" dirty="0"/>
+              <a:t>API</a:t>
             </a:r>
           </a:p>
         </p:txBody>
@@ -7426,7 +7831,7 @@
             <a:fld id="{4506F84E-75D2-4715-B6C6-C971E49CE21A}" type="slidenum">
               <a:rPr lang="de-DE" smtClean="0"/>
               <a:pPr/>
-              <a:t>7</a:t>
+              <a:t>8</a:t>
             </a:fld>
             <a:endParaRPr lang="de-DE" dirty="0"/>
           </a:p>
@@ -7475,7 +7880,7 @@
 </p:sld>
 </file>
 
-<file path=ppt/slides/slide8.xml><?xml version="1.0" encoding="utf-8"?>
+<file path=ppt/slides/slide9.xml><?xml version="1.0" encoding="utf-8"?>
 <p:sld xmlns:a="http://schemas.openxmlformats.org/drawingml/2006/main" xmlns:r="http://schemas.openxmlformats.org/officeDocument/2006/relationships" xmlns:p="http://schemas.openxmlformats.org/presentationml/2006/main">
   <p:cSld>
     <p:spTree>
@@ -7509,7 +7914,7 @@
           <a:p>
             <a:r>
               <a:rPr lang="de-DE" dirty="0"/>
-              <a:t>API (Nils)</a:t>
+              <a:t>API</a:t>
             </a:r>
           </a:p>
         </p:txBody>
@@ -7618,7 +8023,7 @@
             <a:fld id="{4506F84E-75D2-4715-B6C6-C971E49CE21A}" type="slidenum">
               <a:rPr lang="de-DE" smtClean="0"/>
               <a:pPr/>
-              <a:t>8</a:t>
+              <a:t>9</a:t>
             </a:fld>
             <a:endParaRPr lang="de-DE" dirty="0"/>
           </a:p>
@@ -7658,71 +8063,6 @@
     <p:extLst>
       <p:ext uri="{BB962C8B-B14F-4D97-AF65-F5344CB8AC3E}">
         <p14:creationId xmlns:p14="http://schemas.microsoft.com/office/powerpoint/2010/main" val="3526108726"/>
-      </p:ext>
-    </p:extLst>
-  </p:cSld>
-  <p:clrMapOvr>
-    <a:masterClrMapping/>
-  </p:clrMapOvr>
-</p:sld>
-</file>
-
-<file path=ppt/slides/slide9.xml><?xml version="1.0" encoding="utf-8"?>
-<p:sld xmlns:a="http://schemas.openxmlformats.org/drawingml/2006/main" xmlns:r="http://schemas.openxmlformats.org/officeDocument/2006/relationships" xmlns:p="http://schemas.openxmlformats.org/presentationml/2006/main">
-  <p:cSld>
-    <p:spTree>
-      <p:nvGrpSpPr>
-        <p:cNvPr id="1" name=""/>
-        <p:cNvGrpSpPr/>
-        <p:nvPr/>
-      </p:nvGrpSpPr>
-      <p:grpSpPr>
-        <a:xfrm>
-          <a:off x="0" y="0"/>
-          <a:ext cx="0" cy="0"/>
-          <a:chOff x="0" y="0"/>
-          <a:chExt cx="0" cy="0"/>
-        </a:xfrm>
-      </p:grpSpPr>
-      <p:sp>
-        <p:nvSpPr>
-          <p:cNvPr id="2" name="Titel 1"/>
-          <p:cNvSpPr>
-            <a:spLocks noGrp="1"/>
-          </p:cNvSpPr>
-          <p:nvPr>
-            <p:ph type="ctrTitle"/>
-          </p:nvPr>
-        </p:nvSpPr>
-        <p:spPr>
-          <a:xfrm>
-            <a:off x="384000" y="2487600"/>
-            <a:ext cx="11424000" cy="443198"/>
-          </a:xfrm>
-        </p:spPr>
-        <p:txBody>
-          <a:bodyPr/>
-          <a:lstStyle/>
-          <a:p>
-            <a:r>
-              <a:rPr lang="en-US" dirty="0"/>
-              <a:t>Backend (+ </a:t>
-            </a:r>
-            <a:r>
-              <a:rPr lang="en-US" dirty="0" err="1"/>
-              <a:t>Datenbank</a:t>
-            </a:r>
-            <a:r>
-              <a:rPr lang="en-US" dirty="0"/>
-              <a:t>)</a:t>
-            </a:r>
-          </a:p>
-        </p:txBody>
-      </p:sp>
-    </p:spTree>
-    <p:extLst>
-      <p:ext uri="{BB962C8B-B14F-4D97-AF65-F5344CB8AC3E}">
-        <p14:creationId xmlns:p14="http://schemas.microsoft.com/office/powerpoint/2010/main" val="3331473797"/>
       </p:ext>
     </p:extLst>
   </p:cSld>

</xml_diff>

<commit_message>
Added Class and Entity Diagram to the Presentation for the Alpha
</commit_message>
<xml_diff>
--- a/orga/Sprint_4_Presentation(Alpha).pptx
+++ b/orga/Sprint_4_Presentation(Alpha).pptx
@@ -5,10 +5,10 @@
     <p:sldMasterId id="2147483738" r:id="rId1"/>
   </p:sldMasterIdLst>
   <p:notesMasterIdLst>
-    <p:notesMasterId r:id="rId17"/>
+    <p:notesMasterId r:id="rId18"/>
   </p:notesMasterIdLst>
   <p:handoutMasterIdLst>
-    <p:handoutMasterId r:id="rId18"/>
+    <p:handoutMasterId r:id="rId19"/>
   </p:handoutMasterIdLst>
   <p:sldIdLst>
     <p:sldId id="256" r:id="rId2"/>
@@ -22,10 +22,11 @@
     <p:sldId id="282" r:id="rId10"/>
     <p:sldId id="267" r:id="rId11"/>
     <p:sldId id="264" r:id="rId12"/>
-    <p:sldId id="278" r:id="rId13"/>
-    <p:sldId id="279" r:id="rId14"/>
-    <p:sldId id="280" r:id="rId15"/>
-    <p:sldId id="269" r:id="rId16"/>
+    <p:sldId id="284" r:id="rId13"/>
+    <p:sldId id="278" r:id="rId14"/>
+    <p:sldId id="279" r:id="rId15"/>
+    <p:sldId id="280" r:id="rId16"/>
+    <p:sldId id="269" r:id="rId17"/>
   </p:sldIdLst>
   <p:sldSz cx="12192000" cy="6858000"/>
   <p:notesSz cx="7099300" cy="10234613"/>
@@ -304,7 +305,7 @@
               <a:pPr>
                 <a:defRPr/>
               </a:pPr>
-              <a:t>17.06.2017</a:t>
+              <a:t>18.06.2017</a:t>
             </a:fld>
             <a:endParaRPr lang="de-DE" sz="1000" dirty="0">
               <a:latin typeface="Arial" pitchFamily="34" charset="0"/>
@@ -533,7 +534,7 @@
               <a:pPr>
                 <a:defRPr/>
               </a:pPr>
-              <a:t>17.06.2017</a:t>
+              <a:t>18.06.2017</a:t>
             </a:fld>
             <a:endParaRPr lang="de-DE" dirty="0"/>
           </a:p>
@@ -4488,17 +4489,42 @@
           <a:lstStyle/>
           <a:p>
             <a:r>
-              <a:rPr lang="en-US" dirty="0" err="1"/>
-              <a:t>Datenmodell</a:t>
-            </a:r>
-            <a:r>
               <a:rPr lang="en-US" dirty="0"/>
-              <a:t> </a:t>
+              <a:t>Model</a:t>
             </a:r>
             <a:endParaRPr lang="bg-BG" dirty="0"/>
           </a:p>
         </p:txBody>
       </p:sp>
+      <p:pic>
+        <p:nvPicPr>
+          <p:cNvPr id="6" name="Content Placeholder 5"/>
+          <p:cNvPicPr>
+            <a:picLocks noGrp="1" noChangeAspect="1"/>
+          </p:cNvPicPr>
+          <p:nvPr>
+            <p:ph sz="quarter" idx="12"/>
+          </p:nvPr>
+        </p:nvPicPr>
+        <p:blipFill>
+          <a:blip r:embed="rId2">
+            <a:extLst>
+              <a:ext uri="{28A0092B-C50C-407E-A947-70E740481C1C}">
+                <a14:useLocalDpi xmlns:a14="http://schemas.microsoft.com/office/drawing/2010/main" val="0"/>
+              </a:ext>
+            </a:extLst>
+          </a:blip>
+          <a:stretch>
+            <a:fillRect/>
+          </a:stretch>
+        </p:blipFill>
+        <p:spPr>
+          <a:xfrm>
+            <a:off x="2450241" y="1107623"/>
+            <a:ext cx="6896100" cy="1866900"/>
+          </a:xfrm>
+        </p:spPr>
+      </p:pic>
       <p:sp>
         <p:nvSpPr>
           <p:cNvPr id="4" name="Footer Placeholder 3"/>
@@ -4538,6 +4564,137 @@
               <a:rPr lang="de-DE" smtClean="0"/>
               <a:pPr/>
               <a:t>12</a:t>
+            </a:fld>
+            <a:endParaRPr lang="de-DE" dirty="0"/>
+          </a:p>
+        </p:txBody>
+      </p:sp>
+      <p:pic>
+        <p:nvPicPr>
+          <p:cNvPr id="7" name="Picture 6"/>
+          <p:cNvPicPr>
+            <a:picLocks noChangeAspect="1"/>
+          </p:cNvPicPr>
+          <p:nvPr/>
+        </p:nvPicPr>
+        <p:blipFill>
+          <a:blip r:embed="rId3">
+            <a:extLst>
+              <a:ext uri="{28A0092B-C50C-407E-A947-70E740481C1C}">
+                <a14:useLocalDpi xmlns:a14="http://schemas.microsoft.com/office/drawing/2010/main" val="0"/>
+              </a:ext>
+            </a:extLst>
+          </a:blip>
+          <a:stretch>
+            <a:fillRect/>
+          </a:stretch>
+        </p:blipFill>
+        <p:spPr>
+          <a:xfrm>
+            <a:off x="2450241" y="3446889"/>
+            <a:ext cx="5962650" cy="1990725"/>
+          </a:xfrm>
+          <a:prstGeom prst="rect">
+            <a:avLst/>
+          </a:prstGeom>
+        </p:spPr>
+      </p:pic>
+    </p:spTree>
+    <p:extLst>
+      <p:ext uri="{BB962C8B-B14F-4D97-AF65-F5344CB8AC3E}">
+        <p14:creationId xmlns:p14="http://schemas.microsoft.com/office/powerpoint/2010/main" val="1734855339"/>
+      </p:ext>
+    </p:extLst>
+  </p:cSld>
+  <p:clrMapOvr>
+    <a:masterClrMapping/>
+  </p:clrMapOvr>
+</p:sld>
+</file>
+
+<file path=ppt/slides/slide13.xml><?xml version="1.0" encoding="utf-8"?>
+<p:sld xmlns:a="http://schemas.openxmlformats.org/drawingml/2006/main" xmlns:r="http://schemas.openxmlformats.org/officeDocument/2006/relationships" xmlns:p="http://schemas.openxmlformats.org/presentationml/2006/main">
+  <p:cSld>
+    <p:spTree>
+      <p:nvGrpSpPr>
+        <p:cNvPr id="1" name=""/>
+        <p:cNvGrpSpPr/>
+        <p:nvPr/>
+      </p:nvGrpSpPr>
+      <p:grpSpPr>
+        <a:xfrm>
+          <a:off x="0" y="0"/>
+          <a:ext cx="0" cy="0"/>
+          <a:chOff x="0" y="0"/>
+          <a:chExt cx="0" cy="0"/>
+        </a:xfrm>
+      </p:grpSpPr>
+      <p:sp>
+        <p:nvSpPr>
+          <p:cNvPr id="2" name="Title 1"/>
+          <p:cNvSpPr>
+            <a:spLocks noGrp="1"/>
+          </p:cNvSpPr>
+          <p:nvPr>
+            <p:ph type="title"/>
+          </p:nvPr>
+        </p:nvSpPr>
+        <p:spPr/>
+        <p:txBody>
+          <a:bodyPr/>
+          <a:lstStyle/>
+          <a:p>
+            <a:r>
+              <a:rPr lang="en-US" dirty="0" err="1"/>
+              <a:t>Datenmodell</a:t>
+            </a:r>
+            <a:r>
+              <a:rPr lang="en-US" dirty="0"/>
+              <a:t> </a:t>
+            </a:r>
+            <a:endParaRPr lang="bg-BG" dirty="0"/>
+          </a:p>
+        </p:txBody>
+      </p:sp>
+      <p:sp>
+        <p:nvSpPr>
+          <p:cNvPr id="4" name="Footer Placeholder 3"/>
+          <p:cNvSpPr>
+            <a:spLocks noGrp="1"/>
+          </p:cNvSpPr>
+          <p:nvPr>
+            <p:ph type="ftr" sz="quarter" idx="13"/>
+          </p:nvPr>
+        </p:nvSpPr>
+        <p:spPr/>
+        <p:txBody>
+          <a:bodyPr/>
+          <a:lstStyle/>
+          <a:p>
+            <a:pPr algn="l"/>
+            <a:endParaRPr lang="de-DE" dirty="0"/>
+          </a:p>
+        </p:txBody>
+      </p:sp>
+      <p:sp>
+        <p:nvSpPr>
+          <p:cNvPr id="5" name="Slide Number Placeholder 4"/>
+          <p:cNvSpPr>
+            <a:spLocks noGrp="1"/>
+          </p:cNvSpPr>
+          <p:nvPr>
+            <p:ph type="sldNum" sz="quarter" idx="14"/>
+          </p:nvPr>
+        </p:nvSpPr>
+        <p:spPr/>
+        <p:txBody>
+          <a:bodyPr/>
+          <a:lstStyle/>
+          <a:p>
+            <a:fld id="{4506F84E-75D2-4715-B6C6-C971E49CE21A}" type="slidenum">
+              <a:rPr lang="de-DE" smtClean="0"/>
+              <a:pPr/>
+              <a:t>13</a:t>
             </a:fld>
             <a:endParaRPr lang="de-DE" dirty="0"/>
           </a:p>
@@ -5495,71 +5652,6 @@
 </p:sld>
 </file>
 
-<file path=ppt/slides/slide13.xml><?xml version="1.0" encoding="utf-8"?>
-<p:sld xmlns:a="http://schemas.openxmlformats.org/drawingml/2006/main" xmlns:r="http://schemas.openxmlformats.org/officeDocument/2006/relationships" xmlns:p="http://schemas.openxmlformats.org/presentationml/2006/main">
-  <p:cSld>
-    <p:spTree>
-      <p:nvGrpSpPr>
-        <p:cNvPr id="1" name=""/>
-        <p:cNvGrpSpPr/>
-        <p:nvPr/>
-      </p:nvGrpSpPr>
-      <p:grpSpPr>
-        <a:xfrm>
-          <a:off x="0" y="0"/>
-          <a:ext cx="0" cy="0"/>
-          <a:chOff x="0" y="0"/>
-          <a:chExt cx="0" cy="0"/>
-        </a:xfrm>
-      </p:grpSpPr>
-      <p:sp>
-        <p:nvSpPr>
-          <p:cNvPr id="2" name="Titel 1"/>
-          <p:cNvSpPr>
-            <a:spLocks noGrp="1"/>
-          </p:cNvSpPr>
-          <p:nvPr>
-            <p:ph type="ctrTitle"/>
-          </p:nvPr>
-        </p:nvSpPr>
-        <p:spPr>
-          <a:xfrm>
-            <a:off x="384000" y="2487600"/>
-            <a:ext cx="11424000" cy="443198"/>
-          </a:xfrm>
-        </p:spPr>
-        <p:txBody>
-          <a:bodyPr/>
-          <a:lstStyle/>
-          <a:p>
-            <a:r>
-              <a:rPr lang="en-US" dirty="0"/>
-              <a:t>Features </a:t>
-            </a:r>
-            <a:r>
-              <a:rPr lang="en-US" dirty="0" err="1"/>
-              <a:t>für</a:t>
-            </a:r>
-            <a:r>
-              <a:rPr lang="en-US" dirty="0"/>
-              <a:t> Beta Version</a:t>
-            </a:r>
-          </a:p>
-        </p:txBody>
-      </p:sp>
-    </p:spTree>
-    <p:extLst>
-      <p:ext uri="{BB962C8B-B14F-4D97-AF65-F5344CB8AC3E}">
-        <p14:creationId xmlns:p14="http://schemas.microsoft.com/office/powerpoint/2010/main" val="4250935669"/>
-      </p:ext>
-    </p:extLst>
-  </p:cSld>
-  <p:clrMapOvr>
-    <a:masterClrMapping/>
-  </p:clrMapOvr>
-</p:sld>
-</file>
-
 <file path=ppt/slides/slide14.xml><?xml version="1.0" encoding="utf-8"?>
 <p:sld xmlns:a="http://schemas.openxmlformats.org/drawingml/2006/main" xmlns:r="http://schemas.openxmlformats.org/officeDocument/2006/relationships" xmlns:p="http://schemas.openxmlformats.org/presentationml/2006/main">
   <p:cSld>
@@ -5579,6 +5671,71 @@
       </p:grpSpPr>
       <p:sp>
         <p:nvSpPr>
+          <p:cNvPr id="2" name="Titel 1"/>
+          <p:cNvSpPr>
+            <a:spLocks noGrp="1"/>
+          </p:cNvSpPr>
+          <p:nvPr>
+            <p:ph type="ctrTitle"/>
+          </p:nvPr>
+        </p:nvSpPr>
+        <p:spPr>
+          <a:xfrm>
+            <a:off x="384000" y="2487600"/>
+            <a:ext cx="11424000" cy="443198"/>
+          </a:xfrm>
+        </p:spPr>
+        <p:txBody>
+          <a:bodyPr/>
+          <a:lstStyle/>
+          <a:p>
+            <a:r>
+              <a:rPr lang="en-US" dirty="0"/>
+              <a:t>Features </a:t>
+            </a:r>
+            <a:r>
+              <a:rPr lang="en-US" dirty="0" err="1"/>
+              <a:t>für</a:t>
+            </a:r>
+            <a:r>
+              <a:rPr lang="en-US" dirty="0"/>
+              <a:t> Beta Version</a:t>
+            </a:r>
+          </a:p>
+        </p:txBody>
+      </p:sp>
+    </p:spTree>
+    <p:extLst>
+      <p:ext uri="{BB962C8B-B14F-4D97-AF65-F5344CB8AC3E}">
+        <p14:creationId xmlns:p14="http://schemas.microsoft.com/office/powerpoint/2010/main" val="4250935669"/>
+      </p:ext>
+    </p:extLst>
+  </p:cSld>
+  <p:clrMapOvr>
+    <a:masterClrMapping/>
+  </p:clrMapOvr>
+</p:sld>
+</file>
+
+<file path=ppt/slides/slide15.xml><?xml version="1.0" encoding="utf-8"?>
+<p:sld xmlns:a="http://schemas.openxmlformats.org/drawingml/2006/main" xmlns:r="http://schemas.openxmlformats.org/officeDocument/2006/relationships" xmlns:p="http://schemas.openxmlformats.org/presentationml/2006/main">
+  <p:cSld>
+    <p:spTree>
+      <p:nvGrpSpPr>
+        <p:cNvPr id="1" name=""/>
+        <p:cNvGrpSpPr/>
+        <p:nvPr/>
+      </p:nvGrpSpPr>
+      <p:grpSpPr>
+        <a:xfrm>
+          <a:off x="0" y="0"/>
+          <a:ext cx="0" cy="0"/>
+          <a:chOff x="0" y="0"/>
+          <a:chExt cx="0" cy="0"/>
+        </a:xfrm>
+      </p:grpSpPr>
+      <p:sp>
+        <p:nvSpPr>
           <p:cNvPr id="5" name="Title 4"/>
           <p:cNvSpPr>
             <a:spLocks noGrp="1"/>
@@ -5756,7 +5913,7 @@
             <a:fld id="{4506F84E-75D2-4715-B6C6-C971E49CE21A}" type="slidenum">
               <a:rPr lang="de-DE" smtClean="0"/>
               <a:pPr/>
-              <a:t>14</a:t>
+              <a:t>15</a:t>
             </a:fld>
             <a:endParaRPr lang="de-DE" dirty="0"/>
           </a:p>
@@ -5775,7 +5932,7 @@
 </p:sld>
 </file>
 
-<file path=ppt/slides/slide15.xml><?xml version="1.0" encoding="utf-8"?>
+<file path=ppt/slides/slide16.xml><?xml version="1.0" encoding="utf-8"?>
 <p:sld xmlns:a="http://schemas.openxmlformats.org/drawingml/2006/main" xmlns:r="http://schemas.openxmlformats.org/officeDocument/2006/relationships" xmlns:p="http://schemas.openxmlformats.org/presentationml/2006/main">
   <p:cSld>
     <p:spTree>

</xml_diff>